<commit_message>
Update to Lacks Community Involvement
</commit_message>
<xml_diff>
--- a/images/hazards.pptx
+++ b/images/hazards.pptx
@@ -265,7 +265,7 @@
           <a:p>
             <a:fld id="{203D0769-FF07-3246-B708-FAA72E4146F7}" type="datetimeFigureOut">
               <a:rPr lang="en-GB" smtClean="0"/>
-              <a:t>30/04/2021</a:t>
+              <a:t>10/05/2021</a:t>
             </a:fld>
             <a:endParaRPr lang="en-GB"/>
           </a:p>
@@ -463,7 +463,7 @@
           <a:p>
             <a:fld id="{203D0769-FF07-3246-B708-FAA72E4146F7}" type="datetimeFigureOut">
               <a:rPr lang="en-GB" smtClean="0"/>
-              <a:t>30/04/2021</a:t>
+              <a:t>10/05/2021</a:t>
             </a:fld>
             <a:endParaRPr lang="en-GB"/>
           </a:p>
@@ -671,7 +671,7 @@
           <a:p>
             <a:fld id="{203D0769-FF07-3246-B708-FAA72E4146F7}" type="datetimeFigureOut">
               <a:rPr lang="en-GB" smtClean="0"/>
-              <a:t>30/04/2021</a:t>
+              <a:t>10/05/2021</a:t>
             </a:fld>
             <a:endParaRPr lang="en-GB"/>
           </a:p>
@@ -869,7 +869,7 @@
           <a:p>
             <a:fld id="{203D0769-FF07-3246-B708-FAA72E4146F7}" type="datetimeFigureOut">
               <a:rPr lang="en-GB" smtClean="0"/>
-              <a:t>30/04/2021</a:t>
+              <a:t>10/05/2021</a:t>
             </a:fld>
             <a:endParaRPr lang="en-GB"/>
           </a:p>
@@ -1144,7 +1144,7 @@
           <a:p>
             <a:fld id="{203D0769-FF07-3246-B708-FAA72E4146F7}" type="datetimeFigureOut">
               <a:rPr lang="en-GB" smtClean="0"/>
-              <a:t>30/04/2021</a:t>
+              <a:t>10/05/2021</a:t>
             </a:fld>
             <a:endParaRPr lang="en-GB"/>
           </a:p>
@@ -1409,7 +1409,7 @@
           <a:p>
             <a:fld id="{203D0769-FF07-3246-B708-FAA72E4146F7}" type="datetimeFigureOut">
               <a:rPr lang="en-GB" smtClean="0"/>
-              <a:t>30/04/2021</a:t>
+              <a:t>10/05/2021</a:t>
             </a:fld>
             <a:endParaRPr lang="en-GB"/>
           </a:p>
@@ -1821,7 +1821,7 @@
           <a:p>
             <a:fld id="{203D0769-FF07-3246-B708-FAA72E4146F7}" type="datetimeFigureOut">
               <a:rPr lang="en-GB" smtClean="0"/>
-              <a:t>30/04/2021</a:t>
+              <a:t>10/05/2021</a:t>
             </a:fld>
             <a:endParaRPr lang="en-GB"/>
           </a:p>
@@ -1962,7 +1962,7 @@
           <a:p>
             <a:fld id="{203D0769-FF07-3246-B708-FAA72E4146F7}" type="datetimeFigureOut">
               <a:rPr lang="en-GB" smtClean="0"/>
-              <a:t>30/04/2021</a:t>
+              <a:t>10/05/2021</a:t>
             </a:fld>
             <a:endParaRPr lang="en-GB"/>
           </a:p>
@@ -2075,7 +2075,7 @@
           <a:p>
             <a:fld id="{203D0769-FF07-3246-B708-FAA72E4146F7}" type="datetimeFigureOut">
               <a:rPr lang="en-GB" smtClean="0"/>
-              <a:t>30/04/2021</a:t>
+              <a:t>10/05/2021</a:t>
             </a:fld>
             <a:endParaRPr lang="en-GB"/>
           </a:p>
@@ -2386,7 +2386,7 @@
           <a:p>
             <a:fld id="{203D0769-FF07-3246-B708-FAA72E4146F7}" type="datetimeFigureOut">
               <a:rPr lang="en-GB" smtClean="0"/>
-              <a:t>30/04/2021</a:t>
+              <a:t>10/05/2021</a:t>
             </a:fld>
             <a:endParaRPr lang="en-GB"/>
           </a:p>
@@ -2674,7 +2674,7 @@
           <a:p>
             <a:fld id="{203D0769-FF07-3246-B708-FAA72E4146F7}" type="datetimeFigureOut">
               <a:rPr lang="en-GB" smtClean="0"/>
-              <a:t>30/04/2021</a:t>
+              <a:t>10/05/2021</a:t>
             </a:fld>
             <a:endParaRPr lang="en-GB"/>
           </a:p>
@@ -2915,7 +2915,7 @@
           <a:p>
             <a:fld id="{203D0769-FF07-3246-B708-FAA72E4146F7}" type="datetimeFigureOut">
               <a:rPr lang="en-GB" smtClean="0"/>
-              <a:t>30/04/2021</a:t>
+              <a:t>10/05/2021</a:t>
             </a:fld>
             <a:endParaRPr lang="en-GB"/>
           </a:p>
@@ -4389,7 +4389,14 @@
               <a:pPr algn="ctr"/>
               <a:r>
                 <a:rPr lang="en-GB" sz="1400" dirty="0"/>
-                <a:t>Ignores or opposes needs</a:t>
+                <a:t>Lacks community</a:t>
+              </a:r>
+            </a:p>
+            <a:p>
+              <a:pPr algn="ctr"/>
+              <a:r>
+                <a:rPr lang="en-GB" sz="1400" dirty="0"/>
+                <a:t>involvement</a:t>
               </a:r>
             </a:p>
           </p:txBody>

</xml_diff>

<commit_message>
Minor wording updates + added new img files
</commit_message>
<xml_diff>
--- a/images/hazards.pptx
+++ b/images/hazards.pptx
@@ -2,7 +2,7 @@
 <file path=ppt/presentation.xml><?xml version="1.0" encoding="utf-8"?>
 <p:presentation xmlns:a="http://schemas.openxmlformats.org/drawingml/2006/main" xmlns:r="http://schemas.openxmlformats.org/officeDocument/2006/relationships" xmlns:p="http://schemas.openxmlformats.org/presentationml/2006/main" saveSubsetFonts="1" autoCompressPictures="0">
   <p:sldMasterIdLst>
-    <p:sldMasterId id="2147483648" r:id="rId1"/>
+    <p:sldMasterId id="2147483696" r:id="rId1"/>
   </p:sldMasterIdLst>
   <p:sldIdLst>
     <p:sldId id="256" r:id="rId2"/>
@@ -13,13 +13,13 @@
     <p:sldId id="261" r:id="rId7"/>
     <p:sldId id="257" r:id="rId8"/>
   </p:sldIdLst>
-  <p:sldSz cx="12192000" cy="6858000"/>
+  <p:sldSz cx="14400213" cy="7199313"/>
   <p:notesSz cx="6858000" cy="9144000"/>
   <p:defaultTextStyle>
     <a:defPPr>
-      <a:defRPr lang="en-KE"/>
+      <a:defRPr lang="en-US"/>
     </a:defPPr>
-    <a:lvl1pPr marL="0" algn="l" defTabSz="914400" rtl="0" eaLnBrk="1" latinLnBrk="0" hangingPunct="1">
+    <a:lvl1pPr marL="0" algn="l" defTabSz="457200" rtl="0" eaLnBrk="1" latinLnBrk="0" hangingPunct="1">
       <a:defRPr sz="1800" kern="1200">
         <a:solidFill>
           <a:schemeClr val="tx1"/>
@@ -29,7 +29,7 @@
         <a:cs typeface="+mn-cs"/>
       </a:defRPr>
     </a:lvl1pPr>
-    <a:lvl2pPr marL="457200" algn="l" defTabSz="914400" rtl="0" eaLnBrk="1" latinLnBrk="0" hangingPunct="1">
+    <a:lvl2pPr marL="457200" algn="l" defTabSz="457200" rtl="0" eaLnBrk="1" latinLnBrk="0" hangingPunct="1">
       <a:defRPr sz="1800" kern="1200">
         <a:solidFill>
           <a:schemeClr val="tx1"/>
@@ -39,7 +39,7 @@
         <a:cs typeface="+mn-cs"/>
       </a:defRPr>
     </a:lvl2pPr>
-    <a:lvl3pPr marL="914400" algn="l" defTabSz="914400" rtl="0" eaLnBrk="1" latinLnBrk="0" hangingPunct="1">
+    <a:lvl3pPr marL="914400" algn="l" defTabSz="457200" rtl="0" eaLnBrk="1" latinLnBrk="0" hangingPunct="1">
       <a:defRPr sz="1800" kern="1200">
         <a:solidFill>
           <a:schemeClr val="tx1"/>
@@ -49,7 +49,7 @@
         <a:cs typeface="+mn-cs"/>
       </a:defRPr>
     </a:lvl3pPr>
-    <a:lvl4pPr marL="1371600" algn="l" defTabSz="914400" rtl="0" eaLnBrk="1" latinLnBrk="0" hangingPunct="1">
+    <a:lvl4pPr marL="1371600" algn="l" defTabSz="457200" rtl="0" eaLnBrk="1" latinLnBrk="0" hangingPunct="1">
       <a:defRPr sz="1800" kern="1200">
         <a:solidFill>
           <a:schemeClr val="tx1"/>
@@ -59,7 +59,7 @@
         <a:cs typeface="+mn-cs"/>
       </a:defRPr>
     </a:lvl4pPr>
-    <a:lvl5pPr marL="1828800" algn="l" defTabSz="914400" rtl="0" eaLnBrk="1" latinLnBrk="0" hangingPunct="1">
+    <a:lvl5pPr marL="1828800" algn="l" defTabSz="457200" rtl="0" eaLnBrk="1" latinLnBrk="0" hangingPunct="1">
       <a:defRPr sz="1800" kern="1200">
         <a:solidFill>
           <a:schemeClr val="tx1"/>
@@ -69,7 +69,7 @@
         <a:cs typeface="+mn-cs"/>
       </a:defRPr>
     </a:lvl5pPr>
-    <a:lvl6pPr marL="2286000" algn="l" defTabSz="914400" rtl="0" eaLnBrk="1" latinLnBrk="0" hangingPunct="1">
+    <a:lvl6pPr marL="2286000" algn="l" defTabSz="457200" rtl="0" eaLnBrk="1" latinLnBrk="0" hangingPunct="1">
       <a:defRPr sz="1800" kern="1200">
         <a:solidFill>
           <a:schemeClr val="tx1"/>
@@ -79,7 +79,7 @@
         <a:cs typeface="+mn-cs"/>
       </a:defRPr>
     </a:lvl6pPr>
-    <a:lvl7pPr marL="2743200" algn="l" defTabSz="914400" rtl="0" eaLnBrk="1" latinLnBrk="0" hangingPunct="1">
+    <a:lvl7pPr marL="2743200" algn="l" defTabSz="457200" rtl="0" eaLnBrk="1" latinLnBrk="0" hangingPunct="1">
       <a:defRPr sz="1800" kern="1200">
         <a:solidFill>
           <a:schemeClr val="tx1"/>
@@ -89,7 +89,7 @@
         <a:cs typeface="+mn-cs"/>
       </a:defRPr>
     </a:lvl7pPr>
-    <a:lvl8pPr marL="3200400" algn="l" defTabSz="914400" rtl="0" eaLnBrk="1" latinLnBrk="0" hangingPunct="1">
+    <a:lvl8pPr marL="3200400" algn="l" defTabSz="457200" rtl="0" eaLnBrk="1" latinLnBrk="0" hangingPunct="1">
       <a:defRPr sz="1800" kern="1200">
         <a:solidFill>
           <a:schemeClr val="tx1"/>
@@ -99,7 +99,7 @@
         <a:cs typeface="+mn-cs"/>
       </a:defRPr>
     </a:lvl8pPr>
-    <a:lvl9pPr marL="3657600" algn="l" defTabSz="914400" rtl="0" eaLnBrk="1" latinLnBrk="0" hangingPunct="1">
+    <a:lvl9pPr marL="3657600" algn="l" defTabSz="457200" rtl="0" eaLnBrk="1" latinLnBrk="0" hangingPunct="1">
       <a:defRPr sz="1800" kern="1200">
         <a:solidFill>
           <a:schemeClr val="tx1"/>
@@ -116,6 +116,18 @@
     </p:ext>
   </p:extLst>
 </p:presentation>
+</file>
+
+<file path=ppt/commentAuthors.xml><?xml version="1.0" encoding="utf-8"?>
+<p:cmAuthorLst xmlns:a="http://schemas.openxmlformats.org/drawingml/2006/main" xmlns:r="http://schemas.openxmlformats.org/officeDocument/2006/relationships" xmlns:p="http://schemas.openxmlformats.org/presentationml/2006/main">
+  <p:cmAuthor id="1" name="Nina Di Cara" initials="NDC" lastIdx="1" clrIdx="0">
+    <p:extLst>
+      <p:ext uri="{19B8F6BF-5375-455C-9EA6-DF929625EA0E}">
+        <p15:presenceInfo xmlns:p15="http://schemas.microsoft.com/office/powerpoint/2012/main" userId="S::ff18302@bristol.ac.uk::d460b541-914e-43aa-ae21-b3ec622b3a4b" providerId="AD"/>
+      </p:ext>
+    </p:extLst>
+  </p:cmAuthor>
+</p:cmAuthorLst>
 </file>
 
 <file path=ppt/slideLayouts/slideLayout1.xml><?xml version="1.0" encoding="utf-8"?>
@@ -137,13 +149,7 @@
       </p:grpSpPr>
       <p:sp>
         <p:nvSpPr>
-          <p:cNvPr id="2" name="Title 1">
-            <a:extLst>
-              <a:ext uri="{FF2B5EF4-FFF2-40B4-BE49-F238E27FC236}">
-                <a16:creationId xmlns:a16="http://schemas.microsoft.com/office/drawing/2014/main" id="{8DB952CA-4950-A946-8E10-16098ACCDC3E}"/>
-              </a:ext>
-            </a:extLst>
-          </p:cNvPr>
+          <p:cNvPr id="2" name="Title 1"/>
           <p:cNvSpPr>
             <a:spLocks noGrp="1"/>
           </p:cNvSpPr>
@@ -153,15 +159,15 @@
         </p:nvSpPr>
         <p:spPr>
           <a:xfrm>
-            <a:off x="1524000" y="1122363"/>
-            <a:ext cx="9144000" cy="2387600"/>
+            <a:off x="1800027" y="1178222"/>
+            <a:ext cx="10800160" cy="2506427"/>
           </a:xfrm>
         </p:spPr>
         <p:txBody>
           <a:bodyPr anchor="b"/>
           <a:lstStyle>
             <a:lvl1pPr algn="ctr">
-              <a:defRPr sz="6000"/>
+              <a:defRPr sz="6299"/>
             </a:lvl1pPr>
           </a:lstStyle>
           <a:p>
@@ -169,18 +175,13 @@
               <a:rPr lang="en-GB"/>
               <a:t>Click to edit Master title style</a:t>
             </a:r>
+            <a:endParaRPr lang="en-US" dirty="0"/>
           </a:p>
         </p:txBody>
       </p:sp>
       <p:sp>
         <p:nvSpPr>
-          <p:cNvPr id="3" name="Subtitle 2">
-            <a:extLst>
-              <a:ext uri="{FF2B5EF4-FFF2-40B4-BE49-F238E27FC236}">
-                <a16:creationId xmlns:a16="http://schemas.microsoft.com/office/drawing/2014/main" id="{B6F8146E-91D3-334D-8842-858D04220C14}"/>
-              </a:ext>
-            </a:extLst>
-          </p:cNvPr>
+          <p:cNvPr id="3" name="Subtitle 2"/>
           <p:cNvSpPr>
             <a:spLocks noGrp="1"/>
           </p:cNvSpPr>
@@ -190,8 +191,8 @@
         </p:nvSpPr>
         <p:spPr>
           <a:xfrm>
-            <a:off x="1524000" y="3602038"/>
-            <a:ext cx="9144000" cy="1655762"/>
+            <a:off x="1800027" y="3781306"/>
+            <a:ext cx="10800160" cy="1738167"/>
           </a:xfrm>
         </p:spPr>
         <p:txBody>
@@ -199,39 +200,39 @@
           <a:lstStyle>
             <a:lvl1pPr marL="0" indent="0" algn="ctr">
               <a:buNone/>
-              <a:defRPr sz="2400"/>
+              <a:defRPr sz="2520"/>
             </a:lvl1pPr>
-            <a:lvl2pPr marL="457200" indent="0" algn="ctr">
+            <a:lvl2pPr marL="479969" indent="0" algn="ctr">
               <a:buNone/>
-              <a:defRPr sz="2000"/>
+              <a:defRPr sz="2100"/>
             </a:lvl2pPr>
-            <a:lvl3pPr marL="914400" indent="0" algn="ctr">
+            <a:lvl3pPr marL="959937" indent="0" algn="ctr">
               <a:buNone/>
-              <a:defRPr sz="1800"/>
+              <a:defRPr sz="1890"/>
             </a:lvl3pPr>
-            <a:lvl4pPr marL="1371600" indent="0" algn="ctr">
+            <a:lvl4pPr marL="1439906" indent="0" algn="ctr">
               <a:buNone/>
-              <a:defRPr sz="1600"/>
+              <a:defRPr sz="1680"/>
             </a:lvl4pPr>
-            <a:lvl5pPr marL="1828800" indent="0" algn="ctr">
+            <a:lvl5pPr marL="1919874" indent="0" algn="ctr">
               <a:buNone/>
-              <a:defRPr sz="1600"/>
+              <a:defRPr sz="1680"/>
             </a:lvl5pPr>
-            <a:lvl6pPr marL="2286000" indent="0" algn="ctr">
+            <a:lvl6pPr marL="2399843" indent="0" algn="ctr">
               <a:buNone/>
-              <a:defRPr sz="1600"/>
+              <a:defRPr sz="1680"/>
             </a:lvl6pPr>
-            <a:lvl7pPr marL="2743200" indent="0" algn="ctr">
+            <a:lvl7pPr marL="2879811" indent="0" algn="ctr">
               <a:buNone/>
-              <a:defRPr sz="1600"/>
+              <a:defRPr sz="1680"/>
             </a:lvl7pPr>
-            <a:lvl8pPr marL="3200400" indent="0" algn="ctr">
+            <a:lvl8pPr marL="3359780" indent="0" algn="ctr">
               <a:buNone/>
-              <a:defRPr sz="1600"/>
+              <a:defRPr sz="1680"/>
             </a:lvl8pPr>
-            <a:lvl9pPr marL="3657600" indent="0" algn="ctr">
+            <a:lvl9pPr marL="3839748" indent="0" algn="ctr">
               <a:buNone/>
-              <a:defRPr sz="1600"/>
+              <a:defRPr sz="1680"/>
             </a:lvl9pPr>
           </a:lstStyle>
           <a:p>
@@ -239,18 +240,13 @@
               <a:rPr lang="en-GB"/>
               <a:t>Click to edit Master subtitle style</a:t>
             </a:r>
+            <a:endParaRPr lang="en-US" dirty="0"/>
           </a:p>
         </p:txBody>
       </p:sp>
       <p:sp>
         <p:nvSpPr>
-          <p:cNvPr id="4" name="Date Placeholder 3">
-            <a:extLst>
-              <a:ext uri="{FF2B5EF4-FFF2-40B4-BE49-F238E27FC236}">
-                <a16:creationId xmlns:a16="http://schemas.microsoft.com/office/drawing/2014/main" id="{EE8AC5A2-C6B5-5142-AE1D-2BEF6002AFD8}"/>
-              </a:ext>
-            </a:extLst>
-          </p:cNvPr>
+          <p:cNvPr id="4" name="Date Placeholder 3"/>
           <p:cNvSpPr>
             <a:spLocks noGrp="1"/>
           </p:cNvSpPr>
@@ -273,13 +269,7 @@
       </p:sp>
       <p:sp>
         <p:nvSpPr>
-          <p:cNvPr id="5" name="Footer Placeholder 4">
-            <a:extLst>
-              <a:ext uri="{FF2B5EF4-FFF2-40B4-BE49-F238E27FC236}">
-                <a16:creationId xmlns:a16="http://schemas.microsoft.com/office/drawing/2014/main" id="{F5BDD01A-47AE-4E41-892D-0AEFB7070899}"/>
-              </a:ext>
-            </a:extLst>
-          </p:cNvPr>
+          <p:cNvPr id="5" name="Footer Placeholder 4"/>
           <p:cNvSpPr>
             <a:spLocks noGrp="1"/>
           </p:cNvSpPr>
@@ -298,13 +288,7 @@
       </p:sp>
       <p:sp>
         <p:nvSpPr>
-          <p:cNvPr id="6" name="Slide Number Placeholder 5">
-            <a:extLst>
-              <a:ext uri="{FF2B5EF4-FFF2-40B4-BE49-F238E27FC236}">
-                <a16:creationId xmlns:a16="http://schemas.microsoft.com/office/drawing/2014/main" id="{0273A345-2537-D44C-9636-57F1CCAAAA6F}"/>
-              </a:ext>
-            </a:extLst>
-          </p:cNvPr>
+          <p:cNvPr id="6" name="Slide Number Placeholder 5"/>
           <p:cNvSpPr>
             <a:spLocks noGrp="1"/>
           </p:cNvSpPr>
@@ -328,7 +312,7 @@
     </p:spTree>
     <p:extLst>
       <p:ext uri="{BB962C8B-B14F-4D97-AF65-F5344CB8AC3E}">
-        <p14:creationId xmlns:p14="http://schemas.microsoft.com/office/powerpoint/2010/main" val="1756710254"/>
+        <p14:creationId xmlns:p14="http://schemas.microsoft.com/office/powerpoint/2010/main" val="1104406564"/>
       </p:ext>
     </p:extLst>
   </p:cSld>
@@ -357,13 +341,7 @@
       </p:grpSpPr>
       <p:sp>
         <p:nvSpPr>
-          <p:cNvPr id="2" name="Title 1">
-            <a:extLst>
-              <a:ext uri="{FF2B5EF4-FFF2-40B4-BE49-F238E27FC236}">
-                <a16:creationId xmlns:a16="http://schemas.microsoft.com/office/drawing/2014/main" id="{36DB58C5-7EB4-E14A-A508-219C571B7396}"/>
-              </a:ext>
-            </a:extLst>
-          </p:cNvPr>
+          <p:cNvPr id="2" name="Title 1"/>
           <p:cNvSpPr>
             <a:spLocks noGrp="1"/>
           </p:cNvSpPr>
@@ -380,18 +358,13 @@
               <a:rPr lang="en-GB"/>
               <a:t>Click to edit Master title style</a:t>
             </a:r>
+            <a:endParaRPr lang="en-US" dirty="0"/>
           </a:p>
         </p:txBody>
       </p:sp>
       <p:sp>
         <p:nvSpPr>
-          <p:cNvPr id="3" name="Vertical Text Placeholder 2">
-            <a:extLst>
-              <a:ext uri="{FF2B5EF4-FFF2-40B4-BE49-F238E27FC236}">
-                <a16:creationId xmlns:a16="http://schemas.microsoft.com/office/drawing/2014/main" id="{39EE5A36-54A6-FD48-BE16-AB9A8A81EBD0}"/>
-              </a:ext>
-            </a:extLst>
-          </p:cNvPr>
+          <p:cNvPr id="3" name="Vertical Text Placeholder 2"/>
           <p:cNvSpPr>
             <a:spLocks noGrp="1"/>
           </p:cNvSpPr>
@@ -437,18 +410,13 @@
               <a:rPr lang="en-GB"/>
               <a:t>Fifth level</a:t>
             </a:r>
+            <a:endParaRPr lang="en-US" dirty="0"/>
           </a:p>
         </p:txBody>
       </p:sp>
       <p:sp>
         <p:nvSpPr>
-          <p:cNvPr id="4" name="Date Placeholder 3">
-            <a:extLst>
-              <a:ext uri="{FF2B5EF4-FFF2-40B4-BE49-F238E27FC236}">
-                <a16:creationId xmlns:a16="http://schemas.microsoft.com/office/drawing/2014/main" id="{D36EB57A-825D-A241-AC27-0FBE27CE7A9F}"/>
-              </a:ext>
-            </a:extLst>
-          </p:cNvPr>
+          <p:cNvPr id="4" name="Date Placeholder 3"/>
           <p:cNvSpPr>
             <a:spLocks noGrp="1"/>
           </p:cNvSpPr>
@@ -471,13 +439,7 @@
       </p:sp>
       <p:sp>
         <p:nvSpPr>
-          <p:cNvPr id="5" name="Footer Placeholder 4">
-            <a:extLst>
-              <a:ext uri="{FF2B5EF4-FFF2-40B4-BE49-F238E27FC236}">
-                <a16:creationId xmlns:a16="http://schemas.microsoft.com/office/drawing/2014/main" id="{F6F86FBA-BA99-BA42-A5F9-8212722B95BF}"/>
-              </a:ext>
-            </a:extLst>
-          </p:cNvPr>
+          <p:cNvPr id="5" name="Footer Placeholder 4"/>
           <p:cNvSpPr>
             <a:spLocks noGrp="1"/>
           </p:cNvSpPr>
@@ -496,13 +458,7 @@
       </p:sp>
       <p:sp>
         <p:nvSpPr>
-          <p:cNvPr id="6" name="Slide Number Placeholder 5">
-            <a:extLst>
-              <a:ext uri="{FF2B5EF4-FFF2-40B4-BE49-F238E27FC236}">
-                <a16:creationId xmlns:a16="http://schemas.microsoft.com/office/drawing/2014/main" id="{896A5497-36CB-1646-8F38-8E9B224CA52B}"/>
-              </a:ext>
-            </a:extLst>
-          </p:cNvPr>
+          <p:cNvPr id="6" name="Slide Number Placeholder 5"/>
           <p:cNvSpPr>
             <a:spLocks noGrp="1"/>
           </p:cNvSpPr>
@@ -526,7 +482,7 @@
     </p:spTree>
     <p:extLst>
       <p:ext uri="{BB962C8B-B14F-4D97-AF65-F5344CB8AC3E}">
-        <p14:creationId xmlns:p14="http://schemas.microsoft.com/office/powerpoint/2010/main" val="3060540403"/>
+        <p14:creationId xmlns:p14="http://schemas.microsoft.com/office/powerpoint/2010/main" val="3664143643"/>
       </p:ext>
     </p:extLst>
   </p:cSld>
@@ -555,13 +511,7 @@
       </p:grpSpPr>
       <p:sp>
         <p:nvSpPr>
-          <p:cNvPr id="2" name="Vertical Title 1">
-            <a:extLst>
-              <a:ext uri="{FF2B5EF4-FFF2-40B4-BE49-F238E27FC236}">
-                <a16:creationId xmlns:a16="http://schemas.microsoft.com/office/drawing/2014/main" id="{019EC9C1-D861-ED44-88BE-ABD6A9D81786}"/>
-              </a:ext>
-            </a:extLst>
-          </p:cNvPr>
+          <p:cNvPr id="2" name="Vertical Title 1"/>
           <p:cNvSpPr>
             <a:spLocks noGrp="1"/>
           </p:cNvSpPr>
@@ -571,8 +521,8 @@
         </p:nvSpPr>
         <p:spPr>
           <a:xfrm>
-            <a:off x="8724900" y="365125"/>
-            <a:ext cx="2628900" cy="5811838"/>
+            <a:off x="10305152" y="383297"/>
+            <a:ext cx="3105046" cy="6101085"/>
           </a:xfrm>
         </p:spPr>
         <p:txBody>
@@ -583,18 +533,13 @@
               <a:rPr lang="en-GB"/>
               <a:t>Click to edit Master title style</a:t>
             </a:r>
+            <a:endParaRPr lang="en-US" dirty="0"/>
           </a:p>
         </p:txBody>
       </p:sp>
       <p:sp>
         <p:nvSpPr>
-          <p:cNvPr id="3" name="Vertical Text Placeholder 2">
-            <a:extLst>
-              <a:ext uri="{FF2B5EF4-FFF2-40B4-BE49-F238E27FC236}">
-                <a16:creationId xmlns:a16="http://schemas.microsoft.com/office/drawing/2014/main" id="{9D0B8FCE-83E4-174C-86A1-979C41D40EC8}"/>
-              </a:ext>
-            </a:extLst>
-          </p:cNvPr>
+          <p:cNvPr id="3" name="Vertical Text Placeholder 2"/>
           <p:cNvSpPr>
             <a:spLocks noGrp="1"/>
           </p:cNvSpPr>
@@ -604,8 +549,8 @@
         </p:nvSpPr>
         <p:spPr>
           <a:xfrm>
-            <a:off x="838200" y="365125"/>
-            <a:ext cx="7734300" cy="5811838"/>
+            <a:off x="990015" y="383297"/>
+            <a:ext cx="9135135" cy="6101085"/>
           </a:xfrm>
         </p:spPr>
         <p:txBody>
@@ -645,18 +590,13 @@
               <a:rPr lang="en-GB"/>
               <a:t>Fifth level</a:t>
             </a:r>
+            <a:endParaRPr lang="en-US" dirty="0"/>
           </a:p>
         </p:txBody>
       </p:sp>
       <p:sp>
         <p:nvSpPr>
-          <p:cNvPr id="4" name="Date Placeholder 3">
-            <a:extLst>
-              <a:ext uri="{FF2B5EF4-FFF2-40B4-BE49-F238E27FC236}">
-                <a16:creationId xmlns:a16="http://schemas.microsoft.com/office/drawing/2014/main" id="{6E8BBFFD-1DAD-4B4E-ACB9-FA81939384F5}"/>
-              </a:ext>
-            </a:extLst>
-          </p:cNvPr>
+          <p:cNvPr id="4" name="Date Placeholder 3"/>
           <p:cNvSpPr>
             <a:spLocks noGrp="1"/>
           </p:cNvSpPr>
@@ -679,13 +619,7 @@
       </p:sp>
       <p:sp>
         <p:nvSpPr>
-          <p:cNvPr id="5" name="Footer Placeholder 4">
-            <a:extLst>
-              <a:ext uri="{FF2B5EF4-FFF2-40B4-BE49-F238E27FC236}">
-                <a16:creationId xmlns:a16="http://schemas.microsoft.com/office/drawing/2014/main" id="{DA9F7D81-0D19-6045-A7C4-EE6241264988}"/>
-              </a:ext>
-            </a:extLst>
-          </p:cNvPr>
+          <p:cNvPr id="5" name="Footer Placeholder 4"/>
           <p:cNvSpPr>
             <a:spLocks noGrp="1"/>
           </p:cNvSpPr>
@@ -704,13 +638,7 @@
       </p:sp>
       <p:sp>
         <p:nvSpPr>
-          <p:cNvPr id="6" name="Slide Number Placeholder 5">
-            <a:extLst>
-              <a:ext uri="{FF2B5EF4-FFF2-40B4-BE49-F238E27FC236}">
-                <a16:creationId xmlns:a16="http://schemas.microsoft.com/office/drawing/2014/main" id="{D601CE9A-64A4-A747-98EC-BF446DF1E81C}"/>
-              </a:ext>
-            </a:extLst>
-          </p:cNvPr>
+          <p:cNvPr id="6" name="Slide Number Placeholder 5"/>
           <p:cNvSpPr>
             <a:spLocks noGrp="1"/>
           </p:cNvSpPr>
@@ -734,7 +662,7 @@
     </p:spTree>
     <p:extLst>
       <p:ext uri="{BB962C8B-B14F-4D97-AF65-F5344CB8AC3E}">
-        <p14:creationId xmlns:p14="http://schemas.microsoft.com/office/powerpoint/2010/main" val="3557802020"/>
+        <p14:creationId xmlns:p14="http://schemas.microsoft.com/office/powerpoint/2010/main" val="2069950415"/>
       </p:ext>
     </p:extLst>
   </p:cSld>
@@ -763,13 +691,7 @@
       </p:grpSpPr>
       <p:sp>
         <p:nvSpPr>
-          <p:cNvPr id="2" name="Title 1">
-            <a:extLst>
-              <a:ext uri="{FF2B5EF4-FFF2-40B4-BE49-F238E27FC236}">
-                <a16:creationId xmlns:a16="http://schemas.microsoft.com/office/drawing/2014/main" id="{26DE5CFF-10D3-FC4A-BA56-85D01BC10FAC}"/>
-              </a:ext>
-            </a:extLst>
-          </p:cNvPr>
+          <p:cNvPr id="2" name="Title 1"/>
           <p:cNvSpPr>
             <a:spLocks noGrp="1"/>
           </p:cNvSpPr>
@@ -786,18 +708,13 @@
               <a:rPr lang="en-GB"/>
               <a:t>Click to edit Master title style</a:t>
             </a:r>
+            <a:endParaRPr lang="en-US" dirty="0"/>
           </a:p>
         </p:txBody>
       </p:sp>
       <p:sp>
         <p:nvSpPr>
-          <p:cNvPr id="3" name="Content Placeholder 2">
-            <a:extLst>
-              <a:ext uri="{FF2B5EF4-FFF2-40B4-BE49-F238E27FC236}">
-                <a16:creationId xmlns:a16="http://schemas.microsoft.com/office/drawing/2014/main" id="{3D516918-7FF9-1543-9478-31407C3EFC97}"/>
-              </a:ext>
-            </a:extLst>
-          </p:cNvPr>
+          <p:cNvPr id="3" name="Content Placeholder 2"/>
           <p:cNvSpPr>
             <a:spLocks noGrp="1"/>
           </p:cNvSpPr>
@@ -843,18 +760,13 @@
               <a:rPr lang="en-GB"/>
               <a:t>Fifth level</a:t>
             </a:r>
+            <a:endParaRPr lang="en-US" dirty="0"/>
           </a:p>
         </p:txBody>
       </p:sp>
       <p:sp>
         <p:nvSpPr>
-          <p:cNvPr id="4" name="Date Placeholder 3">
-            <a:extLst>
-              <a:ext uri="{FF2B5EF4-FFF2-40B4-BE49-F238E27FC236}">
-                <a16:creationId xmlns:a16="http://schemas.microsoft.com/office/drawing/2014/main" id="{93B08119-A867-F047-BA89-13132EBE42DB}"/>
-              </a:ext>
-            </a:extLst>
-          </p:cNvPr>
+          <p:cNvPr id="4" name="Date Placeholder 3"/>
           <p:cNvSpPr>
             <a:spLocks noGrp="1"/>
           </p:cNvSpPr>
@@ -877,13 +789,7 @@
       </p:sp>
       <p:sp>
         <p:nvSpPr>
-          <p:cNvPr id="5" name="Footer Placeholder 4">
-            <a:extLst>
-              <a:ext uri="{FF2B5EF4-FFF2-40B4-BE49-F238E27FC236}">
-                <a16:creationId xmlns:a16="http://schemas.microsoft.com/office/drawing/2014/main" id="{AEE19C19-22E2-8640-99A8-27319B874A2B}"/>
-              </a:ext>
-            </a:extLst>
-          </p:cNvPr>
+          <p:cNvPr id="5" name="Footer Placeholder 4"/>
           <p:cNvSpPr>
             <a:spLocks noGrp="1"/>
           </p:cNvSpPr>
@@ -902,13 +808,7 @@
       </p:sp>
       <p:sp>
         <p:nvSpPr>
-          <p:cNvPr id="6" name="Slide Number Placeholder 5">
-            <a:extLst>
-              <a:ext uri="{FF2B5EF4-FFF2-40B4-BE49-F238E27FC236}">
-                <a16:creationId xmlns:a16="http://schemas.microsoft.com/office/drawing/2014/main" id="{6F7018B5-B87D-D846-9832-F041D21651D1}"/>
-              </a:ext>
-            </a:extLst>
-          </p:cNvPr>
+          <p:cNvPr id="6" name="Slide Number Placeholder 5"/>
           <p:cNvSpPr>
             <a:spLocks noGrp="1"/>
           </p:cNvSpPr>
@@ -932,7 +832,7 @@
     </p:spTree>
     <p:extLst>
       <p:ext uri="{BB962C8B-B14F-4D97-AF65-F5344CB8AC3E}">
-        <p14:creationId xmlns:p14="http://schemas.microsoft.com/office/powerpoint/2010/main" val="3147325333"/>
+        <p14:creationId xmlns:p14="http://schemas.microsoft.com/office/powerpoint/2010/main" val="3350724488"/>
       </p:ext>
     </p:extLst>
   </p:cSld>
@@ -961,13 +861,7 @@
       </p:grpSpPr>
       <p:sp>
         <p:nvSpPr>
-          <p:cNvPr id="2" name="Title 1">
-            <a:extLst>
-              <a:ext uri="{FF2B5EF4-FFF2-40B4-BE49-F238E27FC236}">
-                <a16:creationId xmlns:a16="http://schemas.microsoft.com/office/drawing/2014/main" id="{90C8A624-8AB5-0C43-B127-E2743D88A433}"/>
-              </a:ext>
-            </a:extLst>
-          </p:cNvPr>
+          <p:cNvPr id="2" name="Title 1"/>
           <p:cNvSpPr>
             <a:spLocks noGrp="1"/>
           </p:cNvSpPr>
@@ -977,15 +871,15 @@
         </p:nvSpPr>
         <p:spPr>
           <a:xfrm>
-            <a:off x="831850" y="1709738"/>
-            <a:ext cx="10515600" cy="2852737"/>
+            <a:off x="982514" y="1794830"/>
+            <a:ext cx="12420184" cy="2994714"/>
           </a:xfrm>
         </p:spPr>
         <p:txBody>
           <a:bodyPr anchor="b"/>
           <a:lstStyle>
             <a:lvl1pPr>
-              <a:defRPr sz="6000"/>
+              <a:defRPr sz="6299"/>
             </a:lvl1pPr>
           </a:lstStyle>
           <a:p>
@@ -993,18 +887,13 @@
               <a:rPr lang="en-GB"/>
               <a:t>Click to edit Master title style</a:t>
             </a:r>
+            <a:endParaRPr lang="en-US" dirty="0"/>
           </a:p>
         </p:txBody>
       </p:sp>
       <p:sp>
         <p:nvSpPr>
-          <p:cNvPr id="3" name="Text Placeholder 2">
-            <a:extLst>
-              <a:ext uri="{FF2B5EF4-FFF2-40B4-BE49-F238E27FC236}">
-                <a16:creationId xmlns:a16="http://schemas.microsoft.com/office/drawing/2014/main" id="{386BE865-0168-E149-A32F-786DAF80E7B5}"/>
-              </a:ext>
-            </a:extLst>
-          </p:cNvPr>
+          <p:cNvPr id="3" name="Text Placeholder 2"/>
           <p:cNvSpPr>
             <a:spLocks noGrp="1"/>
           </p:cNvSpPr>
@@ -1014,8 +903,8 @@
         </p:nvSpPr>
         <p:spPr>
           <a:xfrm>
-            <a:off x="831850" y="4589463"/>
-            <a:ext cx="10515600" cy="1500187"/>
+            <a:off x="982514" y="4817875"/>
+            <a:ext cx="12420184" cy="1574849"/>
           </a:xfrm>
         </p:spPr>
         <p:txBody>
@@ -1023,7 +912,7 @@
           <a:lstStyle>
             <a:lvl1pPr marL="0" indent="0">
               <a:buNone/>
-              <a:defRPr sz="2400">
+              <a:defRPr sz="2520">
                 <a:solidFill>
                   <a:schemeClr val="tx1">
                     <a:tint val="75000"/>
@@ -1031,9 +920,9 @@
                 </a:solidFill>
               </a:defRPr>
             </a:lvl1pPr>
-            <a:lvl2pPr marL="457200" indent="0">
+            <a:lvl2pPr marL="479969" indent="0">
               <a:buNone/>
-              <a:defRPr sz="2000">
+              <a:defRPr sz="2100">
                 <a:solidFill>
                   <a:schemeClr val="tx1">
                     <a:tint val="75000"/>
@@ -1041,9 +930,9 @@
                 </a:solidFill>
               </a:defRPr>
             </a:lvl2pPr>
-            <a:lvl3pPr marL="914400" indent="0">
+            <a:lvl3pPr marL="959937" indent="0">
               <a:buNone/>
-              <a:defRPr sz="1800">
+              <a:defRPr sz="1890">
                 <a:solidFill>
                   <a:schemeClr val="tx1">
                     <a:tint val="75000"/>
@@ -1051,9 +940,9 @@
                 </a:solidFill>
               </a:defRPr>
             </a:lvl3pPr>
-            <a:lvl4pPr marL="1371600" indent="0">
+            <a:lvl4pPr marL="1439906" indent="0">
               <a:buNone/>
-              <a:defRPr sz="1600">
+              <a:defRPr sz="1680">
                 <a:solidFill>
                   <a:schemeClr val="tx1">
                     <a:tint val="75000"/>
@@ -1061,9 +950,9 @@
                 </a:solidFill>
               </a:defRPr>
             </a:lvl4pPr>
-            <a:lvl5pPr marL="1828800" indent="0">
+            <a:lvl5pPr marL="1919874" indent="0">
               <a:buNone/>
-              <a:defRPr sz="1600">
+              <a:defRPr sz="1680">
                 <a:solidFill>
                   <a:schemeClr val="tx1">
                     <a:tint val="75000"/>
@@ -1071,9 +960,9 @@
                 </a:solidFill>
               </a:defRPr>
             </a:lvl5pPr>
-            <a:lvl6pPr marL="2286000" indent="0">
+            <a:lvl6pPr marL="2399843" indent="0">
               <a:buNone/>
-              <a:defRPr sz="1600">
+              <a:defRPr sz="1680">
                 <a:solidFill>
                   <a:schemeClr val="tx1">
                     <a:tint val="75000"/>
@@ -1081,9 +970,9 @@
                 </a:solidFill>
               </a:defRPr>
             </a:lvl6pPr>
-            <a:lvl7pPr marL="2743200" indent="0">
+            <a:lvl7pPr marL="2879811" indent="0">
               <a:buNone/>
-              <a:defRPr sz="1600">
+              <a:defRPr sz="1680">
                 <a:solidFill>
                   <a:schemeClr val="tx1">
                     <a:tint val="75000"/>
@@ -1091,9 +980,9 @@
                 </a:solidFill>
               </a:defRPr>
             </a:lvl7pPr>
-            <a:lvl8pPr marL="3200400" indent="0">
+            <a:lvl8pPr marL="3359780" indent="0">
               <a:buNone/>
-              <a:defRPr sz="1600">
+              <a:defRPr sz="1680">
                 <a:solidFill>
                   <a:schemeClr val="tx1">
                     <a:tint val="75000"/>
@@ -1101,9 +990,9 @@
                 </a:solidFill>
               </a:defRPr>
             </a:lvl8pPr>
-            <a:lvl9pPr marL="3657600" indent="0">
+            <a:lvl9pPr marL="3839748" indent="0">
               <a:buNone/>
-              <a:defRPr sz="1600">
+              <a:defRPr sz="1680">
                 <a:solidFill>
                   <a:schemeClr val="tx1">
                     <a:tint val="75000"/>
@@ -1123,13 +1012,7 @@
       </p:sp>
       <p:sp>
         <p:nvSpPr>
-          <p:cNvPr id="4" name="Date Placeholder 3">
-            <a:extLst>
-              <a:ext uri="{FF2B5EF4-FFF2-40B4-BE49-F238E27FC236}">
-                <a16:creationId xmlns:a16="http://schemas.microsoft.com/office/drawing/2014/main" id="{31EE0FDC-9754-F141-AFB9-13EFEA4B6832}"/>
-              </a:ext>
-            </a:extLst>
-          </p:cNvPr>
+          <p:cNvPr id="4" name="Date Placeholder 3"/>
           <p:cNvSpPr>
             <a:spLocks noGrp="1"/>
           </p:cNvSpPr>
@@ -1152,13 +1035,7 @@
       </p:sp>
       <p:sp>
         <p:nvSpPr>
-          <p:cNvPr id="5" name="Footer Placeholder 4">
-            <a:extLst>
-              <a:ext uri="{FF2B5EF4-FFF2-40B4-BE49-F238E27FC236}">
-                <a16:creationId xmlns:a16="http://schemas.microsoft.com/office/drawing/2014/main" id="{7954FFB6-4D9E-B244-91A4-5C35E603D4C6}"/>
-              </a:ext>
-            </a:extLst>
-          </p:cNvPr>
+          <p:cNvPr id="5" name="Footer Placeholder 4"/>
           <p:cNvSpPr>
             <a:spLocks noGrp="1"/>
           </p:cNvSpPr>
@@ -1177,13 +1054,7 @@
       </p:sp>
       <p:sp>
         <p:nvSpPr>
-          <p:cNvPr id="6" name="Slide Number Placeholder 5">
-            <a:extLst>
-              <a:ext uri="{FF2B5EF4-FFF2-40B4-BE49-F238E27FC236}">
-                <a16:creationId xmlns:a16="http://schemas.microsoft.com/office/drawing/2014/main" id="{9AF52146-2E1B-5D48-8C34-0C16C109C493}"/>
-              </a:ext>
-            </a:extLst>
-          </p:cNvPr>
+          <p:cNvPr id="6" name="Slide Number Placeholder 5"/>
           <p:cNvSpPr>
             <a:spLocks noGrp="1"/>
           </p:cNvSpPr>
@@ -1207,7 +1078,7 @@
     </p:spTree>
     <p:extLst>
       <p:ext uri="{BB962C8B-B14F-4D97-AF65-F5344CB8AC3E}">
-        <p14:creationId xmlns:p14="http://schemas.microsoft.com/office/powerpoint/2010/main" val="3363838862"/>
+        <p14:creationId xmlns:p14="http://schemas.microsoft.com/office/powerpoint/2010/main" val="2841208544"/>
       </p:ext>
     </p:extLst>
   </p:cSld>
@@ -1236,13 +1107,7 @@
       </p:grpSpPr>
       <p:sp>
         <p:nvSpPr>
-          <p:cNvPr id="2" name="Title 1">
-            <a:extLst>
-              <a:ext uri="{FF2B5EF4-FFF2-40B4-BE49-F238E27FC236}">
-                <a16:creationId xmlns:a16="http://schemas.microsoft.com/office/drawing/2014/main" id="{13DB6889-46B6-C243-A212-A2F790F3DD35}"/>
-              </a:ext>
-            </a:extLst>
-          </p:cNvPr>
+          <p:cNvPr id="2" name="Title 1"/>
           <p:cNvSpPr>
             <a:spLocks noGrp="1"/>
           </p:cNvSpPr>
@@ -1259,18 +1124,13 @@
               <a:rPr lang="en-GB"/>
               <a:t>Click to edit Master title style</a:t>
             </a:r>
+            <a:endParaRPr lang="en-US" dirty="0"/>
           </a:p>
         </p:txBody>
       </p:sp>
       <p:sp>
         <p:nvSpPr>
-          <p:cNvPr id="3" name="Content Placeholder 2">
-            <a:extLst>
-              <a:ext uri="{FF2B5EF4-FFF2-40B4-BE49-F238E27FC236}">
-                <a16:creationId xmlns:a16="http://schemas.microsoft.com/office/drawing/2014/main" id="{6FCB152B-A01E-8F41-84AE-74EB9136A7ED}"/>
-              </a:ext>
-            </a:extLst>
-          </p:cNvPr>
+          <p:cNvPr id="3" name="Content Placeholder 2"/>
           <p:cNvSpPr>
             <a:spLocks noGrp="1"/>
           </p:cNvSpPr>
@@ -1280,8 +1140,8 @@
         </p:nvSpPr>
         <p:spPr>
           <a:xfrm>
-            <a:off x="838200" y="1825625"/>
-            <a:ext cx="5181600" cy="4351338"/>
+            <a:off x="990014" y="1916484"/>
+            <a:ext cx="6120091" cy="4567898"/>
           </a:xfrm>
         </p:spPr>
         <p:txBody>
@@ -1321,18 +1181,13 @@
               <a:rPr lang="en-GB"/>
               <a:t>Fifth level</a:t>
             </a:r>
+            <a:endParaRPr lang="en-US" dirty="0"/>
           </a:p>
         </p:txBody>
       </p:sp>
       <p:sp>
         <p:nvSpPr>
-          <p:cNvPr id="4" name="Content Placeholder 3">
-            <a:extLst>
-              <a:ext uri="{FF2B5EF4-FFF2-40B4-BE49-F238E27FC236}">
-                <a16:creationId xmlns:a16="http://schemas.microsoft.com/office/drawing/2014/main" id="{C0B12FC9-595E-124D-BCC6-1471C3C71970}"/>
-              </a:ext>
-            </a:extLst>
-          </p:cNvPr>
+          <p:cNvPr id="4" name="Content Placeholder 3"/>
           <p:cNvSpPr>
             <a:spLocks noGrp="1"/>
           </p:cNvSpPr>
@@ -1342,8 +1197,8 @@
         </p:nvSpPr>
         <p:spPr>
           <a:xfrm>
-            <a:off x="6172200" y="1825625"/>
-            <a:ext cx="5181600" cy="4351338"/>
+            <a:off x="7290108" y="1916484"/>
+            <a:ext cx="6120091" cy="4567898"/>
           </a:xfrm>
         </p:spPr>
         <p:txBody>
@@ -1383,18 +1238,13 @@
               <a:rPr lang="en-GB"/>
               <a:t>Fifth level</a:t>
             </a:r>
+            <a:endParaRPr lang="en-US" dirty="0"/>
           </a:p>
         </p:txBody>
       </p:sp>
       <p:sp>
         <p:nvSpPr>
-          <p:cNvPr id="5" name="Date Placeholder 4">
-            <a:extLst>
-              <a:ext uri="{FF2B5EF4-FFF2-40B4-BE49-F238E27FC236}">
-                <a16:creationId xmlns:a16="http://schemas.microsoft.com/office/drawing/2014/main" id="{17CD7797-CBE1-BF48-B239-11F1A14FE911}"/>
-              </a:ext>
-            </a:extLst>
-          </p:cNvPr>
+          <p:cNvPr id="5" name="Date Placeholder 4"/>
           <p:cNvSpPr>
             <a:spLocks noGrp="1"/>
           </p:cNvSpPr>
@@ -1417,13 +1267,7 @@
       </p:sp>
       <p:sp>
         <p:nvSpPr>
-          <p:cNvPr id="6" name="Footer Placeholder 5">
-            <a:extLst>
-              <a:ext uri="{FF2B5EF4-FFF2-40B4-BE49-F238E27FC236}">
-                <a16:creationId xmlns:a16="http://schemas.microsoft.com/office/drawing/2014/main" id="{87BCEC61-BE21-1F4B-9CD4-CEE38C7A251F}"/>
-              </a:ext>
-            </a:extLst>
-          </p:cNvPr>
+          <p:cNvPr id="6" name="Footer Placeholder 5"/>
           <p:cNvSpPr>
             <a:spLocks noGrp="1"/>
           </p:cNvSpPr>
@@ -1442,13 +1286,7 @@
       </p:sp>
       <p:sp>
         <p:nvSpPr>
-          <p:cNvPr id="7" name="Slide Number Placeholder 6">
-            <a:extLst>
-              <a:ext uri="{FF2B5EF4-FFF2-40B4-BE49-F238E27FC236}">
-                <a16:creationId xmlns:a16="http://schemas.microsoft.com/office/drawing/2014/main" id="{8C513EE8-B15D-3445-B6BF-D73BE2728A77}"/>
-              </a:ext>
-            </a:extLst>
-          </p:cNvPr>
+          <p:cNvPr id="7" name="Slide Number Placeholder 6"/>
           <p:cNvSpPr>
             <a:spLocks noGrp="1"/>
           </p:cNvSpPr>
@@ -1472,7 +1310,7 @@
     </p:spTree>
     <p:extLst>
       <p:ext uri="{BB962C8B-B14F-4D97-AF65-F5344CB8AC3E}">
-        <p14:creationId xmlns:p14="http://schemas.microsoft.com/office/powerpoint/2010/main" val="4043562010"/>
+        <p14:creationId xmlns:p14="http://schemas.microsoft.com/office/powerpoint/2010/main" val="3814950915"/>
       </p:ext>
     </p:extLst>
   </p:cSld>
@@ -1501,13 +1339,7 @@
       </p:grpSpPr>
       <p:sp>
         <p:nvSpPr>
-          <p:cNvPr id="2" name="Title 1">
-            <a:extLst>
-              <a:ext uri="{FF2B5EF4-FFF2-40B4-BE49-F238E27FC236}">
-                <a16:creationId xmlns:a16="http://schemas.microsoft.com/office/drawing/2014/main" id="{0610690C-0424-BD4B-B84E-92D46DD51AC8}"/>
-              </a:ext>
-            </a:extLst>
-          </p:cNvPr>
+          <p:cNvPr id="2" name="Title 1"/>
           <p:cNvSpPr>
             <a:spLocks noGrp="1"/>
           </p:cNvSpPr>
@@ -1517,8 +1349,8 @@
         </p:nvSpPr>
         <p:spPr>
           <a:xfrm>
-            <a:off x="839788" y="365125"/>
-            <a:ext cx="10515600" cy="1325563"/>
+            <a:off x="991890" y="383297"/>
+            <a:ext cx="12420184" cy="1391534"/>
           </a:xfrm>
         </p:spPr>
         <p:txBody>
@@ -1529,18 +1361,13 @@
               <a:rPr lang="en-GB"/>
               <a:t>Click to edit Master title style</a:t>
             </a:r>
+            <a:endParaRPr lang="en-US" dirty="0"/>
           </a:p>
         </p:txBody>
       </p:sp>
       <p:sp>
         <p:nvSpPr>
-          <p:cNvPr id="3" name="Text Placeholder 2">
-            <a:extLst>
-              <a:ext uri="{FF2B5EF4-FFF2-40B4-BE49-F238E27FC236}">
-                <a16:creationId xmlns:a16="http://schemas.microsoft.com/office/drawing/2014/main" id="{9021DE7E-B136-6C42-80E8-043472422670}"/>
-              </a:ext>
-            </a:extLst>
-          </p:cNvPr>
+          <p:cNvPr id="3" name="Text Placeholder 2"/>
           <p:cNvSpPr>
             <a:spLocks noGrp="1"/>
           </p:cNvSpPr>
@@ -1550,8 +1377,8 @@
         </p:nvSpPr>
         <p:spPr>
           <a:xfrm>
-            <a:off x="839788" y="1681163"/>
-            <a:ext cx="5157787" cy="823912"/>
+            <a:off x="991891" y="1764832"/>
+            <a:ext cx="6091965" cy="864917"/>
           </a:xfrm>
         </p:spPr>
         <p:txBody>
@@ -1559,39 +1386,39 @@
           <a:lstStyle>
             <a:lvl1pPr marL="0" indent="0">
               <a:buNone/>
-              <a:defRPr sz="2400" b="1"/>
+              <a:defRPr sz="2520" b="1"/>
             </a:lvl1pPr>
-            <a:lvl2pPr marL="457200" indent="0">
+            <a:lvl2pPr marL="479969" indent="0">
               <a:buNone/>
-              <a:defRPr sz="2000" b="1"/>
+              <a:defRPr sz="2100" b="1"/>
             </a:lvl2pPr>
-            <a:lvl3pPr marL="914400" indent="0">
+            <a:lvl3pPr marL="959937" indent="0">
               <a:buNone/>
-              <a:defRPr sz="1800" b="1"/>
+              <a:defRPr sz="1890" b="1"/>
             </a:lvl3pPr>
-            <a:lvl4pPr marL="1371600" indent="0">
+            <a:lvl4pPr marL="1439906" indent="0">
               <a:buNone/>
-              <a:defRPr sz="1600" b="1"/>
+              <a:defRPr sz="1680" b="1"/>
             </a:lvl4pPr>
-            <a:lvl5pPr marL="1828800" indent="0">
+            <a:lvl5pPr marL="1919874" indent="0">
               <a:buNone/>
-              <a:defRPr sz="1600" b="1"/>
+              <a:defRPr sz="1680" b="1"/>
             </a:lvl5pPr>
-            <a:lvl6pPr marL="2286000" indent="0">
+            <a:lvl6pPr marL="2399843" indent="0">
               <a:buNone/>
-              <a:defRPr sz="1600" b="1"/>
+              <a:defRPr sz="1680" b="1"/>
             </a:lvl6pPr>
-            <a:lvl7pPr marL="2743200" indent="0">
+            <a:lvl7pPr marL="2879811" indent="0">
               <a:buNone/>
-              <a:defRPr sz="1600" b="1"/>
+              <a:defRPr sz="1680" b="1"/>
             </a:lvl7pPr>
-            <a:lvl8pPr marL="3200400" indent="0">
+            <a:lvl8pPr marL="3359780" indent="0">
               <a:buNone/>
-              <a:defRPr sz="1600" b="1"/>
+              <a:defRPr sz="1680" b="1"/>
             </a:lvl8pPr>
-            <a:lvl9pPr marL="3657600" indent="0">
+            <a:lvl9pPr marL="3839748" indent="0">
               <a:buNone/>
-              <a:defRPr sz="1600" b="1"/>
+              <a:defRPr sz="1680" b="1"/>
             </a:lvl9pPr>
           </a:lstStyle>
           <a:p>
@@ -1605,13 +1432,7 @@
       </p:sp>
       <p:sp>
         <p:nvSpPr>
-          <p:cNvPr id="4" name="Content Placeholder 3">
-            <a:extLst>
-              <a:ext uri="{FF2B5EF4-FFF2-40B4-BE49-F238E27FC236}">
-                <a16:creationId xmlns:a16="http://schemas.microsoft.com/office/drawing/2014/main" id="{4FF610FB-9DC7-B14D-82BD-A993E16876A8}"/>
-              </a:ext>
-            </a:extLst>
-          </p:cNvPr>
+          <p:cNvPr id="4" name="Content Placeholder 3"/>
           <p:cNvSpPr>
             <a:spLocks noGrp="1"/>
           </p:cNvSpPr>
@@ -1621,8 +1442,8 @@
         </p:nvSpPr>
         <p:spPr>
           <a:xfrm>
-            <a:off x="839788" y="2505075"/>
-            <a:ext cx="5157787" cy="3684588"/>
+            <a:off x="991891" y="2629749"/>
+            <a:ext cx="6091965" cy="3867965"/>
           </a:xfrm>
         </p:spPr>
         <p:txBody>
@@ -1662,18 +1483,13 @@
               <a:rPr lang="en-GB"/>
               <a:t>Fifth level</a:t>
             </a:r>
+            <a:endParaRPr lang="en-US" dirty="0"/>
           </a:p>
         </p:txBody>
       </p:sp>
       <p:sp>
         <p:nvSpPr>
-          <p:cNvPr id="5" name="Text Placeholder 4">
-            <a:extLst>
-              <a:ext uri="{FF2B5EF4-FFF2-40B4-BE49-F238E27FC236}">
-                <a16:creationId xmlns:a16="http://schemas.microsoft.com/office/drawing/2014/main" id="{BDBBB128-DBE2-DC41-9CD9-4E6F04393BC9}"/>
-              </a:ext>
-            </a:extLst>
-          </p:cNvPr>
+          <p:cNvPr id="5" name="Text Placeholder 4"/>
           <p:cNvSpPr>
             <a:spLocks noGrp="1"/>
           </p:cNvSpPr>
@@ -1683,8 +1499,8 @@
         </p:nvSpPr>
         <p:spPr>
           <a:xfrm>
-            <a:off x="6172200" y="1681163"/>
-            <a:ext cx="5183188" cy="823912"/>
+            <a:off x="7290108" y="1764832"/>
+            <a:ext cx="6121966" cy="864917"/>
           </a:xfrm>
         </p:spPr>
         <p:txBody>
@@ -1692,39 +1508,39 @@
           <a:lstStyle>
             <a:lvl1pPr marL="0" indent="0">
               <a:buNone/>
-              <a:defRPr sz="2400" b="1"/>
+              <a:defRPr sz="2520" b="1"/>
             </a:lvl1pPr>
-            <a:lvl2pPr marL="457200" indent="0">
+            <a:lvl2pPr marL="479969" indent="0">
               <a:buNone/>
-              <a:defRPr sz="2000" b="1"/>
+              <a:defRPr sz="2100" b="1"/>
             </a:lvl2pPr>
-            <a:lvl3pPr marL="914400" indent="0">
+            <a:lvl3pPr marL="959937" indent="0">
               <a:buNone/>
-              <a:defRPr sz="1800" b="1"/>
+              <a:defRPr sz="1890" b="1"/>
             </a:lvl3pPr>
-            <a:lvl4pPr marL="1371600" indent="0">
+            <a:lvl4pPr marL="1439906" indent="0">
               <a:buNone/>
-              <a:defRPr sz="1600" b="1"/>
+              <a:defRPr sz="1680" b="1"/>
             </a:lvl4pPr>
-            <a:lvl5pPr marL="1828800" indent="0">
+            <a:lvl5pPr marL="1919874" indent="0">
               <a:buNone/>
-              <a:defRPr sz="1600" b="1"/>
+              <a:defRPr sz="1680" b="1"/>
             </a:lvl5pPr>
-            <a:lvl6pPr marL="2286000" indent="0">
+            <a:lvl6pPr marL="2399843" indent="0">
               <a:buNone/>
-              <a:defRPr sz="1600" b="1"/>
+              <a:defRPr sz="1680" b="1"/>
             </a:lvl6pPr>
-            <a:lvl7pPr marL="2743200" indent="0">
+            <a:lvl7pPr marL="2879811" indent="0">
               <a:buNone/>
-              <a:defRPr sz="1600" b="1"/>
+              <a:defRPr sz="1680" b="1"/>
             </a:lvl7pPr>
-            <a:lvl8pPr marL="3200400" indent="0">
+            <a:lvl8pPr marL="3359780" indent="0">
               <a:buNone/>
-              <a:defRPr sz="1600" b="1"/>
+              <a:defRPr sz="1680" b="1"/>
             </a:lvl8pPr>
-            <a:lvl9pPr marL="3657600" indent="0">
+            <a:lvl9pPr marL="3839748" indent="0">
               <a:buNone/>
-              <a:defRPr sz="1600" b="1"/>
+              <a:defRPr sz="1680" b="1"/>
             </a:lvl9pPr>
           </a:lstStyle>
           <a:p>
@@ -1738,13 +1554,7 @@
       </p:sp>
       <p:sp>
         <p:nvSpPr>
-          <p:cNvPr id="6" name="Content Placeholder 5">
-            <a:extLst>
-              <a:ext uri="{FF2B5EF4-FFF2-40B4-BE49-F238E27FC236}">
-                <a16:creationId xmlns:a16="http://schemas.microsoft.com/office/drawing/2014/main" id="{F87E3CA0-CB5A-E74C-B209-14DBFDEFB5E3}"/>
-              </a:ext>
-            </a:extLst>
-          </p:cNvPr>
+          <p:cNvPr id="6" name="Content Placeholder 5"/>
           <p:cNvSpPr>
             <a:spLocks noGrp="1"/>
           </p:cNvSpPr>
@@ -1754,8 +1564,8 @@
         </p:nvSpPr>
         <p:spPr>
           <a:xfrm>
-            <a:off x="6172200" y="2505075"/>
-            <a:ext cx="5183188" cy="3684588"/>
+            <a:off x="7290108" y="2629749"/>
+            <a:ext cx="6121966" cy="3867965"/>
           </a:xfrm>
         </p:spPr>
         <p:txBody>
@@ -1795,18 +1605,13 @@
               <a:rPr lang="en-GB"/>
               <a:t>Fifth level</a:t>
             </a:r>
+            <a:endParaRPr lang="en-US" dirty="0"/>
           </a:p>
         </p:txBody>
       </p:sp>
       <p:sp>
         <p:nvSpPr>
-          <p:cNvPr id="7" name="Date Placeholder 6">
-            <a:extLst>
-              <a:ext uri="{FF2B5EF4-FFF2-40B4-BE49-F238E27FC236}">
-                <a16:creationId xmlns:a16="http://schemas.microsoft.com/office/drawing/2014/main" id="{931BC713-5A01-8341-BF39-F64CC86A94A4}"/>
-              </a:ext>
-            </a:extLst>
-          </p:cNvPr>
+          <p:cNvPr id="7" name="Date Placeholder 6"/>
           <p:cNvSpPr>
             <a:spLocks noGrp="1"/>
           </p:cNvSpPr>
@@ -1829,13 +1634,7 @@
       </p:sp>
       <p:sp>
         <p:nvSpPr>
-          <p:cNvPr id="8" name="Footer Placeholder 7">
-            <a:extLst>
-              <a:ext uri="{FF2B5EF4-FFF2-40B4-BE49-F238E27FC236}">
-                <a16:creationId xmlns:a16="http://schemas.microsoft.com/office/drawing/2014/main" id="{5B02CD04-D1A6-5344-B800-CFC7ACFC6C65}"/>
-              </a:ext>
-            </a:extLst>
-          </p:cNvPr>
+          <p:cNvPr id="8" name="Footer Placeholder 7"/>
           <p:cNvSpPr>
             <a:spLocks noGrp="1"/>
           </p:cNvSpPr>
@@ -1854,13 +1653,7 @@
       </p:sp>
       <p:sp>
         <p:nvSpPr>
-          <p:cNvPr id="9" name="Slide Number Placeholder 8">
-            <a:extLst>
-              <a:ext uri="{FF2B5EF4-FFF2-40B4-BE49-F238E27FC236}">
-                <a16:creationId xmlns:a16="http://schemas.microsoft.com/office/drawing/2014/main" id="{F1167E5A-AB5A-0D4E-B61E-29B6A9880F19}"/>
-              </a:ext>
-            </a:extLst>
-          </p:cNvPr>
+          <p:cNvPr id="9" name="Slide Number Placeholder 8"/>
           <p:cNvSpPr>
             <a:spLocks noGrp="1"/>
           </p:cNvSpPr>
@@ -1884,7 +1677,7 @@
     </p:spTree>
     <p:extLst>
       <p:ext uri="{BB962C8B-B14F-4D97-AF65-F5344CB8AC3E}">
-        <p14:creationId xmlns:p14="http://schemas.microsoft.com/office/powerpoint/2010/main" val="3123384225"/>
+        <p14:creationId xmlns:p14="http://schemas.microsoft.com/office/powerpoint/2010/main" val="3392533698"/>
       </p:ext>
     </p:extLst>
   </p:cSld>
@@ -1913,13 +1706,7 @@
       </p:grpSpPr>
       <p:sp>
         <p:nvSpPr>
-          <p:cNvPr id="2" name="Title 1">
-            <a:extLst>
-              <a:ext uri="{FF2B5EF4-FFF2-40B4-BE49-F238E27FC236}">
-                <a16:creationId xmlns:a16="http://schemas.microsoft.com/office/drawing/2014/main" id="{83DB8CD4-A14A-3E4F-90C0-0F82AAB8DC9A}"/>
-              </a:ext>
-            </a:extLst>
-          </p:cNvPr>
+          <p:cNvPr id="2" name="Title 1"/>
           <p:cNvSpPr>
             <a:spLocks noGrp="1"/>
           </p:cNvSpPr>
@@ -1936,18 +1723,13 @@
               <a:rPr lang="en-GB"/>
               <a:t>Click to edit Master title style</a:t>
             </a:r>
+            <a:endParaRPr lang="en-US" dirty="0"/>
           </a:p>
         </p:txBody>
       </p:sp>
       <p:sp>
         <p:nvSpPr>
-          <p:cNvPr id="3" name="Date Placeholder 2">
-            <a:extLst>
-              <a:ext uri="{FF2B5EF4-FFF2-40B4-BE49-F238E27FC236}">
-                <a16:creationId xmlns:a16="http://schemas.microsoft.com/office/drawing/2014/main" id="{208491D9-1832-D744-B5B9-AE7FDFB74794}"/>
-              </a:ext>
-            </a:extLst>
-          </p:cNvPr>
+          <p:cNvPr id="3" name="Date Placeholder 2"/>
           <p:cNvSpPr>
             <a:spLocks noGrp="1"/>
           </p:cNvSpPr>
@@ -1970,13 +1752,7 @@
       </p:sp>
       <p:sp>
         <p:nvSpPr>
-          <p:cNvPr id="4" name="Footer Placeholder 3">
-            <a:extLst>
-              <a:ext uri="{FF2B5EF4-FFF2-40B4-BE49-F238E27FC236}">
-                <a16:creationId xmlns:a16="http://schemas.microsoft.com/office/drawing/2014/main" id="{69CBB453-E0BF-2A44-AD7A-6303F4C661A6}"/>
-              </a:ext>
-            </a:extLst>
-          </p:cNvPr>
+          <p:cNvPr id="4" name="Footer Placeholder 3"/>
           <p:cNvSpPr>
             <a:spLocks noGrp="1"/>
           </p:cNvSpPr>
@@ -1995,13 +1771,7 @@
       </p:sp>
       <p:sp>
         <p:nvSpPr>
-          <p:cNvPr id="5" name="Slide Number Placeholder 4">
-            <a:extLst>
-              <a:ext uri="{FF2B5EF4-FFF2-40B4-BE49-F238E27FC236}">
-                <a16:creationId xmlns:a16="http://schemas.microsoft.com/office/drawing/2014/main" id="{90732E4B-8C33-974C-9539-FFBA55CC48F6}"/>
-              </a:ext>
-            </a:extLst>
-          </p:cNvPr>
+          <p:cNvPr id="5" name="Slide Number Placeholder 4"/>
           <p:cNvSpPr>
             <a:spLocks noGrp="1"/>
           </p:cNvSpPr>
@@ -2025,7 +1795,7 @@
     </p:spTree>
     <p:extLst>
       <p:ext uri="{BB962C8B-B14F-4D97-AF65-F5344CB8AC3E}">
-        <p14:creationId xmlns:p14="http://schemas.microsoft.com/office/powerpoint/2010/main" val="1191860807"/>
+        <p14:creationId xmlns:p14="http://schemas.microsoft.com/office/powerpoint/2010/main" val="3369066082"/>
       </p:ext>
     </p:extLst>
   </p:cSld>
@@ -2054,13 +1824,7 @@
       </p:grpSpPr>
       <p:sp>
         <p:nvSpPr>
-          <p:cNvPr id="2" name="Date Placeholder 1">
-            <a:extLst>
-              <a:ext uri="{FF2B5EF4-FFF2-40B4-BE49-F238E27FC236}">
-                <a16:creationId xmlns:a16="http://schemas.microsoft.com/office/drawing/2014/main" id="{8E34CED8-B402-4D4E-9A6B-D12A95D427B7}"/>
-              </a:ext>
-            </a:extLst>
-          </p:cNvPr>
+          <p:cNvPr id="2" name="Date Placeholder 1"/>
           <p:cNvSpPr>
             <a:spLocks noGrp="1"/>
           </p:cNvSpPr>
@@ -2083,13 +1847,7 @@
       </p:sp>
       <p:sp>
         <p:nvSpPr>
-          <p:cNvPr id="3" name="Footer Placeholder 2">
-            <a:extLst>
-              <a:ext uri="{FF2B5EF4-FFF2-40B4-BE49-F238E27FC236}">
-                <a16:creationId xmlns:a16="http://schemas.microsoft.com/office/drawing/2014/main" id="{D315EC14-A219-824D-8590-0266E5B5E97B}"/>
-              </a:ext>
-            </a:extLst>
-          </p:cNvPr>
+          <p:cNvPr id="3" name="Footer Placeholder 2"/>
           <p:cNvSpPr>
             <a:spLocks noGrp="1"/>
           </p:cNvSpPr>
@@ -2108,13 +1866,7 @@
       </p:sp>
       <p:sp>
         <p:nvSpPr>
-          <p:cNvPr id="4" name="Slide Number Placeholder 3">
-            <a:extLst>
-              <a:ext uri="{FF2B5EF4-FFF2-40B4-BE49-F238E27FC236}">
-                <a16:creationId xmlns:a16="http://schemas.microsoft.com/office/drawing/2014/main" id="{766504C4-A5AF-5448-91A3-122DB4B41E6C}"/>
-              </a:ext>
-            </a:extLst>
-          </p:cNvPr>
+          <p:cNvPr id="4" name="Slide Number Placeholder 3"/>
           <p:cNvSpPr>
             <a:spLocks noGrp="1"/>
           </p:cNvSpPr>
@@ -2138,7 +1890,7 @@
     </p:spTree>
     <p:extLst>
       <p:ext uri="{BB962C8B-B14F-4D97-AF65-F5344CB8AC3E}">
-        <p14:creationId xmlns:p14="http://schemas.microsoft.com/office/powerpoint/2010/main" val="2626292836"/>
+        <p14:creationId xmlns:p14="http://schemas.microsoft.com/office/powerpoint/2010/main" val="490143996"/>
       </p:ext>
     </p:extLst>
   </p:cSld>
@@ -2167,13 +1919,7 @@
       </p:grpSpPr>
       <p:sp>
         <p:nvSpPr>
-          <p:cNvPr id="2" name="Title 1">
-            <a:extLst>
-              <a:ext uri="{FF2B5EF4-FFF2-40B4-BE49-F238E27FC236}">
-                <a16:creationId xmlns:a16="http://schemas.microsoft.com/office/drawing/2014/main" id="{5E0B70F2-B4CD-C849-AF6C-3872AAA87D24}"/>
-              </a:ext>
-            </a:extLst>
-          </p:cNvPr>
+          <p:cNvPr id="2" name="Title 1"/>
           <p:cNvSpPr>
             <a:spLocks noGrp="1"/>
           </p:cNvSpPr>
@@ -2183,15 +1929,15 @@
         </p:nvSpPr>
         <p:spPr>
           <a:xfrm>
-            <a:off x="839788" y="457200"/>
-            <a:ext cx="3932237" cy="1600200"/>
+            <a:off x="991891" y="479954"/>
+            <a:ext cx="4644443" cy="1679840"/>
           </a:xfrm>
         </p:spPr>
         <p:txBody>
           <a:bodyPr anchor="b"/>
           <a:lstStyle>
             <a:lvl1pPr>
-              <a:defRPr sz="3200"/>
+              <a:defRPr sz="3359"/>
             </a:lvl1pPr>
           </a:lstStyle>
           <a:p>
@@ -2199,18 +1945,13 @@
               <a:rPr lang="en-GB"/>
               <a:t>Click to edit Master title style</a:t>
             </a:r>
+            <a:endParaRPr lang="en-US" dirty="0"/>
           </a:p>
         </p:txBody>
       </p:sp>
       <p:sp>
         <p:nvSpPr>
-          <p:cNvPr id="3" name="Content Placeholder 2">
-            <a:extLst>
-              <a:ext uri="{FF2B5EF4-FFF2-40B4-BE49-F238E27FC236}">
-                <a16:creationId xmlns:a16="http://schemas.microsoft.com/office/drawing/2014/main" id="{E0E9D2E8-E167-084A-97B0-F84F57118248}"/>
-              </a:ext>
-            </a:extLst>
-          </p:cNvPr>
+          <p:cNvPr id="3" name="Content Placeholder 2"/>
           <p:cNvSpPr>
             <a:spLocks noGrp="1"/>
           </p:cNvSpPr>
@@ -2220,39 +1961,39 @@
         </p:nvSpPr>
         <p:spPr>
           <a:xfrm>
-            <a:off x="5183188" y="987425"/>
-            <a:ext cx="6172200" cy="4873625"/>
+            <a:off x="6121966" y="1036569"/>
+            <a:ext cx="7290108" cy="5116178"/>
           </a:xfrm>
         </p:spPr>
         <p:txBody>
           <a:bodyPr/>
           <a:lstStyle>
             <a:lvl1pPr>
-              <a:defRPr sz="3200"/>
+              <a:defRPr sz="3359"/>
             </a:lvl1pPr>
             <a:lvl2pPr>
-              <a:defRPr sz="2800"/>
+              <a:defRPr sz="2939"/>
             </a:lvl2pPr>
             <a:lvl3pPr>
-              <a:defRPr sz="2400"/>
+              <a:defRPr sz="2520"/>
             </a:lvl3pPr>
             <a:lvl4pPr>
-              <a:defRPr sz="2000"/>
+              <a:defRPr sz="2100"/>
             </a:lvl4pPr>
             <a:lvl5pPr>
-              <a:defRPr sz="2000"/>
+              <a:defRPr sz="2100"/>
             </a:lvl5pPr>
             <a:lvl6pPr>
-              <a:defRPr sz="2000"/>
+              <a:defRPr sz="2100"/>
             </a:lvl6pPr>
             <a:lvl7pPr>
-              <a:defRPr sz="2000"/>
+              <a:defRPr sz="2100"/>
             </a:lvl7pPr>
             <a:lvl8pPr>
-              <a:defRPr sz="2000"/>
+              <a:defRPr sz="2100"/>
             </a:lvl8pPr>
             <a:lvl9pPr>
-              <a:defRPr sz="2000"/>
+              <a:defRPr sz="2100"/>
             </a:lvl9pPr>
           </a:lstStyle>
           <a:p>
@@ -2289,18 +2030,13 @@
               <a:rPr lang="en-GB"/>
               <a:t>Fifth level</a:t>
             </a:r>
+            <a:endParaRPr lang="en-US" dirty="0"/>
           </a:p>
         </p:txBody>
       </p:sp>
       <p:sp>
         <p:nvSpPr>
-          <p:cNvPr id="4" name="Text Placeholder 3">
-            <a:extLst>
-              <a:ext uri="{FF2B5EF4-FFF2-40B4-BE49-F238E27FC236}">
-                <a16:creationId xmlns:a16="http://schemas.microsoft.com/office/drawing/2014/main" id="{2B9BE21C-A05B-6347-A703-603C7B4A183A}"/>
-              </a:ext>
-            </a:extLst>
-          </p:cNvPr>
+          <p:cNvPr id="4" name="Text Placeholder 3"/>
           <p:cNvSpPr>
             <a:spLocks noGrp="1"/>
           </p:cNvSpPr>
@@ -2310,8 +2046,8 @@
         </p:nvSpPr>
         <p:spPr>
           <a:xfrm>
-            <a:off x="839788" y="2057400"/>
-            <a:ext cx="3932237" cy="3811588"/>
+            <a:off x="991891" y="2159794"/>
+            <a:ext cx="4644443" cy="4001285"/>
           </a:xfrm>
         </p:spPr>
         <p:txBody>
@@ -2319,39 +2055,39 @@
           <a:lstStyle>
             <a:lvl1pPr marL="0" indent="0">
               <a:buNone/>
-              <a:defRPr sz="1600"/>
+              <a:defRPr sz="1680"/>
             </a:lvl1pPr>
-            <a:lvl2pPr marL="457200" indent="0">
+            <a:lvl2pPr marL="479969" indent="0">
               <a:buNone/>
-              <a:defRPr sz="1400"/>
+              <a:defRPr sz="1470"/>
             </a:lvl2pPr>
-            <a:lvl3pPr marL="914400" indent="0">
+            <a:lvl3pPr marL="959937" indent="0">
               <a:buNone/>
-              <a:defRPr sz="1200"/>
+              <a:defRPr sz="1260"/>
             </a:lvl3pPr>
-            <a:lvl4pPr marL="1371600" indent="0">
+            <a:lvl4pPr marL="1439906" indent="0">
               <a:buNone/>
-              <a:defRPr sz="1000"/>
+              <a:defRPr sz="1050"/>
             </a:lvl4pPr>
-            <a:lvl5pPr marL="1828800" indent="0">
+            <a:lvl5pPr marL="1919874" indent="0">
               <a:buNone/>
-              <a:defRPr sz="1000"/>
+              <a:defRPr sz="1050"/>
             </a:lvl5pPr>
-            <a:lvl6pPr marL="2286000" indent="0">
+            <a:lvl6pPr marL="2399843" indent="0">
               <a:buNone/>
-              <a:defRPr sz="1000"/>
+              <a:defRPr sz="1050"/>
             </a:lvl6pPr>
-            <a:lvl7pPr marL="2743200" indent="0">
+            <a:lvl7pPr marL="2879811" indent="0">
               <a:buNone/>
-              <a:defRPr sz="1000"/>
+              <a:defRPr sz="1050"/>
             </a:lvl7pPr>
-            <a:lvl8pPr marL="3200400" indent="0">
+            <a:lvl8pPr marL="3359780" indent="0">
               <a:buNone/>
-              <a:defRPr sz="1000"/>
+              <a:defRPr sz="1050"/>
             </a:lvl8pPr>
-            <a:lvl9pPr marL="3657600" indent="0">
+            <a:lvl9pPr marL="3839748" indent="0">
               <a:buNone/>
-              <a:defRPr sz="1000"/>
+              <a:defRPr sz="1050"/>
             </a:lvl9pPr>
           </a:lstStyle>
           <a:p>
@@ -2365,13 +2101,7 @@
       </p:sp>
       <p:sp>
         <p:nvSpPr>
-          <p:cNvPr id="5" name="Date Placeholder 4">
-            <a:extLst>
-              <a:ext uri="{FF2B5EF4-FFF2-40B4-BE49-F238E27FC236}">
-                <a16:creationId xmlns:a16="http://schemas.microsoft.com/office/drawing/2014/main" id="{B1F17C15-3752-E84A-A29F-4FFC452642D4}"/>
-              </a:ext>
-            </a:extLst>
-          </p:cNvPr>
+          <p:cNvPr id="5" name="Date Placeholder 4"/>
           <p:cNvSpPr>
             <a:spLocks noGrp="1"/>
           </p:cNvSpPr>
@@ -2394,13 +2124,7 @@
       </p:sp>
       <p:sp>
         <p:nvSpPr>
-          <p:cNvPr id="6" name="Footer Placeholder 5">
-            <a:extLst>
-              <a:ext uri="{FF2B5EF4-FFF2-40B4-BE49-F238E27FC236}">
-                <a16:creationId xmlns:a16="http://schemas.microsoft.com/office/drawing/2014/main" id="{49A62133-9B80-8D49-8BCF-FEEA808133EA}"/>
-              </a:ext>
-            </a:extLst>
-          </p:cNvPr>
+          <p:cNvPr id="6" name="Footer Placeholder 5"/>
           <p:cNvSpPr>
             <a:spLocks noGrp="1"/>
           </p:cNvSpPr>
@@ -2419,13 +2143,7 @@
       </p:sp>
       <p:sp>
         <p:nvSpPr>
-          <p:cNvPr id="7" name="Slide Number Placeholder 6">
-            <a:extLst>
-              <a:ext uri="{FF2B5EF4-FFF2-40B4-BE49-F238E27FC236}">
-                <a16:creationId xmlns:a16="http://schemas.microsoft.com/office/drawing/2014/main" id="{BA80EDCE-2B63-9F4B-8BDE-87B3B94E1175}"/>
-              </a:ext>
-            </a:extLst>
-          </p:cNvPr>
+          <p:cNvPr id="7" name="Slide Number Placeholder 6"/>
           <p:cNvSpPr>
             <a:spLocks noGrp="1"/>
           </p:cNvSpPr>
@@ -2449,7 +2167,7 @@
     </p:spTree>
     <p:extLst>
       <p:ext uri="{BB962C8B-B14F-4D97-AF65-F5344CB8AC3E}">
-        <p14:creationId xmlns:p14="http://schemas.microsoft.com/office/powerpoint/2010/main" val="1366347459"/>
+        <p14:creationId xmlns:p14="http://schemas.microsoft.com/office/powerpoint/2010/main" val="1266893178"/>
       </p:ext>
     </p:extLst>
   </p:cSld>
@@ -2478,13 +2196,7 @@
       </p:grpSpPr>
       <p:sp>
         <p:nvSpPr>
-          <p:cNvPr id="2" name="Title 1">
-            <a:extLst>
-              <a:ext uri="{FF2B5EF4-FFF2-40B4-BE49-F238E27FC236}">
-                <a16:creationId xmlns:a16="http://schemas.microsoft.com/office/drawing/2014/main" id="{F18BBA67-71E2-C447-B0B6-9B4A5EBEAC49}"/>
-              </a:ext>
-            </a:extLst>
-          </p:cNvPr>
+          <p:cNvPr id="2" name="Title 1"/>
           <p:cNvSpPr>
             <a:spLocks noGrp="1"/>
           </p:cNvSpPr>
@@ -2494,15 +2206,15 @@
         </p:nvSpPr>
         <p:spPr>
           <a:xfrm>
-            <a:off x="839788" y="457200"/>
-            <a:ext cx="3932237" cy="1600200"/>
+            <a:off x="991891" y="479954"/>
+            <a:ext cx="4644443" cy="1679840"/>
           </a:xfrm>
         </p:spPr>
         <p:txBody>
           <a:bodyPr anchor="b"/>
           <a:lstStyle>
             <a:lvl1pPr>
-              <a:defRPr sz="3200"/>
+              <a:defRPr sz="3359"/>
             </a:lvl1pPr>
           </a:lstStyle>
           <a:p>
@@ -2510,20 +2222,15 @@
               <a:rPr lang="en-GB"/>
               <a:t>Click to edit Master title style</a:t>
             </a:r>
+            <a:endParaRPr lang="en-US" dirty="0"/>
           </a:p>
         </p:txBody>
       </p:sp>
       <p:sp>
         <p:nvSpPr>
-          <p:cNvPr id="3" name="Picture Placeholder 2">
-            <a:extLst>
-              <a:ext uri="{FF2B5EF4-FFF2-40B4-BE49-F238E27FC236}">
-                <a16:creationId xmlns:a16="http://schemas.microsoft.com/office/drawing/2014/main" id="{D49FB406-281F-2546-B260-ACCFE624D9D7}"/>
-              </a:ext>
-            </a:extLst>
-          </p:cNvPr>
+          <p:cNvPr id="3" name="Picture Placeholder 2"/>
           <p:cNvSpPr>
-            <a:spLocks noGrp="1"/>
+            <a:spLocks noGrp="1" noChangeAspect="1"/>
           </p:cNvSpPr>
           <p:nvPr>
             <p:ph type="pic" idx="1"/>
@@ -2531,64 +2238,62 @@
         </p:nvSpPr>
         <p:spPr>
           <a:xfrm>
-            <a:off x="5183188" y="987425"/>
-            <a:ext cx="6172200" cy="4873625"/>
+            <a:off x="6121966" y="1036569"/>
+            <a:ext cx="7290108" cy="5116178"/>
           </a:xfrm>
         </p:spPr>
         <p:txBody>
-          <a:bodyPr/>
+          <a:bodyPr anchor="t"/>
           <a:lstStyle>
             <a:lvl1pPr marL="0" indent="0">
               <a:buNone/>
-              <a:defRPr sz="3200"/>
+              <a:defRPr sz="3359"/>
             </a:lvl1pPr>
-            <a:lvl2pPr marL="457200" indent="0">
+            <a:lvl2pPr marL="479969" indent="0">
               <a:buNone/>
-              <a:defRPr sz="2800"/>
+              <a:defRPr sz="2939"/>
             </a:lvl2pPr>
-            <a:lvl3pPr marL="914400" indent="0">
+            <a:lvl3pPr marL="959937" indent="0">
               <a:buNone/>
-              <a:defRPr sz="2400"/>
+              <a:defRPr sz="2520"/>
             </a:lvl3pPr>
-            <a:lvl4pPr marL="1371600" indent="0">
+            <a:lvl4pPr marL="1439906" indent="0">
               <a:buNone/>
-              <a:defRPr sz="2000"/>
+              <a:defRPr sz="2100"/>
             </a:lvl4pPr>
-            <a:lvl5pPr marL="1828800" indent="0">
+            <a:lvl5pPr marL="1919874" indent="0">
               <a:buNone/>
-              <a:defRPr sz="2000"/>
+              <a:defRPr sz="2100"/>
             </a:lvl5pPr>
-            <a:lvl6pPr marL="2286000" indent="0">
+            <a:lvl6pPr marL="2399843" indent="0">
               <a:buNone/>
-              <a:defRPr sz="2000"/>
+              <a:defRPr sz="2100"/>
             </a:lvl6pPr>
-            <a:lvl7pPr marL="2743200" indent="0">
+            <a:lvl7pPr marL="2879811" indent="0">
               <a:buNone/>
-              <a:defRPr sz="2000"/>
+              <a:defRPr sz="2100"/>
             </a:lvl7pPr>
-            <a:lvl8pPr marL="3200400" indent="0">
+            <a:lvl8pPr marL="3359780" indent="0">
               <a:buNone/>
-              <a:defRPr sz="2000"/>
+              <a:defRPr sz="2100"/>
             </a:lvl8pPr>
-            <a:lvl9pPr marL="3657600" indent="0">
+            <a:lvl9pPr marL="3839748" indent="0">
               <a:buNone/>
-              <a:defRPr sz="2000"/>
+              <a:defRPr sz="2100"/>
             </a:lvl9pPr>
           </a:lstStyle>
           <a:p>
-            <a:endParaRPr lang="en-GB"/>
+            <a:r>
+              <a:rPr lang="en-GB"/>
+              <a:t>Click icon to add picture</a:t>
+            </a:r>
+            <a:endParaRPr lang="en-US" dirty="0"/>
           </a:p>
         </p:txBody>
       </p:sp>
       <p:sp>
         <p:nvSpPr>
-          <p:cNvPr id="4" name="Text Placeholder 3">
-            <a:extLst>
-              <a:ext uri="{FF2B5EF4-FFF2-40B4-BE49-F238E27FC236}">
-                <a16:creationId xmlns:a16="http://schemas.microsoft.com/office/drawing/2014/main" id="{110EBC6E-9157-4C4A-A7DB-CAAC64051CAE}"/>
-              </a:ext>
-            </a:extLst>
-          </p:cNvPr>
+          <p:cNvPr id="4" name="Text Placeholder 3"/>
           <p:cNvSpPr>
             <a:spLocks noGrp="1"/>
           </p:cNvSpPr>
@@ -2598,8 +2303,8 @@
         </p:nvSpPr>
         <p:spPr>
           <a:xfrm>
-            <a:off x="839788" y="2057400"/>
-            <a:ext cx="3932237" cy="3811588"/>
+            <a:off x="991891" y="2159794"/>
+            <a:ext cx="4644443" cy="4001285"/>
           </a:xfrm>
         </p:spPr>
         <p:txBody>
@@ -2607,39 +2312,39 @@
           <a:lstStyle>
             <a:lvl1pPr marL="0" indent="0">
               <a:buNone/>
-              <a:defRPr sz="1600"/>
+              <a:defRPr sz="1680"/>
             </a:lvl1pPr>
-            <a:lvl2pPr marL="457200" indent="0">
+            <a:lvl2pPr marL="479969" indent="0">
               <a:buNone/>
-              <a:defRPr sz="1400"/>
+              <a:defRPr sz="1470"/>
             </a:lvl2pPr>
-            <a:lvl3pPr marL="914400" indent="0">
+            <a:lvl3pPr marL="959937" indent="0">
               <a:buNone/>
-              <a:defRPr sz="1200"/>
+              <a:defRPr sz="1260"/>
             </a:lvl3pPr>
-            <a:lvl4pPr marL="1371600" indent="0">
+            <a:lvl4pPr marL="1439906" indent="0">
               <a:buNone/>
-              <a:defRPr sz="1000"/>
+              <a:defRPr sz="1050"/>
             </a:lvl4pPr>
-            <a:lvl5pPr marL="1828800" indent="0">
+            <a:lvl5pPr marL="1919874" indent="0">
               <a:buNone/>
-              <a:defRPr sz="1000"/>
+              <a:defRPr sz="1050"/>
             </a:lvl5pPr>
-            <a:lvl6pPr marL="2286000" indent="0">
+            <a:lvl6pPr marL="2399843" indent="0">
               <a:buNone/>
-              <a:defRPr sz="1000"/>
+              <a:defRPr sz="1050"/>
             </a:lvl6pPr>
-            <a:lvl7pPr marL="2743200" indent="0">
+            <a:lvl7pPr marL="2879811" indent="0">
               <a:buNone/>
-              <a:defRPr sz="1000"/>
+              <a:defRPr sz="1050"/>
             </a:lvl7pPr>
-            <a:lvl8pPr marL="3200400" indent="0">
+            <a:lvl8pPr marL="3359780" indent="0">
               <a:buNone/>
-              <a:defRPr sz="1000"/>
+              <a:defRPr sz="1050"/>
             </a:lvl8pPr>
-            <a:lvl9pPr marL="3657600" indent="0">
+            <a:lvl9pPr marL="3839748" indent="0">
               <a:buNone/>
-              <a:defRPr sz="1000"/>
+              <a:defRPr sz="1050"/>
             </a:lvl9pPr>
           </a:lstStyle>
           <a:p>
@@ -2653,13 +2358,7 @@
       </p:sp>
       <p:sp>
         <p:nvSpPr>
-          <p:cNvPr id="5" name="Date Placeholder 4">
-            <a:extLst>
-              <a:ext uri="{FF2B5EF4-FFF2-40B4-BE49-F238E27FC236}">
-                <a16:creationId xmlns:a16="http://schemas.microsoft.com/office/drawing/2014/main" id="{5FFFD392-0535-4B4D-AB7F-98A408BAB3BD}"/>
-              </a:ext>
-            </a:extLst>
-          </p:cNvPr>
+          <p:cNvPr id="5" name="Date Placeholder 4"/>
           <p:cNvSpPr>
             <a:spLocks noGrp="1"/>
           </p:cNvSpPr>
@@ -2682,13 +2381,7 @@
       </p:sp>
       <p:sp>
         <p:nvSpPr>
-          <p:cNvPr id="6" name="Footer Placeholder 5">
-            <a:extLst>
-              <a:ext uri="{FF2B5EF4-FFF2-40B4-BE49-F238E27FC236}">
-                <a16:creationId xmlns:a16="http://schemas.microsoft.com/office/drawing/2014/main" id="{07660430-2A5E-9A48-8F2E-DE593DAE60BB}"/>
-              </a:ext>
-            </a:extLst>
-          </p:cNvPr>
+          <p:cNvPr id="6" name="Footer Placeholder 5"/>
           <p:cNvSpPr>
             <a:spLocks noGrp="1"/>
           </p:cNvSpPr>
@@ -2707,13 +2400,7 @@
       </p:sp>
       <p:sp>
         <p:nvSpPr>
-          <p:cNvPr id="7" name="Slide Number Placeholder 6">
-            <a:extLst>
-              <a:ext uri="{FF2B5EF4-FFF2-40B4-BE49-F238E27FC236}">
-                <a16:creationId xmlns:a16="http://schemas.microsoft.com/office/drawing/2014/main" id="{54536236-9573-5647-814F-1A5FFCE80251}"/>
-              </a:ext>
-            </a:extLst>
-          </p:cNvPr>
+          <p:cNvPr id="7" name="Slide Number Placeholder 6"/>
           <p:cNvSpPr>
             <a:spLocks noGrp="1"/>
           </p:cNvSpPr>
@@ -2737,7 +2424,7 @@
     </p:spTree>
     <p:extLst>
       <p:ext uri="{BB962C8B-B14F-4D97-AF65-F5344CB8AC3E}">
-        <p14:creationId xmlns:p14="http://schemas.microsoft.com/office/powerpoint/2010/main" val="329296527"/>
+        <p14:creationId xmlns:p14="http://schemas.microsoft.com/office/powerpoint/2010/main" val="3631510718"/>
       </p:ext>
     </p:extLst>
   </p:cSld>
@@ -2771,13 +2458,7 @@
       </p:grpSpPr>
       <p:sp>
         <p:nvSpPr>
-          <p:cNvPr id="2" name="Title Placeholder 1">
-            <a:extLst>
-              <a:ext uri="{FF2B5EF4-FFF2-40B4-BE49-F238E27FC236}">
-                <a16:creationId xmlns:a16="http://schemas.microsoft.com/office/drawing/2014/main" id="{5D8B4946-F1B8-8042-B7C4-5AFFA32CC714}"/>
-              </a:ext>
-            </a:extLst>
-          </p:cNvPr>
+          <p:cNvPr id="2" name="Title Placeholder 1"/>
           <p:cNvSpPr>
             <a:spLocks noGrp="1"/>
           </p:cNvSpPr>
@@ -2787,8 +2468,8 @@
         </p:nvSpPr>
         <p:spPr>
           <a:xfrm>
-            <a:off x="838200" y="365125"/>
-            <a:ext cx="10515600" cy="1325563"/>
+            <a:off x="990015" y="383297"/>
+            <a:ext cx="12420184" cy="1391534"/>
           </a:xfrm>
           <a:prstGeom prst="rect">
             <a:avLst/>
@@ -2804,18 +2485,13 @@
               <a:rPr lang="en-GB"/>
               <a:t>Click to edit Master title style</a:t>
             </a:r>
+            <a:endParaRPr lang="en-US" dirty="0"/>
           </a:p>
         </p:txBody>
       </p:sp>
       <p:sp>
         <p:nvSpPr>
-          <p:cNvPr id="3" name="Text Placeholder 2">
-            <a:extLst>
-              <a:ext uri="{FF2B5EF4-FFF2-40B4-BE49-F238E27FC236}">
-                <a16:creationId xmlns:a16="http://schemas.microsoft.com/office/drawing/2014/main" id="{7EA52600-BC81-984E-AB10-882656463AF1}"/>
-              </a:ext>
-            </a:extLst>
-          </p:cNvPr>
+          <p:cNvPr id="3" name="Text Placeholder 2"/>
           <p:cNvSpPr>
             <a:spLocks noGrp="1"/>
           </p:cNvSpPr>
@@ -2825,8 +2501,8 @@
         </p:nvSpPr>
         <p:spPr>
           <a:xfrm>
-            <a:off x="838200" y="1825625"/>
-            <a:ext cx="10515600" cy="4351338"/>
+            <a:off x="990015" y="1916484"/>
+            <a:ext cx="12420184" cy="4567898"/>
           </a:xfrm>
           <a:prstGeom prst="rect">
             <a:avLst/>
@@ -2871,18 +2547,13 @@
               <a:rPr lang="en-GB"/>
               <a:t>Fifth level</a:t>
             </a:r>
+            <a:endParaRPr lang="en-US" dirty="0"/>
           </a:p>
         </p:txBody>
       </p:sp>
       <p:sp>
         <p:nvSpPr>
-          <p:cNvPr id="4" name="Date Placeholder 3">
-            <a:extLst>
-              <a:ext uri="{FF2B5EF4-FFF2-40B4-BE49-F238E27FC236}">
-                <a16:creationId xmlns:a16="http://schemas.microsoft.com/office/drawing/2014/main" id="{09EAE1E3-9149-5F42-95BC-805CBBFCE183}"/>
-              </a:ext>
-            </a:extLst>
-          </p:cNvPr>
+          <p:cNvPr id="4" name="Date Placeholder 3"/>
           <p:cNvSpPr>
             <a:spLocks noGrp="1"/>
           </p:cNvSpPr>
@@ -2892,8 +2563,8 @@
         </p:nvSpPr>
         <p:spPr>
           <a:xfrm>
-            <a:off x="838200" y="6356350"/>
-            <a:ext cx="2743200" cy="365125"/>
+            <a:off x="990015" y="6672697"/>
+            <a:ext cx="3240048" cy="383297"/>
           </a:xfrm>
           <a:prstGeom prst="rect">
             <a:avLst/>
@@ -2903,7 +2574,7 @@
           <a:bodyPr vert="horz" lIns="91440" tIns="45720" rIns="91440" bIns="45720" rtlCol="0" anchor="ctr"/>
           <a:lstStyle>
             <a:lvl1pPr algn="l">
-              <a:defRPr sz="1200">
+              <a:defRPr sz="1260">
                 <a:solidFill>
                   <a:schemeClr val="tx1">
                     <a:tint val="75000"/>
@@ -2923,13 +2594,7 @@
       </p:sp>
       <p:sp>
         <p:nvSpPr>
-          <p:cNvPr id="5" name="Footer Placeholder 4">
-            <a:extLst>
-              <a:ext uri="{FF2B5EF4-FFF2-40B4-BE49-F238E27FC236}">
-                <a16:creationId xmlns:a16="http://schemas.microsoft.com/office/drawing/2014/main" id="{9912CAAB-227A-F94D-ABB9-DE4647C42952}"/>
-              </a:ext>
-            </a:extLst>
-          </p:cNvPr>
+          <p:cNvPr id="5" name="Footer Placeholder 4"/>
           <p:cNvSpPr>
             <a:spLocks noGrp="1"/>
           </p:cNvSpPr>
@@ -2939,8 +2604,8 @@
         </p:nvSpPr>
         <p:spPr>
           <a:xfrm>
-            <a:off x="4038600" y="6356350"/>
-            <a:ext cx="4114800" cy="365125"/>
+            <a:off x="4770071" y="6672697"/>
+            <a:ext cx="4860072" cy="383297"/>
           </a:xfrm>
           <a:prstGeom prst="rect">
             <a:avLst/>
@@ -2950,7 +2615,7 @@
           <a:bodyPr vert="horz" lIns="91440" tIns="45720" rIns="91440" bIns="45720" rtlCol="0" anchor="ctr"/>
           <a:lstStyle>
             <a:lvl1pPr algn="ctr">
-              <a:defRPr sz="1200">
+              <a:defRPr sz="1260">
                 <a:solidFill>
                   <a:schemeClr val="tx1">
                     <a:tint val="75000"/>
@@ -2966,13 +2631,7 @@
       </p:sp>
       <p:sp>
         <p:nvSpPr>
-          <p:cNvPr id="6" name="Slide Number Placeholder 5">
-            <a:extLst>
-              <a:ext uri="{FF2B5EF4-FFF2-40B4-BE49-F238E27FC236}">
-                <a16:creationId xmlns:a16="http://schemas.microsoft.com/office/drawing/2014/main" id="{C04F066F-4EF1-274F-ACCC-B8A050865CF8}"/>
-              </a:ext>
-            </a:extLst>
-          </p:cNvPr>
+          <p:cNvPr id="6" name="Slide Number Placeholder 5"/>
           <p:cNvSpPr>
             <a:spLocks noGrp="1"/>
           </p:cNvSpPr>
@@ -2982,8 +2641,8 @@
         </p:nvSpPr>
         <p:spPr>
           <a:xfrm>
-            <a:off x="8610600" y="6356350"/>
-            <a:ext cx="2743200" cy="365125"/>
+            <a:off x="10170150" y="6672697"/>
+            <a:ext cx="3240048" cy="383297"/>
           </a:xfrm>
           <a:prstGeom prst="rect">
             <a:avLst/>
@@ -2993,7 +2652,7 @@
           <a:bodyPr vert="horz" lIns="91440" tIns="45720" rIns="91440" bIns="45720" rtlCol="0" anchor="ctr"/>
           <a:lstStyle>
             <a:lvl1pPr algn="r">
-              <a:defRPr sz="1200">
+              <a:defRPr sz="1260">
                 <a:solidFill>
                   <a:schemeClr val="tx1">
                     <a:tint val="75000"/>
@@ -3014,27 +2673,27 @@
     </p:spTree>
     <p:extLst>
       <p:ext uri="{BB962C8B-B14F-4D97-AF65-F5344CB8AC3E}">
-        <p14:creationId xmlns:p14="http://schemas.microsoft.com/office/powerpoint/2010/main" val="1768743284"/>
+        <p14:creationId xmlns:p14="http://schemas.microsoft.com/office/powerpoint/2010/main" val="246894676"/>
       </p:ext>
     </p:extLst>
   </p:cSld>
   <p:clrMap bg1="lt1" tx1="dk1" bg2="lt2" tx2="dk2" accent1="accent1" accent2="accent2" accent3="accent3" accent4="accent4" accent5="accent5" accent6="accent6" hlink="hlink" folHlink="folHlink"/>
   <p:sldLayoutIdLst>
-    <p:sldLayoutId id="2147483649" r:id="rId1"/>
-    <p:sldLayoutId id="2147483650" r:id="rId2"/>
-    <p:sldLayoutId id="2147483651" r:id="rId3"/>
-    <p:sldLayoutId id="2147483652" r:id="rId4"/>
-    <p:sldLayoutId id="2147483653" r:id="rId5"/>
-    <p:sldLayoutId id="2147483654" r:id="rId6"/>
-    <p:sldLayoutId id="2147483655" r:id="rId7"/>
-    <p:sldLayoutId id="2147483656" r:id="rId8"/>
-    <p:sldLayoutId id="2147483657" r:id="rId9"/>
-    <p:sldLayoutId id="2147483658" r:id="rId10"/>
-    <p:sldLayoutId id="2147483659" r:id="rId11"/>
+    <p:sldLayoutId id="2147483697" r:id="rId1"/>
+    <p:sldLayoutId id="2147483698" r:id="rId2"/>
+    <p:sldLayoutId id="2147483699" r:id="rId3"/>
+    <p:sldLayoutId id="2147483700" r:id="rId4"/>
+    <p:sldLayoutId id="2147483701" r:id="rId5"/>
+    <p:sldLayoutId id="2147483702" r:id="rId6"/>
+    <p:sldLayoutId id="2147483703" r:id="rId7"/>
+    <p:sldLayoutId id="2147483704" r:id="rId8"/>
+    <p:sldLayoutId id="2147483705" r:id="rId9"/>
+    <p:sldLayoutId id="2147483706" r:id="rId10"/>
+    <p:sldLayoutId id="2147483707" r:id="rId11"/>
   </p:sldLayoutIdLst>
   <p:txStyles>
     <p:titleStyle>
-      <a:lvl1pPr algn="l" defTabSz="914400" rtl="0" eaLnBrk="1" latinLnBrk="0" hangingPunct="1">
+      <a:lvl1pPr algn="l" defTabSz="959937" rtl="0" eaLnBrk="1" latinLnBrk="0" hangingPunct="1">
         <a:lnSpc>
           <a:spcPct val="90000"/>
         </a:lnSpc>
@@ -3042,7 +2701,7 @@
           <a:spcPct val="0"/>
         </a:spcBef>
         <a:buNone/>
-        <a:defRPr sz="4400" kern="1200">
+        <a:defRPr sz="4619" kern="1200">
           <a:solidFill>
             <a:schemeClr val="tx1"/>
           </a:solidFill>
@@ -3053,16 +2712,16 @@
       </a:lvl1pPr>
     </p:titleStyle>
     <p:bodyStyle>
-      <a:lvl1pPr marL="228600" indent="-228600" algn="l" defTabSz="914400" rtl="0" eaLnBrk="1" latinLnBrk="0" hangingPunct="1">
+      <a:lvl1pPr marL="239984" indent="-239984" algn="l" defTabSz="959937" rtl="0" eaLnBrk="1" latinLnBrk="0" hangingPunct="1">
         <a:lnSpc>
           <a:spcPct val="90000"/>
         </a:lnSpc>
         <a:spcBef>
-          <a:spcPts val="1000"/>
+          <a:spcPts val="1050"/>
         </a:spcBef>
         <a:buFont typeface="Arial" panose="020B0604020202020204" pitchFamily="34" charset="0"/>
         <a:buChar char="•"/>
-        <a:defRPr sz="2800" kern="1200">
+        <a:defRPr sz="2939" kern="1200">
           <a:solidFill>
             <a:schemeClr val="tx1"/>
           </a:solidFill>
@@ -3071,16 +2730,16 @@
           <a:cs typeface="+mn-cs"/>
         </a:defRPr>
       </a:lvl1pPr>
-      <a:lvl2pPr marL="685800" indent="-228600" algn="l" defTabSz="914400" rtl="0" eaLnBrk="1" latinLnBrk="0" hangingPunct="1">
+      <a:lvl2pPr marL="719953" indent="-239984" algn="l" defTabSz="959937" rtl="0" eaLnBrk="1" latinLnBrk="0" hangingPunct="1">
         <a:lnSpc>
           <a:spcPct val="90000"/>
         </a:lnSpc>
         <a:spcBef>
-          <a:spcPts val="500"/>
+          <a:spcPts val="525"/>
         </a:spcBef>
         <a:buFont typeface="Arial" panose="020B0604020202020204" pitchFamily="34" charset="0"/>
         <a:buChar char="•"/>
-        <a:defRPr sz="2400" kern="1200">
+        <a:defRPr sz="2520" kern="1200">
           <a:solidFill>
             <a:schemeClr val="tx1"/>
           </a:solidFill>
@@ -3089,16 +2748,16 @@
           <a:cs typeface="+mn-cs"/>
         </a:defRPr>
       </a:lvl2pPr>
-      <a:lvl3pPr marL="1143000" indent="-228600" algn="l" defTabSz="914400" rtl="0" eaLnBrk="1" latinLnBrk="0" hangingPunct="1">
+      <a:lvl3pPr marL="1199921" indent="-239984" algn="l" defTabSz="959937" rtl="0" eaLnBrk="1" latinLnBrk="0" hangingPunct="1">
         <a:lnSpc>
           <a:spcPct val="90000"/>
         </a:lnSpc>
         <a:spcBef>
-          <a:spcPts val="500"/>
+          <a:spcPts val="525"/>
         </a:spcBef>
         <a:buFont typeface="Arial" panose="020B0604020202020204" pitchFamily="34" charset="0"/>
         <a:buChar char="•"/>
-        <a:defRPr sz="2000" kern="1200">
+        <a:defRPr sz="2100" kern="1200">
           <a:solidFill>
             <a:schemeClr val="tx1"/>
           </a:solidFill>
@@ -3107,16 +2766,16 @@
           <a:cs typeface="+mn-cs"/>
         </a:defRPr>
       </a:lvl3pPr>
-      <a:lvl4pPr marL="1600200" indent="-228600" algn="l" defTabSz="914400" rtl="0" eaLnBrk="1" latinLnBrk="0" hangingPunct="1">
+      <a:lvl4pPr marL="1679890" indent="-239984" algn="l" defTabSz="959937" rtl="0" eaLnBrk="1" latinLnBrk="0" hangingPunct="1">
         <a:lnSpc>
           <a:spcPct val="90000"/>
         </a:lnSpc>
         <a:spcBef>
-          <a:spcPts val="500"/>
+          <a:spcPts val="525"/>
         </a:spcBef>
         <a:buFont typeface="Arial" panose="020B0604020202020204" pitchFamily="34" charset="0"/>
         <a:buChar char="•"/>
-        <a:defRPr sz="1800" kern="1200">
+        <a:defRPr sz="1890" kern="1200">
           <a:solidFill>
             <a:schemeClr val="tx1"/>
           </a:solidFill>
@@ -3125,16 +2784,16 @@
           <a:cs typeface="+mn-cs"/>
         </a:defRPr>
       </a:lvl4pPr>
-      <a:lvl5pPr marL="2057400" indent="-228600" algn="l" defTabSz="914400" rtl="0" eaLnBrk="1" latinLnBrk="0" hangingPunct="1">
+      <a:lvl5pPr marL="2159859" indent="-239984" algn="l" defTabSz="959937" rtl="0" eaLnBrk="1" latinLnBrk="0" hangingPunct="1">
         <a:lnSpc>
           <a:spcPct val="90000"/>
         </a:lnSpc>
         <a:spcBef>
-          <a:spcPts val="500"/>
+          <a:spcPts val="525"/>
         </a:spcBef>
         <a:buFont typeface="Arial" panose="020B0604020202020204" pitchFamily="34" charset="0"/>
         <a:buChar char="•"/>
-        <a:defRPr sz="1800" kern="1200">
+        <a:defRPr sz="1890" kern="1200">
           <a:solidFill>
             <a:schemeClr val="tx1"/>
           </a:solidFill>
@@ -3143,16 +2802,16 @@
           <a:cs typeface="+mn-cs"/>
         </a:defRPr>
       </a:lvl5pPr>
-      <a:lvl6pPr marL="2514600" indent="-228600" algn="l" defTabSz="914400" rtl="0" eaLnBrk="1" latinLnBrk="0" hangingPunct="1">
+      <a:lvl6pPr marL="2639827" indent="-239984" algn="l" defTabSz="959937" rtl="0" eaLnBrk="1" latinLnBrk="0" hangingPunct="1">
         <a:lnSpc>
           <a:spcPct val="90000"/>
         </a:lnSpc>
         <a:spcBef>
-          <a:spcPts val="500"/>
+          <a:spcPts val="525"/>
         </a:spcBef>
         <a:buFont typeface="Arial" panose="020B0604020202020204" pitchFamily="34" charset="0"/>
         <a:buChar char="•"/>
-        <a:defRPr sz="1800" kern="1200">
+        <a:defRPr sz="1890" kern="1200">
           <a:solidFill>
             <a:schemeClr val="tx1"/>
           </a:solidFill>
@@ -3161,16 +2820,16 @@
           <a:cs typeface="+mn-cs"/>
         </a:defRPr>
       </a:lvl6pPr>
-      <a:lvl7pPr marL="2971800" indent="-228600" algn="l" defTabSz="914400" rtl="0" eaLnBrk="1" latinLnBrk="0" hangingPunct="1">
+      <a:lvl7pPr marL="3119796" indent="-239984" algn="l" defTabSz="959937" rtl="0" eaLnBrk="1" latinLnBrk="0" hangingPunct="1">
         <a:lnSpc>
           <a:spcPct val="90000"/>
         </a:lnSpc>
         <a:spcBef>
-          <a:spcPts val="500"/>
+          <a:spcPts val="525"/>
         </a:spcBef>
         <a:buFont typeface="Arial" panose="020B0604020202020204" pitchFamily="34" charset="0"/>
         <a:buChar char="•"/>
-        <a:defRPr sz="1800" kern="1200">
+        <a:defRPr sz="1890" kern="1200">
           <a:solidFill>
             <a:schemeClr val="tx1"/>
           </a:solidFill>
@@ -3179,16 +2838,16 @@
           <a:cs typeface="+mn-cs"/>
         </a:defRPr>
       </a:lvl7pPr>
-      <a:lvl8pPr marL="3429000" indent="-228600" algn="l" defTabSz="914400" rtl="0" eaLnBrk="1" latinLnBrk="0" hangingPunct="1">
+      <a:lvl8pPr marL="3599764" indent="-239984" algn="l" defTabSz="959937" rtl="0" eaLnBrk="1" latinLnBrk="0" hangingPunct="1">
         <a:lnSpc>
           <a:spcPct val="90000"/>
         </a:lnSpc>
         <a:spcBef>
-          <a:spcPts val="500"/>
+          <a:spcPts val="525"/>
         </a:spcBef>
         <a:buFont typeface="Arial" panose="020B0604020202020204" pitchFamily="34" charset="0"/>
         <a:buChar char="•"/>
-        <a:defRPr sz="1800" kern="1200">
+        <a:defRPr sz="1890" kern="1200">
           <a:solidFill>
             <a:schemeClr val="tx1"/>
           </a:solidFill>
@@ -3197,16 +2856,16 @@
           <a:cs typeface="+mn-cs"/>
         </a:defRPr>
       </a:lvl8pPr>
-      <a:lvl9pPr marL="3886200" indent="-228600" algn="l" defTabSz="914400" rtl="0" eaLnBrk="1" latinLnBrk="0" hangingPunct="1">
+      <a:lvl9pPr marL="4079733" indent="-239984" algn="l" defTabSz="959937" rtl="0" eaLnBrk="1" latinLnBrk="0" hangingPunct="1">
         <a:lnSpc>
           <a:spcPct val="90000"/>
         </a:lnSpc>
         <a:spcBef>
-          <a:spcPts val="500"/>
+          <a:spcPts val="525"/>
         </a:spcBef>
         <a:buFont typeface="Arial" panose="020B0604020202020204" pitchFamily="34" charset="0"/>
         <a:buChar char="•"/>
-        <a:defRPr sz="1800" kern="1200">
+        <a:defRPr sz="1890" kern="1200">
           <a:solidFill>
             <a:schemeClr val="tx1"/>
           </a:solidFill>
@@ -3218,10 +2877,10 @@
     </p:bodyStyle>
     <p:otherStyle>
       <a:defPPr>
-        <a:defRPr lang="en-KE"/>
+        <a:defRPr lang="en-US"/>
       </a:defPPr>
-      <a:lvl1pPr marL="0" algn="l" defTabSz="914400" rtl="0" eaLnBrk="1" latinLnBrk="0" hangingPunct="1">
-        <a:defRPr sz="1800" kern="1200">
+      <a:lvl1pPr marL="0" algn="l" defTabSz="959937" rtl="0" eaLnBrk="1" latinLnBrk="0" hangingPunct="1">
+        <a:defRPr sz="1890" kern="1200">
           <a:solidFill>
             <a:schemeClr val="tx1"/>
           </a:solidFill>
@@ -3230,8 +2889,8 @@
           <a:cs typeface="+mn-cs"/>
         </a:defRPr>
       </a:lvl1pPr>
-      <a:lvl2pPr marL="457200" algn="l" defTabSz="914400" rtl="0" eaLnBrk="1" latinLnBrk="0" hangingPunct="1">
-        <a:defRPr sz="1800" kern="1200">
+      <a:lvl2pPr marL="479969" algn="l" defTabSz="959937" rtl="0" eaLnBrk="1" latinLnBrk="0" hangingPunct="1">
+        <a:defRPr sz="1890" kern="1200">
           <a:solidFill>
             <a:schemeClr val="tx1"/>
           </a:solidFill>
@@ -3240,8 +2899,8 @@
           <a:cs typeface="+mn-cs"/>
         </a:defRPr>
       </a:lvl2pPr>
-      <a:lvl3pPr marL="914400" algn="l" defTabSz="914400" rtl="0" eaLnBrk="1" latinLnBrk="0" hangingPunct="1">
-        <a:defRPr sz="1800" kern="1200">
+      <a:lvl3pPr marL="959937" algn="l" defTabSz="959937" rtl="0" eaLnBrk="1" latinLnBrk="0" hangingPunct="1">
+        <a:defRPr sz="1890" kern="1200">
           <a:solidFill>
             <a:schemeClr val="tx1"/>
           </a:solidFill>
@@ -3250,8 +2909,8 @@
           <a:cs typeface="+mn-cs"/>
         </a:defRPr>
       </a:lvl3pPr>
-      <a:lvl4pPr marL="1371600" algn="l" defTabSz="914400" rtl="0" eaLnBrk="1" latinLnBrk="0" hangingPunct="1">
-        <a:defRPr sz="1800" kern="1200">
+      <a:lvl4pPr marL="1439906" algn="l" defTabSz="959937" rtl="0" eaLnBrk="1" latinLnBrk="0" hangingPunct="1">
+        <a:defRPr sz="1890" kern="1200">
           <a:solidFill>
             <a:schemeClr val="tx1"/>
           </a:solidFill>
@@ -3260,8 +2919,8 @@
           <a:cs typeface="+mn-cs"/>
         </a:defRPr>
       </a:lvl4pPr>
-      <a:lvl5pPr marL="1828800" algn="l" defTabSz="914400" rtl="0" eaLnBrk="1" latinLnBrk="0" hangingPunct="1">
-        <a:defRPr sz="1800" kern="1200">
+      <a:lvl5pPr marL="1919874" algn="l" defTabSz="959937" rtl="0" eaLnBrk="1" latinLnBrk="0" hangingPunct="1">
+        <a:defRPr sz="1890" kern="1200">
           <a:solidFill>
             <a:schemeClr val="tx1"/>
           </a:solidFill>
@@ -3270,8 +2929,8 @@
           <a:cs typeface="+mn-cs"/>
         </a:defRPr>
       </a:lvl5pPr>
-      <a:lvl6pPr marL="2286000" algn="l" defTabSz="914400" rtl="0" eaLnBrk="1" latinLnBrk="0" hangingPunct="1">
-        <a:defRPr sz="1800" kern="1200">
+      <a:lvl6pPr marL="2399843" algn="l" defTabSz="959937" rtl="0" eaLnBrk="1" latinLnBrk="0" hangingPunct="1">
+        <a:defRPr sz="1890" kern="1200">
           <a:solidFill>
             <a:schemeClr val="tx1"/>
           </a:solidFill>
@@ -3280,8 +2939,8 @@
           <a:cs typeface="+mn-cs"/>
         </a:defRPr>
       </a:lvl6pPr>
-      <a:lvl7pPr marL="2743200" algn="l" defTabSz="914400" rtl="0" eaLnBrk="1" latinLnBrk="0" hangingPunct="1">
-        <a:defRPr sz="1800" kern="1200">
+      <a:lvl7pPr marL="2879811" algn="l" defTabSz="959937" rtl="0" eaLnBrk="1" latinLnBrk="0" hangingPunct="1">
+        <a:defRPr sz="1890" kern="1200">
           <a:solidFill>
             <a:schemeClr val="tx1"/>
           </a:solidFill>
@@ -3290,8 +2949,8 @@
           <a:cs typeface="+mn-cs"/>
         </a:defRPr>
       </a:lvl7pPr>
-      <a:lvl8pPr marL="3200400" algn="l" defTabSz="914400" rtl="0" eaLnBrk="1" latinLnBrk="0" hangingPunct="1">
-        <a:defRPr sz="1800" kern="1200">
+      <a:lvl8pPr marL="3359780" algn="l" defTabSz="959937" rtl="0" eaLnBrk="1" latinLnBrk="0" hangingPunct="1">
+        <a:defRPr sz="1890" kern="1200">
           <a:solidFill>
             <a:schemeClr val="tx1"/>
           </a:solidFill>
@@ -3300,8 +2959,8 @@
           <a:cs typeface="+mn-cs"/>
         </a:defRPr>
       </a:lvl8pPr>
-      <a:lvl9pPr marL="3657600" algn="l" defTabSz="914400" rtl="0" eaLnBrk="1" latinLnBrk="0" hangingPunct="1">
-        <a:defRPr sz="1800" kern="1200">
+      <a:lvl9pPr marL="3839748" algn="l" defTabSz="959937" rtl="0" eaLnBrk="1" latinLnBrk="0" hangingPunct="1">
+        <a:defRPr sz="1890" kern="1200">
           <a:solidFill>
             <a:schemeClr val="tx1"/>
           </a:solidFill>
@@ -3346,8 +3005,8 @@
         </p:nvGrpSpPr>
         <p:grpSpPr>
           <a:xfrm>
-            <a:off x="401792" y="3509764"/>
-            <a:ext cx="3394842" cy="3394842"/>
+            <a:off x="2203651" y="3673968"/>
+            <a:ext cx="3123541" cy="3123541"/>
             <a:chOff x="576098" y="574291"/>
             <a:chExt cx="3394842" cy="3394842"/>
           </a:xfrm>
@@ -3400,7 +3059,7 @@
             <a:lstStyle/>
             <a:p>
               <a:pPr algn="ctr"/>
-              <a:endParaRPr lang="en-GB" dirty="0"/>
+              <a:endParaRPr lang="en-GB" sz="1656" dirty="0"/>
             </a:p>
           </p:txBody>
         </p:sp>
@@ -3419,7 +3078,7 @@
           <p:spPr>
             <a:xfrm>
               <a:off x="1394975" y="2815032"/>
-              <a:ext cx="1775942" cy="523220"/>
+              <a:ext cx="1775942" cy="531173"/>
             </a:xfrm>
             <a:prstGeom prst="rect">
               <a:avLst/>
@@ -3433,7 +3092,7 @@
             <a:p>
               <a:pPr algn="ctr"/>
               <a:r>
-                <a:rPr lang="en-GB" sz="1400" dirty="0"/>
+                <a:rPr lang="en-GB" sz="1288" dirty="0"/>
                 <a:t>Classifies or ranks people</a:t>
               </a:r>
             </a:p>
@@ -3583,8 +3242,8 @@
         </p:nvGrpSpPr>
         <p:grpSpPr>
           <a:xfrm>
-            <a:off x="2272957" y="1609430"/>
-            <a:ext cx="3394842" cy="3394842"/>
+            <a:off x="3941461" y="1941680"/>
+            <a:ext cx="3123541" cy="3123541"/>
             <a:chOff x="1996129" y="1530571"/>
             <a:chExt cx="3394842" cy="3394842"/>
           </a:xfrm>
@@ -3637,7 +3296,7 @@
             <a:lstStyle/>
             <a:p>
               <a:pPr algn="ctr"/>
-              <a:endParaRPr lang="en-GB" dirty="0"/>
+              <a:endParaRPr lang="en-GB" sz="1656" dirty="0"/>
             </a:p>
           </p:txBody>
         </p:sp>
@@ -3656,9 +3315,9 @@
           <p:grpSpPr>
             <a:xfrm>
               <a:off x="2820343" y="2289323"/>
-              <a:ext cx="1944240" cy="1934196"/>
+              <a:ext cx="1944240" cy="1942149"/>
               <a:chOff x="3225307" y="3242931"/>
-              <a:chExt cx="1944240" cy="1934196"/>
+              <a:chExt cx="1944240" cy="1942149"/>
             </a:xfrm>
           </p:grpSpPr>
           <p:sp>
@@ -3676,7 +3335,7 @@
             <p:spPr>
               <a:xfrm>
                 <a:off x="3286527" y="4653907"/>
-                <a:ext cx="1775942" cy="523220"/>
+                <a:ext cx="1775942" cy="531173"/>
               </a:xfrm>
               <a:prstGeom prst="rect">
                 <a:avLst/>
@@ -3690,7 +3349,7 @@
               <a:p>
                 <a:pPr algn="ctr"/>
                 <a:r>
-                  <a:rPr lang="en-GB" sz="1400" dirty="0"/>
+                  <a:rPr lang="en-GB" sz="1288" dirty="0"/>
                   <a:t>High environmental cost</a:t>
                 </a:r>
               </a:p>
@@ -3784,8 +3443,8 @@
         </p:nvGrpSpPr>
         <p:grpSpPr>
           <a:xfrm>
-            <a:off x="4143270" y="-227365"/>
-            <a:ext cx="3394842" cy="3394842"/>
+            <a:off x="5646127" y="235494"/>
+            <a:ext cx="3123541" cy="3123541"/>
             <a:chOff x="4351271" y="624005"/>
             <a:chExt cx="3394842" cy="3394842"/>
           </a:xfrm>
@@ -3838,7 +3497,7 @@
             <a:lstStyle/>
             <a:p>
               <a:pPr algn="ctr"/>
-              <a:endParaRPr lang="en-GB" dirty="0"/>
+              <a:endParaRPr lang="en-GB" sz="1656" dirty="0"/>
             </a:p>
           </p:txBody>
         </p:sp>
@@ -3857,7 +3516,7 @@
           <p:spPr>
             <a:xfrm>
               <a:off x="5170148" y="2864746"/>
-              <a:ext cx="1775942" cy="523220"/>
+              <a:ext cx="1775942" cy="531173"/>
             </a:xfrm>
             <a:prstGeom prst="rect">
               <a:avLst/>
@@ -3871,7 +3530,7 @@
             <a:p>
               <a:pPr algn="ctr"/>
               <a:r>
-                <a:rPr lang="en-GB" sz="1400" dirty="0"/>
+                <a:rPr lang="en-GB" sz="1288" dirty="0"/>
                 <a:t>Automates decision making</a:t>
               </a:r>
             </a:p>
@@ -3964,8 +3623,8 @@
         </p:nvGrpSpPr>
         <p:grpSpPr>
           <a:xfrm>
-            <a:off x="6020240" y="1648219"/>
-            <a:ext cx="3394842" cy="3394842"/>
+            <a:off x="7373098" y="1961189"/>
+            <a:ext cx="3123541" cy="3123541"/>
             <a:chOff x="6224894" y="2482144"/>
             <a:chExt cx="3394842" cy="3394842"/>
           </a:xfrm>
@@ -4038,7 +3697,7 @@
               <a:lstStyle/>
               <a:p>
                 <a:pPr algn="ctr"/>
-                <a:endParaRPr lang="en-GB" dirty="0"/>
+                <a:endParaRPr lang="en-GB" sz="1656" dirty="0"/>
               </a:p>
             </p:txBody>
           </p:sp>
@@ -4057,7 +3716,7 @@
             <p:spPr>
               <a:xfrm>
                 <a:off x="5170148" y="2864746"/>
-                <a:ext cx="1775942" cy="523220"/>
+                <a:ext cx="1775942" cy="531173"/>
               </a:xfrm>
               <a:prstGeom prst="rect">
                 <a:avLst/>
@@ -4071,14 +3730,14 @@
               <a:p>
                 <a:pPr algn="ctr"/>
                 <a:r>
-                  <a:rPr lang="en-GB" sz="1400" dirty="0"/>
-                  <a:t>Informed </a:t>
+                  <a:rPr lang="en-GB" sz="1288" dirty="0"/>
+                  <a:t>Lacks informed </a:t>
                 </a:r>
               </a:p>
               <a:p>
                 <a:pPr algn="ctr"/>
                 <a:r>
-                  <a:rPr lang="en-GB" sz="1400" dirty="0"/>
+                  <a:rPr lang="en-GB" sz="1288" dirty="0"/>
                   <a:t>consent</a:t>
                 </a:r>
               </a:p>
@@ -4136,8 +3795,8 @@
         </p:nvGrpSpPr>
         <p:grpSpPr>
           <a:xfrm>
-            <a:off x="7872292" y="-219797"/>
-            <a:ext cx="3394842" cy="3394842"/>
+            <a:off x="9077142" y="242457"/>
+            <a:ext cx="3123541" cy="3123541"/>
             <a:chOff x="8126444" y="624005"/>
             <a:chExt cx="3394842" cy="3394842"/>
           </a:xfrm>
@@ -4210,7 +3869,7 @@
               <a:lstStyle/>
               <a:p>
                 <a:pPr algn="ctr"/>
-                <a:endParaRPr lang="en-GB" dirty="0"/>
+                <a:endParaRPr lang="en-GB" sz="1656" dirty="0"/>
               </a:p>
             </p:txBody>
           </p:sp>
@@ -4229,7 +3888,7 @@
             <p:spPr>
               <a:xfrm>
                 <a:off x="5170148" y="2864746"/>
-                <a:ext cx="1775942" cy="307777"/>
+                <a:ext cx="1775942" cy="315763"/>
               </a:xfrm>
               <a:prstGeom prst="rect">
                 <a:avLst/>
@@ -4243,7 +3902,7 @@
               <a:p>
                 <a:pPr algn="ctr"/>
                 <a:r>
-                  <a:rPr lang="en-GB" sz="1400" dirty="0"/>
+                  <a:rPr lang="en-GB" sz="1288" dirty="0"/>
                   <a:t>Privacy</a:t>
                 </a:r>
               </a:p>
@@ -4301,8 +3960,8 @@
         </p:nvGrpSpPr>
         <p:grpSpPr>
           <a:xfrm>
-            <a:off x="4083031" y="3601577"/>
-            <a:ext cx="3394842" cy="3394842"/>
+            <a:off x="5639241" y="3661366"/>
+            <a:ext cx="3123541" cy="3123541"/>
             <a:chOff x="576098" y="574291"/>
             <a:chExt cx="3394842" cy="3394842"/>
           </a:xfrm>
@@ -4355,7 +4014,7 @@
             <a:lstStyle/>
             <a:p>
               <a:pPr algn="ctr"/>
-              <a:endParaRPr lang="en-GB" dirty="0"/>
+              <a:endParaRPr lang="en-GB" sz="1656" dirty="0"/>
             </a:p>
           </p:txBody>
         </p:sp>
@@ -4374,7 +4033,7 @@
           <p:spPr>
             <a:xfrm>
               <a:off x="1394975" y="2781166"/>
-              <a:ext cx="1775942" cy="523220"/>
+              <a:ext cx="1775942" cy="531173"/>
             </a:xfrm>
             <a:prstGeom prst="rect">
               <a:avLst/>
@@ -4388,14 +4047,14 @@
             <a:p>
               <a:pPr algn="ctr"/>
               <a:r>
-                <a:rPr lang="en-GB" sz="1400" dirty="0"/>
+                <a:rPr lang="en-GB" sz="1288" dirty="0"/>
                 <a:t>Lacks community</a:t>
               </a:r>
             </a:p>
             <a:p>
               <a:pPr algn="ctr"/>
               <a:r>
-                <a:rPr lang="en-GB" sz="1400" dirty="0"/>
+                <a:rPr lang="en-GB" sz="1288" dirty="0"/>
                 <a:t>involvement</a:t>
               </a:r>
             </a:p>
@@ -4488,8 +4147,8 @@
         </p:nvGrpSpPr>
         <p:grpSpPr>
           <a:xfrm>
-            <a:off x="7891933" y="3499747"/>
-            <a:ext cx="3394842" cy="3394842"/>
+            <a:off x="9095214" y="3664751"/>
+            <a:ext cx="3123541" cy="3123541"/>
             <a:chOff x="7468606" y="3499747"/>
             <a:chExt cx="3394842" cy="3394842"/>
           </a:xfrm>
@@ -4562,7 +4221,7 @@
               <a:lstStyle/>
               <a:p>
                 <a:pPr algn="ctr"/>
-                <a:endParaRPr lang="en-GB" dirty="0"/>
+                <a:endParaRPr lang="en-GB" sz="1656" dirty="0"/>
               </a:p>
             </p:txBody>
           </p:sp>
@@ -4581,7 +4240,7 @@
             <p:spPr>
               <a:xfrm>
                 <a:off x="5160721" y="2796742"/>
-                <a:ext cx="1775942" cy="523220"/>
+                <a:ext cx="1775942" cy="531173"/>
               </a:xfrm>
               <a:prstGeom prst="rect">
                 <a:avLst/>
@@ -4595,7 +4254,7 @@
               <a:p>
                 <a:pPr algn="ctr"/>
                 <a:r>
-                  <a:rPr lang="en-GB" sz="1400" dirty="0"/>
+                  <a:rPr lang="en-GB" sz="1288" dirty="0"/>
                   <a:t>Difficult to understand</a:t>
                 </a:r>
               </a:p>
@@ -4689,8 +4348,8 @@
         </p:nvGrpSpPr>
         <p:grpSpPr>
           <a:xfrm>
-            <a:off x="9735560" y="1609430"/>
-            <a:ext cx="3394842" cy="3394842"/>
+            <a:off x="10791506" y="1925500"/>
+            <a:ext cx="3123541" cy="3123541"/>
             <a:chOff x="4351271" y="624005"/>
             <a:chExt cx="3394842" cy="3394842"/>
           </a:xfrm>
@@ -4763,7 +4422,7 @@
               <a:lstStyle/>
               <a:p>
                 <a:pPr algn="ctr"/>
-                <a:endParaRPr lang="en-GB" dirty="0"/>
+                <a:endParaRPr lang="en-GB" sz="1656" dirty="0"/>
               </a:p>
             </p:txBody>
           </p:sp>
@@ -4782,7 +4441,7 @@
             <p:spPr>
               <a:xfrm>
                 <a:off x="5153215" y="2864746"/>
-                <a:ext cx="1775942" cy="523220"/>
+                <a:ext cx="1775942" cy="531173"/>
               </a:xfrm>
               <a:prstGeom prst="rect">
                 <a:avLst/>
@@ -4796,7 +4455,7 @@
               <a:p>
                 <a:pPr algn="ctr"/>
                 <a:r>
-                  <a:rPr lang="en-GB" sz="1400" dirty="0"/>
+                  <a:rPr lang="en-GB" sz="1288" dirty="0"/>
                   <a:t>Capable of direct harm</a:t>
                 </a:r>
               </a:p>
@@ -4854,8 +4513,8 @@
         </p:nvGrpSpPr>
         <p:grpSpPr>
           <a:xfrm>
-            <a:off x="-1446015" y="1585462"/>
-            <a:ext cx="3394842" cy="3394842"/>
+            <a:off x="471153" y="1968166"/>
+            <a:ext cx="3123541" cy="3123541"/>
             <a:chOff x="3566362" y="1212145"/>
             <a:chExt cx="3394842" cy="3394842"/>
           </a:xfrm>
@@ -4928,7 +4587,7 @@
               <a:lstStyle/>
               <a:p>
                 <a:pPr algn="ctr"/>
-                <a:endParaRPr lang="en-GB" dirty="0"/>
+                <a:endParaRPr lang="en-GB" sz="1656" dirty="0"/>
               </a:p>
             </p:txBody>
           </p:sp>
@@ -4947,7 +4606,7 @@
             <p:spPr>
               <a:xfrm>
                 <a:off x="5170148" y="2864746"/>
-                <a:ext cx="1775942" cy="523220"/>
+                <a:ext cx="1775942" cy="531173"/>
               </a:xfrm>
               <a:prstGeom prst="rect">
                 <a:avLst/>
@@ -4961,13 +4620,13 @@
               <a:p>
                 <a:pPr algn="ctr"/>
                 <a:r>
-                  <a:rPr lang="en-GB" sz="1400" dirty="0"/>
+                  <a:rPr lang="en-GB" sz="1288" dirty="0"/>
                   <a:t>Danger of misuse</a:t>
                 </a:r>
               </a:p>
               <a:p>
                 <a:pPr algn="ctr"/>
-                <a:endParaRPr lang="en-GB" sz="1400" dirty="0"/>
+                <a:endParaRPr lang="en-GB" sz="1288" dirty="0"/>
               </a:p>
             </p:txBody>
           </p:sp>
@@ -5059,8 +4718,8 @@
         </p:nvGrpSpPr>
         <p:grpSpPr>
           <a:xfrm>
-            <a:off x="408446" y="-219797"/>
-            <a:ext cx="3394842" cy="3394842"/>
+            <a:off x="2193594" y="242457"/>
+            <a:ext cx="3123541" cy="3123541"/>
             <a:chOff x="408446" y="-219797"/>
             <a:chExt cx="3394842" cy="3394842"/>
           </a:xfrm>
@@ -5133,7 +4792,7 @@
               <a:lstStyle/>
               <a:p>
                 <a:pPr algn="ctr"/>
-                <a:endParaRPr lang="en-GB" dirty="0"/>
+                <a:endParaRPr lang="en-GB" sz="1656" dirty="0"/>
               </a:p>
             </p:txBody>
           </p:sp>
@@ -5152,7 +4811,7 @@
             <p:spPr>
               <a:xfrm>
                 <a:off x="1394975" y="2781166"/>
-                <a:ext cx="1775942" cy="523220"/>
+                <a:ext cx="1775942" cy="531173"/>
               </a:xfrm>
               <a:prstGeom prst="rect">
                 <a:avLst/>
@@ -5166,7 +4825,7 @@
               <a:p>
                 <a:pPr algn="ctr"/>
                 <a:r>
-                  <a:rPr lang="en-GB" sz="1400" dirty="0"/>
+                  <a:rPr lang="en-GB" sz="1288" dirty="0"/>
                   <a:t>Reinforces existing biases</a:t>
                 </a:r>
               </a:p>
@@ -5254,8 +4913,8 @@
         </p:nvGrpSpPr>
         <p:grpSpPr>
           <a:xfrm>
-            <a:off x="423327" y="3463158"/>
-            <a:ext cx="3394842" cy="3394842"/>
+            <a:off x="1980770" y="3631086"/>
+            <a:ext cx="3123541" cy="3123541"/>
             <a:chOff x="576098" y="574291"/>
             <a:chExt cx="3394842" cy="3394842"/>
           </a:xfrm>
@@ -5308,7 +4967,7 @@
             <a:lstStyle/>
             <a:p>
               <a:pPr algn="ctr"/>
-              <a:endParaRPr lang="en-GB" dirty="0"/>
+              <a:endParaRPr lang="en-GB" sz="1656" dirty="0"/>
             </a:p>
           </p:txBody>
         </p:sp>
@@ -5327,7 +4986,7 @@
           <p:spPr>
             <a:xfrm>
               <a:off x="1394975" y="2815032"/>
-              <a:ext cx="1775942" cy="523220"/>
+              <a:ext cx="1775942" cy="531173"/>
             </a:xfrm>
             <a:prstGeom prst="rect">
               <a:avLst/>
@@ -5341,7 +5000,7 @@
             <a:p>
               <a:pPr algn="ctr"/>
               <a:r>
-                <a:rPr lang="en-GB" sz="1400" dirty="0"/>
+                <a:rPr lang="en-GB" sz="1288" dirty="0"/>
                 <a:t>Classifies or ranks people</a:t>
               </a:r>
             </a:p>
@@ -5491,8 +5150,8 @@
         </p:nvGrpSpPr>
         <p:grpSpPr>
           <a:xfrm>
-            <a:off x="2272957" y="1609430"/>
-            <a:ext cx="3394842" cy="3394842"/>
+            <a:off x="3682586" y="1925500"/>
+            <a:ext cx="3123541" cy="3123541"/>
             <a:chOff x="1996129" y="1530571"/>
             <a:chExt cx="3394842" cy="3394842"/>
           </a:xfrm>
@@ -5545,7 +5204,7 @@
             <a:lstStyle/>
             <a:p>
               <a:pPr algn="ctr"/>
-              <a:endParaRPr lang="en-GB" dirty="0"/>
+              <a:endParaRPr lang="en-GB" sz="1656" dirty="0"/>
             </a:p>
           </p:txBody>
         </p:sp>
@@ -5564,9 +5223,9 @@
           <p:grpSpPr>
             <a:xfrm>
               <a:off x="2820343" y="2289323"/>
-              <a:ext cx="1944240" cy="1934196"/>
+              <a:ext cx="1944240" cy="1942149"/>
               <a:chOff x="3225307" y="3242931"/>
-              <a:chExt cx="1944240" cy="1934196"/>
+              <a:chExt cx="1944240" cy="1942149"/>
             </a:xfrm>
           </p:grpSpPr>
           <p:sp>
@@ -5584,7 +5243,7 @@
             <p:spPr>
               <a:xfrm>
                 <a:off x="3286527" y="4653907"/>
-                <a:ext cx="1775942" cy="523220"/>
+                <a:ext cx="1775942" cy="531173"/>
               </a:xfrm>
               <a:prstGeom prst="rect">
                 <a:avLst/>
@@ -5598,7 +5257,7 @@
               <a:p>
                 <a:pPr algn="ctr"/>
                 <a:r>
-                  <a:rPr lang="en-GB" sz="1400" dirty="0"/>
+                  <a:rPr lang="en-GB" sz="1288" dirty="0"/>
                   <a:t>High environmental cost</a:t>
                 </a:r>
               </a:p>
@@ -5692,8 +5351,8 @@
         </p:nvGrpSpPr>
         <p:grpSpPr>
           <a:xfrm>
-            <a:off x="4143270" y="-227365"/>
-            <a:ext cx="3394842" cy="3394842"/>
+            <a:off x="5403432" y="235494"/>
+            <a:ext cx="3123541" cy="3123541"/>
             <a:chOff x="4351271" y="624005"/>
             <a:chExt cx="3394842" cy="3394842"/>
           </a:xfrm>
@@ -5746,7 +5405,7 @@
             <a:lstStyle/>
             <a:p>
               <a:pPr algn="ctr"/>
-              <a:endParaRPr lang="en-GB" dirty="0"/>
+              <a:endParaRPr lang="en-GB" sz="1656" dirty="0"/>
             </a:p>
           </p:txBody>
         </p:sp>
@@ -5765,7 +5424,7 @@
           <p:spPr>
             <a:xfrm>
               <a:off x="5170148" y="2864746"/>
-              <a:ext cx="1775942" cy="523220"/>
+              <a:ext cx="1775942" cy="531173"/>
             </a:xfrm>
             <a:prstGeom prst="rect">
               <a:avLst/>
@@ -5779,7 +5438,7 @@
             <a:p>
               <a:pPr algn="ctr"/>
               <a:r>
-                <a:rPr lang="en-GB" sz="1400" dirty="0"/>
+                <a:rPr lang="en-GB" sz="1288" dirty="0"/>
                 <a:t>Automates decision-making </a:t>
               </a:r>
             </a:p>
@@ -5872,8 +5531,8 @@
         </p:nvGrpSpPr>
         <p:grpSpPr>
           <a:xfrm>
-            <a:off x="6020240" y="1648219"/>
-            <a:ext cx="3394842" cy="3394842"/>
+            <a:off x="7130403" y="1961189"/>
+            <a:ext cx="3123541" cy="3123541"/>
             <a:chOff x="6224894" y="2482144"/>
             <a:chExt cx="3394842" cy="3394842"/>
           </a:xfrm>
@@ -5946,7 +5605,7 @@
               <a:lstStyle/>
               <a:p>
                 <a:pPr algn="ctr"/>
-                <a:endParaRPr lang="en-GB" dirty="0"/>
+                <a:endParaRPr lang="en-GB" sz="1656" dirty="0"/>
               </a:p>
             </p:txBody>
           </p:sp>
@@ -5965,7 +5624,7 @@
             <p:spPr>
               <a:xfrm>
                 <a:off x="5170148" y="2864746"/>
-                <a:ext cx="1775942" cy="523220"/>
+                <a:ext cx="1775942" cy="746583"/>
               </a:xfrm>
               <a:prstGeom prst="rect">
                 <a:avLst/>
@@ -5979,14 +5638,14 @@
               <a:p>
                 <a:pPr algn="ctr"/>
                 <a:r>
-                  <a:rPr lang="en-GB" sz="1400" dirty="0"/>
+                  <a:rPr lang="en-GB" sz="1288" dirty="0"/>
                   <a:t>Undermines informed</a:t>
                 </a:r>
               </a:p>
               <a:p>
                 <a:pPr algn="ctr"/>
                 <a:r>
-                  <a:rPr lang="en-GB" sz="1400" dirty="0"/>
+                  <a:rPr lang="en-GB" sz="1288" dirty="0"/>
                   <a:t>consent</a:t>
                 </a:r>
               </a:p>
@@ -6044,8 +5703,8 @@
         </p:nvGrpSpPr>
         <p:grpSpPr>
           <a:xfrm>
-            <a:off x="7872292" y="-219797"/>
-            <a:ext cx="3394842" cy="3394842"/>
+            <a:off x="8834447" y="242457"/>
+            <a:ext cx="3123541" cy="3123541"/>
             <a:chOff x="8126444" y="624005"/>
             <a:chExt cx="3394842" cy="3394842"/>
           </a:xfrm>
@@ -6118,7 +5777,7 @@
               <a:lstStyle/>
               <a:p>
                 <a:pPr algn="ctr"/>
-                <a:endParaRPr lang="en-GB" dirty="0"/>
+                <a:endParaRPr lang="en-GB" sz="1656" dirty="0"/>
               </a:p>
             </p:txBody>
           </p:sp>
@@ -6137,7 +5796,7 @@
             <p:spPr>
               <a:xfrm>
                 <a:off x="5170148" y="2864746"/>
-                <a:ext cx="1775942" cy="307777"/>
+                <a:ext cx="1775942" cy="315763"/>
               </a:xfrm>
               <a:prstGeom prst="rect">
                 <a:avLst/>
@@ -6151,7 +5810,7 @@
               <a:p>
                 <a:pPr algn="ctr"/>
                 <a:r>
-                  <a:rPr lang="en-GB" sz="1400" dirty="0"/>
+                  <a:rPr lang="en-GB" sz="1288" dirty="0"/>
                   <a:t>Threatens Privacy</a:t>
                 </a:r>
               </a:p>
@@ -6209,8 +5868,8 @@
         </p:nvGrpSpPr>
         <p:grpSpPr>
           <a:xfrm>
-            <a:off x="4127011" y="3516235"/>
-            <a:ext cx="3394842" cy="3394842"/>
+            <a:off x="5388472" y="3679922"/>
+            <a:ext cx="3123541" cy="3123541"/>
             <a:chOff x="576098" y="574291"/>
             <a:chExt cx="3394842" cy="3394842"/>
           </a:xfrm>
@@ -6263,7 +5922,7 @@
             <a:lstStyle/>
             <a:p>
               <a:pPr algn="ctr"/>
-              <a:endParaRPr lang="en-GB" dirty="0"/>
+              <a:endParaRPr lang="en-GB" sz="1656" dirty="0"/>
             </a:p>
           </p:txBody>
         </p:sp>
@@ -6282,7 +5941,7 @@
           <p:spPr>
             <a:xfrm>
               <a:off x="1394975" y="2781166"/>
-              <a:ext cx="1775942" cy="523220"/>
+              <a:ext cx="1775942" cy="531173"/>
             </a:xfrm>
             <a:prstGeom prst="rect">
               <a:avLst/>
@@ -6296,7 +5955,7 @@
             <a:p>
               <a:pPr algn="ctr"/>
               <a:r>
-                <a:rPr lang="en-GB" sz="1400" dirty="0"/>
+                <a:rPr lang="en-GB" sz="1288" dirty="0"/>
                 <a:t>Ignores or opposes community need</a:t>
               </a:r>
             </a:p>
@@ -6389,8 +6048,8 @@
         </p:nvGrpSpPr>
         <p:grpSpPr>
           <a:xfrm>
-            <a:off x="408446" y="-219797"/>
-            <a:ext cx="3394842" cy="3394842"/>
+            <a:off x="1967078" y="242457"/>
+            <a:ext cx="3123541" cy="3123541"/>
             <a:chOff x="576098" y="574291"/>
             <a:chExt cx="3394842" cy="3394842"/>
           </a:xfrm>
@@ -6463,7 +6122,7 @@
               <a:lstStyle/>
               <a:p>
                 <a:pPr algn="ctr"/>
-                <a:endParaRPr lang="en-GB" dirty="0"/>
+                <a:endParaRPr lang="en-GB" sz="1656" dirty="0"/>
               </a:p>
             </p:txBody>
           </p:sp>
@@ -6482,7 +6141,7 @@
             <p:spPr>
               <a:xfrm>
                 <a:off x="1394975" y="2781166"/>
-                <a:ext cx="1775942" cy="523220"/>
+                <a:ext cx="1775942" cy="531173"/>
               </a:xfrm>
               <a:prstGeom prst="rect">
                 <a:avLst/>
@@ -6496,7 +6155,7 @@
               <a:p>
                 <a:pPr algn="ctr"/>
                 <a:r>
-                  <a:rPr lang="en-GB" sz="1400" dirty="0"/>
+                  <a:rPr lang="en-GB" sz="1288" dirty="0"/>
                   <a:t>Reinforces existing biases</a:t>
                 </a:r>
               </a:p>
@@ -6554,8 +6213,8 @@
         </p:nvGrpSpPr>
         <p:grpSpPr>
           <a:xfrm>
-            <a:off x="7891933" y="3499747"/>
-            <a:ext cx="3394842" cy="3394842"/>
+            <a:off x="8852518" y="3664751"/>
+            <a:ext cx="3123541" cy="3123541"/>
             <a:chOff x="7468606" y="3499747"/>
             <a:chExt cx="3394842" cy="3394842"/>
           </a:xfrm>
@@ -6628,7 +6287,7 @@
               <a:lstStyle/>
               <a:p>
                 <a:pPr algn="ctr"/>
-                <a:endParaRPr lang="en-GB" dirty="0"/>
+                <a:endParaRPr lang="en-GB" sz="1656" dirty="0"/>
               </a:p>
             </p:txBody>
           </p:sp>
@@ -6647,7 +6306,7 @@
             <p:spPr>
               <a:xfrm>
                 <a:off x="5160721" y="2796742"/>
-                <a:ext cx="1775942" cy="523220"/>
+                <a:ext cx="1775942" cy="531173"/>
               </a:xfrm>
               <a:prstGeom prst="rect">
                 <a:avLst/>
@@ -6661,7 +6320,7 @@
               <a:p>
                 <a:pPr algn="ctr"/>
                 <a:r>
-                  <a:rPr lang="en-GB" sz="1400" dirty="0"/>
+                  <a:rPr lang="en-GB" sz="1288" dirty="0"/>
                   <a:t>Difficult to understand</a:t>
                 </a:r>
               </a:p>
@@ -6755,8 +6414,8 @@
         </p:nvGrpSpPr>
         <p:grpSpPr>
           <a:xfrm>
-            <a:off x="9735560" y="1609430"/>
-            <a:ext cx="3394842" cy="3394842"/>
+            <a:off x="10548811" y="1925500"/>
+            <a:ext cx="3123541" cy="3123541"/>
             <a:chOff x="4351271" y="624005"/>
             <a:chExt cx="3394842" cy="3394842"/>
           </a:xfrm>
@@ -6829,7 +6488,7 @@
               <a:lstStyle/>
               <a:p>
                 <a:pPr algn="ctr"/>
-                <a:endParaRPr lang="en-GB" dirty="0"/>
+                <a:endParaRPr lang="en-GB" sz="1656" dirty="0"/>
               </a:p>
             </p:txBody>
           </p:sp>
@@ -6848,7 +6507,7 @@
             <p:spPr>
               <a:xfrm>
                 <a:off x="5153215" y="2864746"/>
-                <a:ext cx="1775942" cy="523220"/>
+                <a:ext cx="1775942" cy="531173"/>
               </a:xfrm>
               <a:prstGeom prst="rect">
                 <a:avLst/>
@@ -6862,7 +6521,7 @@
               <a:p>
                 <a:pPr algn="ctr"/>
                 <a:r>
-                  <a:rPr lang="en-GB" sz="1400" dirty="0"/>
+                  <a:rPr lang="en-GB" sz="1288" dirty="0"/>
                   <a:t>May cause direct harm</a:t>
                 </a:r>
               </a:p>
@@ -6920,8 +6579,8 @@
         </p:nvGrpSpPr>
         <p:grpSpPr>
           <a:xfrm>
-            <a:off x="-1446015" y="1585462"/>
-            <a:ext cx="3394842" cy="3394842"/>
+            <a:off x="260817" y="1903448"/>
+            <a:ext cx="3123541" cy="3123541"/>
             <a:chOff x="3566362" y="1212145"/>
             <a:chExt cx="3394842" cy="3394842"/>
           </a:xfrm>
@@ -6994,7 +6653,7 @@
               <a:lstStyle/>
               <a:p>
                 <a:pPr algn="ctr"/>
-                <a:endParaRPr lang="en-GB" dirty="0"/>
+                <a:endParaRPr lang="en-GB" sz="1656" dirty="0"/>
               </a:p>
             </p:txBody>
           </p:sp>
@@ -7013,7 +6672,7 @@
             <p:spPr>
               <a:xfrm>
                 <a:off x="5170148" y="2864746"/>
-                <a:ext cx="1775942" cy="523220"/>
+                <a:ext cx="1775942" cy="531173"/>
               </a:xfrm>
               <a:prstGeom prst="rect">
                 <a:avLst/>
@@ -7027,13 +6686,13 @@
               <a:p>
                 <a:pPr algn="ctr"/>
                 <a:r>
-                  <a:rPr lang="en-GB" sz="1400" dirty="0"/>
+                  <a:rPr lang="en-GB" sz="1288" dirty="0"/>
                   <a:t>Danger of misuse</a:t>
                 </a:r>
               </a:p>
               <a:p>
                 <a:pPr algn="ctr"/>
-                <a:endParaRPr lang="en-GB" sz="1400" dirty="0"/>
+                <a:endParaRPr lang="en-GB" sz="1288" dirty="0"/>
               </a:p>
             </p:txBody>
           </p:sp>
@@ -7155,10 +6814,10 @@
         </p:nvGrpSpPr>
         <p:grpSpPr>
           <a:xfrm>
-            <a:off x="-926655" y="-9108161"/>
-            <a:ext cx="21103293" cy="24597988"/>
+            <a:off x="738673" y="-7935591"/>
+            <a:ext cx="19416813" cy="22632206"/>
             <a:chOff x="-3844026" y="-9739533"/>
-            <a:chExt cx="21103293" cy="24597988"/>
+            <a:chExt cx="21103293" cy="24597965"/>
           </a:xfrm>
         </p:grpSpPr>
         <p:sp>
@@ -7210,7 +6869,7 @@
             <a:lstStyle/>
             <a:p>
               <a:pPr algn="ctr"/>
-              <a:endParaRPr lang="en-GB" dirty="0"/>
+              <a:endParaRPr lang="en-GB" sz="1656" dirty="0"/>
             </a:p>
           </p:txBody>
         </p:sp>
@@ -7282,7 +6941,7 @@
               <a:lstStyle/>
               <a:p>
                 <a:pPr algn="ctr"/>
-                <a:endParaRPr lang="en-GB" dirty="0"/>
+                <a:endParaRPr lang="en-GB" sz="1656" dirty="0"/>
               </a:p>
             </p:txBody>
           </p:sp>
@@ -7301,7 +6960,7 @@
             <p:spPr>
               <a:xfrm>
                 <a:off x="1394975" y="2815032"/>
-                <a:ext cx="1775942" cy="307777"/>
+                <a:ext cx="1775942" cy="315763"/>
               </a:xfrm>
               <a:prstGeom prst="rect">
                 <a:avLst/>
@@ -7315,7 +6974,7 @@
               <a:p>
                 <a:pPr algn="ctr"/>
                 <a:r>
-                  <a:rPr lang="en-GB" sz="1400" dirty="0"/>
+                  <a:rPr lang="en-GB" sz="1288" dirty="0"/>
                   <a:t>Data Hazards</a:t>
                 </a:r>
               </a:p>
@@ -7519,7 +7178,7 @@
               <a:lstStyle/>
               <a:p>
                 <a:pPr algn="ctr"/>
-                <a:endParaRPr lang="en-GB" dirty="0"/>
+                <a:endParaRPr lang="en-GB" sz="1656" dirty="0"/>
               </a:p>
             </p:txBody>
           </p:sp>
@@ -7538,9 +7197,9 @@
             <p:grpSpPr>
               <a:xfrm>
                 <a:off x="2820343" y="2289323"/>
-                <a:ext cx="1944240" cy="1718753"/>
+                <a:ext cx="1944240" cy="1726739"/>
                 <a:chOff x="3225307" y="3242931"/>
-                <a:chExt cx="1944240" cy="1718753"/>
+                <a:chExt cx="1944240" cy="1726739"/>
               </a:xfrm>
             </p:grpSpPr>
             <p:sp>
@@ -7558,7 +7217,7 @@
               <p:spPr>
                 <a:xfrm>
                   <a:off x="3286527" y="4653907"/>
-                  <a:ext cx="1775942" cy="307777"/>
+                  <a:ext cx="1775942" cy="315763"/>
                 </a:xfrm>
                 <a:prstGeom prst="rect">
                   <a:avLst/>
@@ -7572,7 +7231,7 @@
                 <a:p>
                   <a:pPr algn="ctr"/>
                   <a:r>
-                    <a:rPr lang="en-GB" sz="1400" dirty="0"/>
+                    <a:rPr lang="en-GB" sz="1288" dirty="0"/>
                     <a:t>Data Hazards</a:t>
                   </a:r>
                 </a:p>
@@ -7720,7 +7379,7 @@
               <a:lstStyle/>
               <a:p>
                 <a:pPr algn="ctr"/>
-                <a:endParaRPr lang="en-GB" dirty="0"/>
+                <a:endParaRPr lang="en-GB" sz="1656" dirty="0"/>
               </a:p>
             </p:txBody>
           </p:sp>
@@ -7739,7 +7398,7 @@
             <p:spPr>
               <a:xfrm>
                 <a:off x="5170148" y="2864746"/>
-                <a:ext cx="1775942" cy="307777"/>
+                <a:ext cx="1775942" cy="315763"/>
               </a:xfrm>
               <a:prstGeom prst="rect">
                 <a:avLst/>
@@ -7753,7 +7412,7 @@
               <a:p>
                 <a:pPr algn="ctr"/>
                 <a:r>
-                  <a:rPr lang="en-GB" sz="1400" dirty="0"/>
+                  <a:rPr lang="en-GB" sz="1288" dirty="0"/>
                   <a:t>Data Hazards</a:t>
                 </a:r>
               </a:p>
@@ -7920,7 +7579,7 @@
                 <a:lstStyle/>
                 <a:p>
                   <a:pPr algn="ctr"/>
-                  <a:endParaRPr lang="en-GB" dirty="0"/>
+                  <a:endParaRPr lang="en-GB" sz="1656" dirty="0"/>
                 </a:p>
               </p:txBody>
             </p:sp>
@@ -7939,7 +7598,7 @@
               <p:spPr>
                 <a:xfrm>
                   <a:off x="5170148" y="2864746"/>
-                  <a:ext cx="1775942" cy="307777"/>
+                  <a:ext cx="1775942" cy="315763"/>
                 </a:xfrm>
                 <a:prstGeom prst="rect">
                   <a:avLst/>
@@ -7953,7 +7612,7 @@
                 <a:p>
                   <a:pPr algn="ctr"/>
                   <a:r>
-                    <a:rPr lang="en-GB" sz="1400" dirty="0"/>
+                    <a:rPr lang="en-GB" sz="1288" dirty="0"/>
                     <a:t>Data Hazards</a:t>
                   </a:r>
                 </a:p>
@@ -8085,7 +7744,7 @@
                 <a:lstStyle/>
                 <a:p>
                   <a:pPr algn="ctr"/>
-                  <a:endParaRPr lang="en-GB" dirty="0"/>
+                  <a:endParaRPr lang="en-GB" sz="1656" dirty="0"/>
                 </a:p>
               </p:txBody>
             </p:sp>
@@ -8104,7 +7763,7 @@
               <p:spPr>
                 <a:xfrm>
                   <a:off x="5170148" y="2864746"/>
-                  <a:ext cx="1775942" cy="307777"/>
+                  <a:ext cx="1775942" cy="315763"/>
                 </a:xfrm>
                 <a:prstGeom prst="rect">
                   <a:avLst/>
@@ -8118,7 +7777,7 @@
                 <a:p>
                   <a:pPr algn="ctr"/>
                   <a:r>
-                    <a:rPr lang="en-GB" sz="1400" dirty="0"/>
+                    <a:rPr lang="en-GB" sz="1288" dirty="0"/>
                     <a:t>Data Hazards</a:t>
                   </a:r>
                 </a:p>
@@ -8230,7 +7889,7 @@
               <a:lstStyle/>
               <a:p>
                 <a:pPr algn="ctr"/>
-                <a:endParaRPr lang="en-GB" dirty="0"/>
+                <a:endParaRPr lang="en-GB" sz="1656" dirty="0"/>
               </a:p>
             </p:txBody>
           </p:sp>
@@ -8249,7 +7908,7 @@
             <p:spPr>
               <a:xfrm>
                 <a:off x="1394975" y="2781166"/>
-                <a:ext cx="1775942" cy="307777"/>
+                <a:ext cx="1775942" cy="315763"/>
               </a:xfrm>
               <a:prstGeom prst="rect">
                 <a:avLst/>
@@ -8263,7 +7922,7 @@
               <a:p>
                 <a:pPr algn="ctr"/>
                 <a:r>
-                  <a:rPr lang="en-GB" sz="1400" dirty="0"/>
+                  <a:rPr lang="en-GB" sz="1288" dirty="0"/>
                   <a:t>Data Hazards</a:t>
                 </a:r>
               </a:p>
@@ -8430,7 +8089,7 @@
                 <a:lstStyle/>
                 <a:p>
                   <a:pPr algn="ctr"/>
-                  <a:endParaRPr lang="en-GB" dirty="0"/>
+                  <a:endParaRPr lang="en-GB" sz="1656" dirty="0"/>
                 </a:p>
               </p:txBody>
             </p:sp>
@@ -8448,8 +8107,8 @@
               </p:nvSpPr>
               <p:spPr>
                 <a:xfrm>
-                  <a:off x="5160721" y="2796742"/>
-                  <a:ext cx="1775942" cy="307777"/>
+                  <a:off x="5160722" y="2796742"/>
+                  <a:ext cx="1775942" cy="315763"/>
                 </a:xfrm>
                 <a:prstGeom prst="rect">
                   <a:avLst/>
@@ -8463,7 +8122,7 @@
                 <a:p>
                   <a:pPr algn="ctr"/>
                   <a:r>
-                    <a:rPr lang="en-GB" sz="1400" dirty="0"/>
+                    <a:rPr lang="en-GB" sz="1288" dirty="0"/>
                     <a:t>Data Hazards</a:t>
                   </a:r>
                 </a:p>
@@ -8595,7 +8254,7 @@
                 <a:lstStyle/>
                 <a:p>
                   <a:pPr algn="ctr"/>
-                  <a:endParaRPr lang="en-GB" dirty="0"/>
+                  <a:endParaRPr lang="en-GB" sz="1656" dirty="0"/>
                 </a:p>
               </p:txBody>
             </p:sp>
@@ -8614,7 +8273,7 @@
               <p:spPr>
                 <a:xfrm>
                   <a:off x="5153215" y="2864746"/>
-                  <a:ext cx="1775942" cy="307777"/>
+                  <a:ext cx="1775942" cy="315763"/>
                 </a:xfrm>
                 <a:prstGeom prst="rect">
                   <a:avLst/>
@@ -8628,7 +8287,7 @@
                 <a:p>
                   <a:pPr algn="ctr"/>
                   <a:r>
-                    <a:rPr lang="en-GB" sz="1400" dirty="0"/>
+                    <a:rPr lang="en-GB" sz="1288" dirty="0"/>
                     <a:t>Data Hazards</a:t>
                   </a:r>
                 </a:p>
@@ -8760,7 +8419,7 @@
                 <a:lstStyle/>
                 <a:p>
                   <a:pPr algn="ctr"/>
-                  <a:endParaRPr lang="en-GB" dirty="0"/>
+                  <a:endParaRPr lang="en-GB" sz="1656" dirty="0"/>
                 </a:p>
               </p:txBody>
             </p:sp>
@@ -8779,7 +8438,7 @@
               <p:spPr>
                 <a:xfrm>
                   <a:off x="5170148" y="2864746"/>
-                  <a:ext cx="1775942" cy="523220"/>
+                  <a:ext cx="1775942" cy="531173"/>
                 </a:xfrm>
                 <a:prstGeom prst="rect">
                   <a:avLst/>
@@ -8793,13 +8452,13 @@
                 <a:p>
                   <a:pPr algn="ctr"/>
                   <a:r>
-                    <a:rPr lang="en-GB" sz="1400" dirty="0"/>
+                    <a:rPr lang="en-GB" sz="1288" dirty="0"/>
                     <a:t>Data Hazards</a:t>
                   </a:r>
                 </a:p>
                 <a:p>
                   <a:pPr algn="ctr"/>
-                  <a:endParaRPr lang="en-GB" sz="1400" dirty="0"/>
+                  <a:endParaRPr lang="en-GB" sz="1288" dirty="0"/>
                 </a:p>
               </p:txBody>
             </p:sp>
@@ -8945,7 +8604,7 @@
               <a:lstStyle/>
               <a:p>
                 <a:pPr algn="ctr"/>
-                <a:endParaRPr lang="en-GB" dirty="0"/>
+                <a:endParaRPr lang="en-GB" sz="1656" dirty="0"/>
               </a:p>
             </p:txBody>
           </p:sp>
@@ -8964,7 +8623,7 @@
             <p:spPr>
               <a:xfrm>
                 <a:off x="1394975" y="2781166"/>
-                <a:ext cx="1775942" cy="307777"/>
+                <a:ext cx="1775942" cy="315763"/>
               </a:xfrm>
               <a:prstGeom prst="rect">
                 <a:avLst/>
@@ -8978,7 +8637,7 @@
               <a:p>
                 <a:pPr algn="ctr"/>
                 <a:r>
-                  <a:rPr lang="en-GB" sz="1400" dirty="0"/>
+                  <a:rPr lang="en-GB" sz="1288" dirty="0"/>
                   <a:t>Data Hazards</a:t>
                 </a:r>
               </a:p>
@@ -9073,7 +8732,7 @@
                 <a:lstStyle/>
                 <a:p>
                   <a:pPr algn="ctr"/>
-                  <a:endParaRPr lang="en-GB" dirty="0"/>
+                  <a:endParaRPr lang="en-GB" sz="1656" dirty="0"/>
                 </a:p>
               </p:txBody>
             </p:sp>
@@ -9092,7 +8751,7 @@
               <p:spPr>
                 <a:xfrm>
                   <a:off x="1394975" y="2781166"/>
-                  <a:ext cx="1775942" cy="307777"/>
+                  <a:ext cx="1775942" cy="315763"/>
                 </a:xfrm>
                 <a:prstGeom prst="rect">
                   <a:avLst/>
@@ -9106,7 +8765,7 @@
                 <a:p>
                   <a:pPr algn="ctr"/>
                   <a:r>
-                    <a:rPr lang="en-GB" sz="1400" dirty="0"/>
+                    <a:rPr lang="en-GB" sz="1288" dirty="0"/>
                     <a:t>Data Hazards</a:t>
                   </a:r>
                 </a:p>
@@ -9238,7 +8897,7 @@
                 <a:lstStyle/>
                 <a:p>
                   <a:pPr algn="ctr"/>
-                  <a:endParaRPr lang="en-GB" dirty="0"/>
+                  <a:endParaRPr lang="en-GB" sz="1656" dirty="0"/>
                 </a:p>
               </p:txBody>
             </p:sp>
@@ -9257,7 +8916,7 @@
               <p:spPr>
                 <a:xfrm>
                   <a:off x="1394975" y="2781166"/>
-                  <a:ext cx="1775942" cy="307777"/>
+                  <a:ext cx="1775942" cy="315763"/>
                 </a:xfrm>
                 <a:prstGeom prst="rect">
                   <a:avLst/>
@@ -9271,7 +8930,7 @@
                 <a:p>
                   <a:pPr algn="ctr"/>
                   <a:r>
-                    <a:rPr lang="en-GB" sz="1400" dirty="0"/>
+                    <a:rPr lang="en-GB" sz="1288" dirty="0"/>
                     <a:t>Data Hazards</a:t>
                   </a:r>
                 </a:p>
@@ -9330,7 +8989,7 @@
           <p:spPr>
             <a:xfrm>
               <a:off x="1227323" y="1907564"/>
-              <a:ext cx="1775942" cy="307777"/>
+              <a:ext cx="1775942" cy="315763"/>
             </a:xfrm>
             <a:prstGeom prst="rect">
               <a:avLst/>
@@ -9344,7 +9003,7 @@
             <a:p>
               <a:pPr algn="ctr"/>
               <a:r>
-                <a:rPr lang="en-GB" sz="1400" dirty="0"/>
+                <a:rPr lang="en-GB" sz="1288" dirty="0"/>
                 <a:t>Data Hazards</a:t>
               </a:r>
             </a:p>
@@ -9494,7 +9153,7 @@
                   <a:lstStyle/>
                   <a:p>
                     <a:pPr algn="ctr"/>
-                    <a:endParaRPr lang="en-GB" dirty="0"/>
+                    <a:endParaRPr lang="en-GB" sz="1656" dirty="0"/>
                   </a:p>
                 </p:txBody>
               </p:sp>
@@ -9513,7 +9172,7 @@
                 <p:spPr>
                   <a:xfrm>
                     <a:off x="1394975" y="2781166"/>
-                    <a:ext cx="1775942" cy="307777"/>
+                    <a:ext cx="1775942" cy="315763"/>
                   </a:xfrm>
                   <a:prstGeom prst="rect">
                     <a:avLst/>
@@ -9527,7 +9186,7 @@
                   <a:p>
                     <a:pPr algn="ctr"/>
                     <a:r>
-                      <a:rPr lang="en-GB" sz="1400" dirty="0"/>
+                      <a:rPr lang="en-GB" sz="1288" dirty="0"/>
                       <a:t>Data Hazards</a:t>
                     </a:r>
                   </a:p>
@@ -9732,7 +9391,7 @@
                 <a:lstStyle/>
                 <a:p>
                   <a:pPr algn="ctr"/>
-                  <a:endParaRPr lang="en-GB" dirty="0"/>
+                  <a:endParaRPr lang="en-GB" sz="1656" dirty="0"/>
                 </a:p>
               </p:txBody>
             </p:sp>
@@ -9751,7 +9410,7 @@
               <p:spPr>
                 <a:xfrm>
                   <a:off x="1394975" y="2781166"/>
-                  <a:ext cx="1775942" cy="307777"/>
+                  <a:ext cx="1775942" cy="315763"/>
                 </a:xfrm>
                 <a:prstGeom prst="rect">
                   <a:avLst/>
@@ -9765,7 +9424,7 @@
                 <a:p>
                   <a:pPr algn="ctr"/>
                   <a:r>
-                    <a:rPr lang="en-GB" sz="1400" dirty="0"/>
+                    <a:rPr lang="en-GB" sz="1288" dirty="0"/>
                     <a:t>Data Hazards</a:t>
                   </a:r>
                 </a:p>
@@ -9897,7 +9556,7 @@
                 <a:lstStyle/>
                 <a:p>
                   <a:pPr algn="ctr"/>
-                  <a:endParaRPr lang="en-GB" dirty="0"/>
+                  <a:endParaRPr lang="en-GB" sz="1656" dirty="0"/>
                 </a:p>
               </p:txBody>
             </p:sp>
@@ -9916,7 +9575,7 @@
               <p:spPr>
                 <a:xfrm>
                   <a:off x="1394975" y="2781166"/>
-                  <a:ext cx="1775942" cy="307777"/>
+                  <a:ext cx="1775942" cy="315763"/>
                 </a:xfrm>
                 <a:prstGeom prst="rect">
                   <a:avLst/>
@@ -9930,7 +9589,7 @@
                 <a:p>
                   <a:pPr algn="ctr"/>
                   <a:r>
-                    <a:rPr lang="en-GB" sz="1400" dirty="0"/>
+                    <a:rPr lang="en-GB" sz="1288" dirty="0"/>
                     <a:t>Data Hazards</a:t>
                   </a:r>
                 </a:p>
@@ -10045,8 +9704,8 @@
           </p:nvSpPr>
           <p:spPr>
             <a:xfrm>
-              <a:off x="-1398297" y="12996407"/>
-              <a:ext cx="8226226" cy="1862048"/>
+              <a:off x="-1398420" y="12996407"/>
+              <a:ext cx="8226474" cy="1862025"/>
             </a:xfrm>
             <a:prstGeom prst="rect">
               <a:avLst/>
@@ -10054,23 +9713,20 @@
             <a:noFill/>
           </p:spPr>
           <p:txBody>
-            <a:bodyPr wrap="none" lIns="91440" tIns="45720" rIns="91440" bIns="45720">
+            <a:bodyPr wrap="none" lIns="84133" tIns="42066" rIns="84133" bIns="42066">
               <a:spAutoFit/>
             </a:bodyPr>
             <a:lstStyle/>
             <a:p>
               <a:pPr algn="ctr"/>
               <a:r>
-                <a:rPr lang="en-GB" sz="11500" b="1" cap="none" spc="0" dirty="0">
+                <a:rPr lang="en-GB" sz="10581" b="1" dirty="0">
                   <a:ln w="9525">
                     <a:solidFill>
                       <a:schemeClr val="bg1"/>
                     </a:solidFill>
                     <a:prstDash val="solid"/>
                   </a:ln>
-                  <a:solidFill>
-                    <a:schemeClr val="tx1"/>
-                  </a:solidFill>
                   <a:effectLst>
                     <a:outerShdw blurRad="12700" dist="38100" dir="2700000" algn="tl" rotWithShape="0">
                       <a:schemeClr val="bg1">
@@ -10129,8 +9785,8 @@
         </p:nvGrpSpPr>
         <p:grpSpPr>
           <a:xfrm>
-            <a:off x="304571" y="-5626009"/>
-            <a:ext cx="14625111" cy="14562982"/>
+            <a:off x="1871503" y="-4731717"/>
+            <a:ext cx="13456338" cy="13399174"/>
             <a:chOff x="408446" y="-5854609"/>
             <a:chExt cx="14625111" cy="14562982"/>
           </a:xfrm>
@@ -10203,7 +9859,7 @@
               <a:lstStyle/>
               <a:p>
                 <a:pPr algn="ctr"/>
-                <a:endParaRPr lang="en-GB" dirty="0"/>
+                <a:endParaRPr lang="en-GB" sz="1656" dirty="0"/>
               </a:p>
             </p:txBody>
           </p:sp>
@@ -10222,7 +9878,7 @@
             <p:spPr>
               <a:xfrm>
                 <a:off x="1394975" y="2815032"/>
-                <a:ext cx="1775942" cy="307777"/>
+                <a:ext cx="1775942" cy="315763"/>
               </a:xfrm>
               <a:prstGeom prst="rect">
                 <a:avLst/>
@@ -10236,7 +9892,7 @@
               <a:p>
                 <a:pPr algn="ctr"/>
                 <a:r>
-                  <a:rPr lang="en-GB" sz="1400" dirty="0"/>
+                  <a:rPr lang="en-GB" sz="1288" dirty="0"/>
                   <a:t>Data Hazards</a:t>
                 </a:r>
               </a:p>
@@ -10440,7 +10096,7 @@
               <a:lstStyle/>
               <a:p>
                 <a:pPr algn="ctr"/>
-                <a:endParaRPr lang="en-GB" dirty="0"/>
+                <a:endParaRPr lang="en-GB" sz="1656" dirty="0"/>
               </a:p>
             </p:txBody>
           </p:sp>
@@ -10459,9 +10115,9 @@
             <p:grpSpPr>
               <a:xfrm>
                 <a:off x="2820343" y="2289323"/>
-                <a:ext cx="1944240" cy="1718753"/>
+                <a:ext cx="1944240" cy="1726739"/>
                 <a:chOff x="3225307" y="3242931"/>
-                <a:chExt cx="1944240" cy="1718753"/>
+                <a:chExt cx="1944240" cy="1726739"/>
               </a:xfrm>
             </p:grpSpPr>
             <p:sp>
@@ -10479,7 +10135,7 @@
               <p:spPr>
                 <a:xfrm>
                   <a:off x="3286527" y="4653907"/>
-                  <a:ext cx="1775942" cy="307777"/>
+                  <a:ext cx="1775942" cy="315763"/>
                 </a:xfrm>
                 <a:prstGeom prst="rect">
                   <a:avLst/>
@@ -10493,7 +10149,7 @@
                 <a:p>
                   <a:pPr algn="ctr"/>
                   <a:r>
-                    <a:rPr lang="en-GB" sz="1400" dirty="0"/>
+                    <a:rPr lang="en-GB" sz="1288" dirty="0"/>
                     <a:t>Data Hazards</a:t>
                   </a:r>
                 </a:p>
@@ -10641,7 +10297,7 @@
               <a:lstStyle/>
               <a:p>
                 <a:pPr algn="ctr"/>
-                <a:endParaRPr lang="en-GB" dirty="0"/>
+                <a:endParaRPr lang="en-GB" sz="1656" dirty="0"/>
               </a:p>
             </p:txBody>
           </p:sp>
@@ -10660,7 +10316,7 @@
             <p:spPr>
               <a:xfrm>
                 <a:off x="5170148" y="2864746"/>
-                <a:ext cx="1775942" cy="307777"/>
+                <a:ext cx="1775942" cy="315763"/>
               </a:xfrm>
               <a:prstGeom prst="rect">
                 <a:avLst/>
@@ -10674,7 +10330,7 @@
               <a:p>
                 <a:pPr algn="ctr"/>
                 <a:r>
-                  <a:rPr lang="en-GB" sz="1400" dirty="0"/>
+                  <a:rPr lang="en-GB" sz="1288" dirty="0"/>
                   <a:t>Data Hazards</a:t>
                 </a:r>
               </a:p>
@@ -10841,7 +10497,7 @@
                 <a:lstStyle/>
                 <a:p>
                   <a:pPr algn="ctr"/>
-                  <a:endParaRPr lang="en-GB" dirty="0"/>
+                  <a:endParaRPr lang="en-GB" sz="1656" dirty="0"/>
                 </a:p>
               </p:txBody>
             </p:sp>
@@ -10860,7 +10516,7 @@
               <p:spPr>
                 <a:xfrm>
                   <a:off x="5170148" y="2864746"/>
-                  <a:ext cx="1775942" cy="307777"/>
+                  <a:ext cx="1775942" cy="315763"/>
                 </a:xfrm>
                 <a:prstGeom prst="rect">
                   <a:avLst/>
@@ -10874,7 +10530,7 @@
                 <a:p>
                   <a:pPr algn="ctr"/>
                   <a:r>
-                    <a:rPr lang="en-GB" sz="1400" dirty="0"/>
+                    <a:rPr lang="en-GB" sz="1288" dirty="0"/>
                     <a:t>Data Hazards</a:t>
                   </a:r>
                 </a:p>
@@ -11006,7 +10662,7 @@
                 <a:lstStyle/>
                 <a:p>
                   <a:pPr algn="ctr"/>
-                  <a:endParaRPr lang="en-GB" dirty="0"/>
+                  <a:endParaRPr lang="en-GB" sz="1656" dirty="0"/>
                 </a:p>
               </p:txBody>
             </p:sp>
@@ -11025,7 +10681,7 @@
               <p:spPr>
                 <a:xfrm>
                   <a:off x="5170148" y="2864746"/>
-                  <a:ext cx="1775942" cy="307777"/>
+                  <a:ext cx="1775942" cy="315763"/>
                 </a:xfrm>
                 <a:prstGeom prst="rect">
                   <a:avLst/>
@@ -11039,7 +10695,7 @@
                 <a:p>
                   <a:pPr algn="ctr"/>
                   <a:r>
-                    <a:rPr lang="en-GB" sz="1400" dirty="0"/>
+                    <a:rPr lang="en-GB" sz="1288" dirty="0"/>
                     <a:t>Data Hazards</a:t>
                   </a:r>
                 </a:p>
@@ -11151,7 +10807,7 @@
               <a:lstStyle/>
               <a:p>
                 <a:pPr algn="ctr"/>
-                <a:endParaRPr lang="en-GB" dirty="0"/>
+                <a:endParaRPr lang="en-GB" sz="1656" dirty="0"/>
               </a:p>
             </p:txBody>
           </p:sp>
@@ -11170,7 +10826,7 @@
             <p:spPr>
               <a:xfrm>
                 <a:off x="1394975" y="2781166"/>
-                <a:ext cx="1775942" cy="307777"/>
+                <a:ext cx="1775942" cy="315763"/>
               </a:xfrm>
               <a:prstGeom prst="rect">
                 <a:avLst/>
@@ -11184,7 +10840,7 @@
               <a:p>
                 <a:pPr algn="ctr"/>
                 <a:r>
-                  <a:rPr lang="en-GB" sz="1400" dirty="0"/>
+                  <a:rPr lang="en-GB" sz="1288" dirty="0"/>
                   <a:t>Data Hazards</a:t>
                 </a:r>
               </a:p>
@@ -11351,7 +11007,7 @@
                 <a:lstStyle/>
                 <a:p>
                   <a:pPr algn="ctr"/>
-                  <a:endParaRPr lang="en-GB" dirty="0"/>
+                  <a:endParaRPr lang="en-GB" sz="1656" dirty="0"/>
                 </a:p>
               </p:txBody>
             </p:sp>
@@ -11369,8 +11025,8 @@
               </p:nvSpPr>
               <p:spPr>
                 <a:xfrm>
-                  <a:off x="5160721" y="2796742"/>
-                  <a:ext cx="1775942" cy="307777"/>
+                  <a:off x="5160722" y="2796742"/>
+                  <a:ext cx="1775942" cy="315763"/>
                 </a:xfrm>
                 <a:prstGeom prst="rect">
                   <a:avLst/>
@@ -11384,7 +11040,7 @@
                 <a:p>
                   <a:pPr algn="ctr"/>
                   <a:r>
-                    <a:rPr lang="en-GB" sz="1400" dirty="0"/>
+                    <a:rPr lang="en-GB" sz="1288" dirty="0"/>
                     <a:t>Data Hazards</a:t>
                   </a:r>
                 </a:p>
@@ -11516,7 +11172,7 @@
                 <a:lstStyle/>
                 <a:p>
                   <a:pPr algn="ctr"/>
-                  <a:endParaRPr lang="en-GB" dirty="0"/>
+                  <a:endParaRPr lang="en-GB" sz="1656" dirty="0"/>
                 </a:p>
               </p:txBody>
             </p:sp>
@@ -11535,7 +11191,7 @@
               <p:spPr>
                 <a:xfrm>
                   <a:off x="5153215" y="2864746"/>
-                  <a:ext cx="1775942" cy="307777"/>
+                  <a:ext cx="1775942" cy="315763"/>
                 </a:xfrm>
                 <a:prstGeom prst="rect">
                   <a:avLst/>
@@ -11549,7 +11205,7 @@
                 <a:p>
                   <a:pPr algn="ctr"/>
                   <a:r>
-                    <a:rPr lang="en-GB" sz="1400" dirty="0"/>
+                    <a:rPr lang="en-GB" sz="1288" dirty="0"/>
                     <a:t>Data Hazards</a:t>
                   </a:r>
                 </a:p>
@@ -11681,7 +11337,7 @@
                 <a:lstStyle/>
                 <a:p>
                   <a:pPr algn="ctr"/>
-                  <a:endParaRPr lang="en-GB" dirty="0"/>
+                  <a:endParaRPr lang="en-GB" sz="1656" dirty="0"/>
                 </a:p>
               </p:txBody>
             </p:sp>
@@ -11700,7 +11356,7 @@
               <p:spPr>
                 <a:xfrm>
                   <a:off x="5170148" y="2864746"/>
-                  <a:ext cx="1775942" cy="523220"/>
+                  <a:ext cx="1775942" cy="531173"/>
                 </a:xfrm>
                 <a:prstGeom prst="rect">
                   <a:avLst/>
@@ -11714,13 +11370,13 @@
                 <a:p>
                   <a:pPr algn="ctr"/>
                   <a:r>
-                    <a:rPr lang="en-GB" sz="1400" dirty="0"/>
+                    <a:rPr lang="en-GB" sz="1288" dirty="0"/>
                     <a:t>Data Hazards</a:t>
                   </a:r>
                 </a:p>
                 <a:p>
                   <a:pPr algn="ctr"/>
-                  <a:endParaRPr lang="en-GB" sz="1400" dirty="0"/>
+                  <a:endParaRPr lang="en-GB" sz="1288" dirty="0"/>
                 </a:p>
               </p:txBody>
             </p:sp>
@@ -11866,7 +11522,7 @@
               <a:lstStyle/>
               <a:p>
                 <a:pPr algn="ctr"/>
-                <a:endParaRPr lang="en-GB" dirty="0"/>
+                <a:endParaRPr lang="en-GB" sz="1656" dirty="0"/>
               </a:p>
             </p:txBody>
           </p:sp>
@@ -11885,7 +11541,7 @@
             <p:spPr>
               <a:xfrm>
                 <a:off x="1394975" y="2781166"/>
-                <a:ext cx="1775942" cy="307777"/>
+                <a:ext cx="1775942" cy="315763"/>
               </a:xfrm>
               <a:prstGeom prst="rect">
                 <a:avLst/>
@@ -11899,7 +11555,7 @@
               <a:p>
                 <a:pPr algn="ctr"/>
                 <a:r>
-                  <a:rPr lang="en-GB" sz="1400" dirty="0"/>
+                  <a:rPr lang="en-GB" sz="1288" dirty="0"/>
                   <a:t>Data Hazards</a:t>
                 </a:r>
               </a:p>
@@ -11994,7 +11650,7 @@
                 <a:lstStyle/>
                 <a:p>
                   <a:pPr algn="ctr"/>
-                  <a:endParaRPr lang="en-GB" dirty="0"/>
+                  <a:endParaRPr lang="en-GB" sz="1656" dirty="0"/>
                 </a:p>
               </p:txBody>
             </p:sp>
@@ -12013,7 +11669,7 @@
               <p:spPr>
                 <a:xfrm>
                   <a:off x="1394975" y="2781166"/>
-                  <a:ext cx="1775942" cy="307777"/>
+                  <a:ext cx="1775942" cy="315763"/>
                 </a:xfrm>
                 <a:prstGeom prst="rect">
                   <a:avLst/>
@@ -12027,7 +11683,7 @@
                 <a:p>
                   <a:pPr algn="ctr"/>
                   <a:r>
-                    <a:rPr lang="en-GB" sz="1400" dirty="0"/>
+                    <a:rPr lang="en-GB" sz="1288" dirty="0"/>
                     <a:t>Data Hazards</a:t>
                   </a:r>
                 </a:p>
@@ -12159,7 +11815,7 @@
                 <a:lstStyle/>
                 <a:p>
                   <a:pPr algn="ctr"/>
-                  <a:endParaRPr lang="en-GB" dirty="0"/>
+                  <a:endParaRPr lang="en-GB" sz="1656" dirty="0"/>
                 </a:p>
               </p:txBody>
             </p:sp>
@@ -12178,7 +11834,7 @@
               <p:spPr>
                 <a:xfrm>
                   <a:off x="1394975" y="2781166"/>
-                  <a:ext cx="1775942" cy="307777"/>
+                  <a:ext cx="1775942" cy="315763"/>
                 </a:xfrm>
                 <a:prstGeom prst="rect">
                   <a:avLst/>
@@ -12192,7 +11848,7 @@
                 <a:p>
                   <a:pPr algn="ctr"/>
                   <a:r>
-                    <a:rPr lang="en-GB" sz="1400" dirty="0"/>
+                    <a:rPr lang="en-GB" sz="1288" dirty="0"/>
                     <a:t>Data Hazards</a:t>
                   </a:r>
                 </a:p>
@@ -12344,7 +12000,7 @@
                   <a:lstStyle/>
                   <a:p>
                     <a:pPr algn="ctr"/>
-                    <a:endParaRPr lang="en-GB" dirty="0"/>
+                    <a:endParaRPr lang="en-GB" sz="1656" dirty="0"/>
                   </a:p>
                 </p:txBody>
               </p:sp>
@@ -12363,7 +12019,7 @@
                 <p:spPr>
                   <a:xfrm>
                     <a:off x="1394975" y="2781166"/>
-                    <a:ext cx="1775942" cy="307777"/>
+                    <a:ext cx="1775942" cy="315763"/>
                   </a:xfrm>
                   <a:prstGeom prst="rect">
                     <a:avLst/>
@@ -12377,7 +12033,7 @@
                   <a:p>
                     <a:pPr algn="ctr"/>
                     <a:r>
-                      <a:rPr lang="en-GB" sz="1400" dirty="0"/>
+                      <a:rPr lang="en-GB" sz="1288" dirty="0"/>
                       <a:t>Data Hazards</a:t>
                     </a:r>
                   </a:p>
@@ -12695,7 +12351,7 @@
                   <a:lstStyle/>
                   <a:p>
                     <a:pPr algn="ctr"/>
-                    <a:endParaRPr lang="en-GB" dirty="0"/>
+                    <a:endParaRPr lang="en-GB" sz="1656" dirty="0"/>
                   </a:p>
                 </p:txBody>
               </p:sp>
@@ -12714,7 +12370,7 @@
                 <p:spPr>
                   <a:xfrm>
                     <a:off x="1394975" y="2781166"/>
-                    <a:ext cx="1775942" cy="307777"/>
+                    <a:ext cx="1775942" cy="315763"/>
                   </a:xfrm>
                   <a:prstGeom prst="rect">
                     <a:avLst/>
@@ -12728,7 +12384,7 @@
                   <a:p>
                     <a:pPr algn="ctr"/>
                     <a:r>
-                      <a:rPr lang="en-GB" sz="1400" dirty="0"/>
+                      <a:rPr lang="en-GB" sz="1288" dirty="0"/>
                       <a:t>Data Hazards</a:t>
                     </a:r>
                   </a:p>
@@ -12933,7 +12589,7 @@
                 <a:lstStyle/>
                 <a:p>
                   <a:pPr algn="ctr"/>
-                  <a:endParaRPr lang="en-GB" dirty="0"/>
+                  <a:endParaRPr lang="en-GB" sz="1656" dirty="0"/>
                 </a:p>
               </p:txBody>
             </p:sp>
@@ -12952,7 +12608,7 @@
               <p:spPr>
                 <a:xfrm>
                   <a:off x="1394975" y="2781166"/>
-                  <a:ext cx="1775942" cy="307777"/>
+                  <a:ext cx="1775942" cy="315763"/>
                 </a:xfrm>
                 <a:prstGeom prst="rect">
                   <a:avLst/>
@@ -12966,7 +12622,7 @@
                 <a:p>
                   <a:pPr algn="ctr"/>
                   <a:r>
-                    <a:rPr lang="en-GB" sz="1400" dirty="0"/>
+                    <a:rPr lang="en-GB" sz="1288" dirty="0"/>
                     <a:t>Data Hazards</a:t>
                   </a:r>
                 </a:p>
@@ -13098,7 +12754,7 @@
                 <a:lstStyle/>
                 <a:p>
                   <a:pPr algn="ctr"/>
-                  <a:endParaRPr lang="en-GB" dirty="0"/>
+                  <a:endParaRPr lang="en-GB" sz="1656" dirty="0"/>
                 </a:p>
               </p:txBody>
             </p:sp>
@@ -13117,7 +12773,7 @@
               <p:spPr>
                 <a:xfrm>
                   <a:off x="1394975" y="2781166"/>
-                  <a:ext cx="1775942" cy="307777"/>
+                  <a:ext cx="1775942" cy="315763"/>
                 </a:xfrm>
                 <a:prstGeom prst="rect">
                   <a:avLst/>
@@ -13131,7 +12787,7 @@
                 <a:p>
                   <a:pPr algn="ctr"/>
                   <a:r>
-                    <a:rPr lang="en-GB" sz="1400" dirty="0"/>
+                    <a:rPr lang="en-GB" sz="1288" dirty="0"/>
                     <a:t>Data Hazards</a:t>
                   </a:r>
                 </a:p>
@@ -13247,8 +12903,8 @@
         </p:nvSpPr>
         <p:spPr>
           <a:xfrm>
-            <a:off x="3504014" y="88449"/>
-            <a:ext cx="8226226" cy="1862048"/>
+            <a:off x="4815148" y="526068"/>
+            <a:ext cx="7569051" cy="1713220"/>
           </a:xfrm>
           <a:prstGeom prst="rect">
             <a:avLst/>
@@ -13256,14 +12912,14 @@
           <a:noFill/>
         </p:spPr>
         <p:txBody>
-          <a:bodyPr wrap="none" lIns="91440" tIns="45720" rIns="91440" bIns="45720">
+          <a:bodyPr wrap="none" lIns="84133" tIns="42066" rIns="84133" bIns="42066">
             <a:spAutoFit/>
           </a:bodyPr>
           <a:lstStyle/>
           <a:p>
             <a:pPr algn="ctr"/>
             <a:r>
-              <a:rPr lang="en-GB" sz="11500" b="1" cap="none" spc="0" dirty="0">
+              <a:rPr lang="en-GB" sz="10581" b="1" dirty="0">
                 <a:ln w="9525">
                   <a:solidFill>
                     <a:schemeClr val="bg1"/>
@@ -13331,8 +12987,8 @@
         </p:nvSpPr>
         <p:spPr>
           <a:xfrm>
-            <a:off x="3885584" y="209665"/>
-            <a:ext cx="6118797" cy="6004424"/>
+            <a:off x="5166338" y="637598"/>
+            <a:ext cx="5629810" cy="5524577"/>
           </a:xfrm>
           <a:prstGeom prst="diamond">
             <a:avLst/>
@@ -13365,7 +13021,7 @@
           <a:lstStyle/>
           <a:p>
             <a:pPr algn="ctr"/>
-            <a:endParaRPr lang="en-GB" dirty="0"/>
+            <a:endParaRPr lang="en-GB" sz="1656" dirty="0"/>
           </a:p>
         </p:txBody>
       </p:sp>
@@ -13395,8 +13051,8 @@
         </p:blipFill>
         <p:spPr>
           <a:xfrm>
-            <a:off x="-2674573" y="-1486866"/>
-            <a:ext cx="5349146" cy="5326228"/>
+            <a:off x="-869562" y="-923356"/>
+            <a:ext cx="4921666" cy="4900580"/>
           </a:xfrm>
         </p:spPr>
       </p:pic>
@@ -13456,8 +13112,8 @@
         </p:blipFill>
         <p:spPr>
           <a:xfrm>
-            <a:off x="2789408" y="243714"/>
-            <a:ext cx="6613184" cy="6455258"/>
+            <a:off x="4157762" y="668926"/>
+            <a:ext cx="6084688" cy="5939383"/>
           </a:xfrm>
         </p:spPr>
       </p:pic>
@@ -13475,8 +13131,8 @@
         </p:nvSpPr>
         <p:spPr>
           <a:xfrm>
-            <a:off x="3174198" y="1909594"/>
-            <a:ext cx="6112545" cy="2800767"/>
+            <a:off x="4511803" y="2201675"/>
+            <a:ext cx="5624058" cy="2577046"/>
           </a:xfrm>
           <a:prstGeom prst="rect">
             <a:avLst/>
@@ -13491,23 +13147,20 @@
           </a:effectLst>
         </p:spPr>
         <p:txBody>
-          <a:bodyPr wrap="square" lIns="91440" tIns="45720" rIns="91440" bIns="45720">
+          <a:bodyPr wrap="square" lIns="84133" tIns="42066" rIns="84133" bIns="42066">
             <a:spAutoFit/>
           </a:bodyPr>
           <a:lstStyle/>
           <a:p>
             <a:pPr algn="ctr"/>
             <a:r>
-              <a:rPr lang="en-GB" sz="8800" b="1" cap="none" spc="0" dirty="0">
+              <a:rPr lang="en-GB" sz="8097" b="1" dirty="0">
                 <a:ln w="9525">
                   <a:solidFill>
                     <a:schemeClr val="bg1"/>
                   </a:solidFill>
                   <a:prstDash val="solid"/>
                 </a:ln>
-                <a:solidFill>
-                  <a:schemeClr val="tx1"/>
-                </a:solidFill>
                 <a:effectLst>
                   <a:outerShdw blurRad="12700" dist="38100" dir="2700000" algn="tl" rotWithShape="0">
                     <a:schemeClr val="bg1">
@@ -13565,8 +13218,8 @@
         </p:nvGrpSpPr>
         <p:grpSpPr>
           <a:xfrm>
-            <a:off x="3566362" y="1212145"/>
-            <a:ext cx="3394842" cy="3394842"/>
+            <a:off x="4872628" y="1559964"/>
+            <a:ext cx="3123541" cy="3123541"/>
             <a:chOff x="4351271" y="624005"/>
             <a:chExt cx="3394842" cy="3394842"/>
           </a:xfrm>
@@ -13619,7 +13272,7 @@
             <a:lstStyle/>
             <a:p>
               <a:pPr algn="ctr"/>
-              <a:endParaRPr lang="en-GB" dirty="0"/>
+              <a:endParaRPr lang="en-GB" sz="1656" dirty="0"/>
             </a:p>
           </p:txBody>
         </p:sp>
@@ -13638,7 +13291,7 @@
           <p:spPr>
             <a:xfrm>
               <a:off x="5170148" y="2864746"/>
-              <a:ext cx="1775942" cy="523220"/>
+              <a:ext cx="1775942" cy="531173"/>
             </a:xfrm>
             <a:prstGeom prst="rect">
               <a:avLst/>
@@ -13652,13 +13305,13 @@
             <a:p>
               <a:pPr algn="ctr"/>
               <a:r>
-                <a:rPr lang="en-GB" sz="1400" dirty="0"/>
+                <a:rPr lang="en-GB" sz="1288" dirty="0"/>
                 <a:t>Danger of misuse</a:t>
               </a:r>
             </a:p>
             <a:p>
               <a:pPr algn="ctr"/>
-              <a:endParaRPr lang="en-GB" sz="1400" dirty="0"/>
+              <a:endParaRPr lang="en-GB" sz="1288" dirty="0"/>
             </a:p>
           </p:txBody>
         </p:sp>
@@ -13691,8 +13344,8 @@
         </p:blipFill>
         <p:spPr>
           <a:xfrm>
-            <a:off x="4452970" y="1838750"/>
-            <a:ext cx="1345171" cy="1345171"/>
+            <a:off x="5688383" y="2136495"/>
+            <a:ext cx="1237671" cy="1237671"/>
           </a:xfrm>
           <a:prstGeom prst="rect">
             <a:avLst/>
@@ -13727,8 +13380,8 @@
         </p:blipFill>
         <p:spPr>
           <a:xfrm rot="17556866">
-            <a:off x="5208059" y="2645336"/>
-            <a:ext cx="522641" cy="522641"/>
+            <a:off x="6383127" y="2878620"/>
+            <a:ext cx="480874" cy="480874"/>
           </a:xfrm>
           <a:prstGeom prst="rect">
             <a:avLst/>
@@ -13751,7 +13404,7 @@
 <file path=ppt/theme/theme1.xml><?xml version="1.0" encoding="utf-8"?>
 <a:theme xmlns:a="http://schemas.openxmlformats.org/drawingml/2006/main" name="Office Theme">
   <a:themeElements>
-    <a:clrScheme name="Office">
+    <a:clrScheme name="Office Theme">
       <a:dk1>
         <a:sysClr val="windowText" lastClr="000000"/>
       </a:dk1>
@@ -13789,7 +13442,7 @@
         <a:srgbClr val="954F72"/>
       </a:folHlink>
     </a:clrScheme>
-    <a:fontScheme name="Office">
+    <a:fontScheme name="Office Theme">
       <a:majorFont>
         <a:latin typeface="Calibri Light" panose="020F0302020204030204"/>
         <a:ea typeface=""/>
@@ -13824,23 +13477,6 @@
         <a:font script="Viet" typeface="Times New Roman"/>
         <a:font script="Uigh" typeface="Microsoft Uighur"/>
         <a:font script="Geor" typeface="Sylfaen"/>
-        <a:font script="Armn" typeface="Arial"/>
-        <a:font script="Bugi" typeface="Leelawadee UI"/>
-        <a:font script="Bopo" typeface="Microsoft JhengHei"/>
-        <a:font script="Java" typeface="Javanese Text"/>
-        <a:font script="Lisu" typeface="Segoe UI"/>
-        <a:font script="Mymr" typeface="Myanmar Text"/>
-        <a:font script="Nkoo" typeface="Ebrima"/>
-        <a:font script="Olck" typeface="Nirmala UI"/>
-        <a:font script="Osma" typeface="Ebrima"/>
-        <a:font script="Phag" typeface="Phagspa"/>
-        <a:font script="Syrn" typeface="Estrangelo Edessa"/>
-        <a:font script="Syrj" typeface="Estrangelo Edessa"/>
-        <a:font script="Syre" typeface="Estrangelo Edessa"/>
-        <a:font script="Sora" typeface="Nirmala UI"/>
-        <a:font script="Tale" typeface="Microsoft Tai Le"/>
-        <a:font script="Talu" typeface="Microsoft New Tai Lue"/>
-        <a:font script="Tfng" typeface="Ebrima"/>
       </a:majorFont>
       <a:minorFont>
         <a:latin typeface="Calibri" panose="020F0502020204030204"/>
@@ -13876,26 +13512,9 @@
         <a:font script="Viet" typeface="Arial"/>
         <a:font script="Uigh" typeface="Microsoft Uighur"/>
         <a:font script="Geor" typeface="Sylfaen"/>
-        <a:font script="Armn" typeface="Arial"/>
-        <a:font script="Bugi" typeface="Leelawadee UI"/>
-        <a:font script="Bopo" typeface="Microsoft JhengHei"/>
-        <a:font script="Java" typeface="Javanese Text"/>
-        <a:font script="Lisu" typeface="Segoe UI"/>
-        <a:font script="Mymr" typeface="Myanmar Text"/>
-        <a:font script="Nkoo" typeface="Ebrima"/>
-        <a:font script="Olck" typeface="Nirmala UI"/>
-        <a:font script="Osma" typeface="Ebrima"/>
-        <a:font script="Phag" typeface="Phagspa"/>
-        <a:font script="Syrn" typeface="Estrangelo Edessa"/>
-        <a:font script="Syrj" typeface="Estrangelo Edessa"/>
-        <a:font script="Syre" typeface="Estrangelo Edessa"/>
-        <a:font script="Sora" typeface="Nirmala UI"/>
-        <a:font script="Tale" typeface="Microsoft Tai Le"/>
-        <a:font script="Talu" typeface="Microsoft New Tai Lue"/>
-        <a:font script="Tfng" typeface="Ebrima"/>
       </a:minorFont>
     </a:fontScheme>
-    <a:fmtScheme name="Office">
+    <a:fmtScheme name="Office Theme">
       <a:fillStyleLst>
         <a:solidFill>
           <a:schemeClr val="phClr"/>

</xml_diff>

<commit_message>
prompts using ipywidgets, work in progress
</commit_message>
<xml_diff>
--- a/images/hazards.pptx
+++ b/images/hazards.pptx
@@ -265,7 +265,7 @@
           <a:p>
             <a:fld id="{203D0769-FF07-3246-B708-FAA72E4146F7}" type="datetimeFigureOut">
               <a:rPr lang="en-GB" smtClean="0"/>
-              <a:t>30/04/2021</a:t>
+              <a:t>28/06/2021</a:t>
             </a:fld>
             <a:endParaRPr lang="en-GB"/>
           </a:p>
@@ -463,7 +463,7 @@
           <a:p>
             <a:fld id="{203D0769-FF07-3246-B708-FAA72E4146F7}" type="datetimeFigureOut">
               <a:rPr lang="en-GB" smtClean="0"/>
-              <a:t>30/04/2021</a:t>
+              <a:t>28/06/2021</a:t>
             </a:fld>
             <a:endParaRPr lang="en-GB"/>
           </a:p>
@@ -671,7 +671,7 @@
           <a:p>
             <a:fld id="{203D0769-FF07-3246-B708-FAA72E4146F7}" type="datetimeFigureOut">
               <a:rPr lang="en-GB" smtClean="0"/>
-              <a:t>30/04/2021</a:t>
+              <a:t>28/06/2021</a:t>
             </a:fld>
             <a:endParaRPr lang="en-GB"/>
           </a:p>
@@ -869,7 +869,7 @@
           <a:p>
             <a:fld id="{203D0769-FF07-3246-B708-FAA72E4146F7}" type="datetimeFigureOut">
               <a:rPr lang="en-GB" smtClean="0"/>
-              <a:t>30/04/2021</a:t>
+              <a:t>28/06/2021</a:t>
             </a:fld>
             <a:endParaRPr lang="en-GB"/>
           </a:p>
@@ -1144,7 +1144,7 @@
           <a:p>
             <a:fld id="{203D0769-FF07-3246-B708-FAA72E4146F7}" type="datetimeFigureOut">
               <a:rPr lang="en-GB" smtClean="0"/>
-              <a:t>30/04/2021</a:t>
+              <a:t>28/06/2021</a:t>
             </a:fld>
             <a:endParaRPr lang="en-GB"/>
           </a:p>
@@ -1409,7 +1409,7 @@
           <a:p>
             <a:fld id="{203D0769-FF07-3246-B708-FAA72E4146F7}" type="datetimeFigureOut">
               <a:rPr lang="en-GB" smtClean="0"/>
-              <a:t>30/04/2021</a:t>
+              <a:t>28/06/2021</a:t>
             </a:fld>
             <a:endParaRPr lang="en-GB"/>
           </a:p>
@@ -1821,7 +1821,7 @@
           <a:p>
             <a:fld id="{203D0769-FF07-3246-B708-FAA72E4146F7}" type="datetimeFigureOut">
               <a:rPr lang="en-GB" smtClean="0"/>
-              <a:t>30/04/2021</a:t>
+              <a:t>28/06/2021</a:t>
             </a:fld>
             <a:endParaRPr lang="en-GB"/>
           </a:p>
@@ -1962,7 +1962,7 @@
           <a:p>
             <a:fld id="{203D0769-FF07-3246-B708-FAA72E4146F7}" type="datetimeFigureOut">
               <a:rPr lang="en-GB" smtClean="0"/>
-              <a:t>30/04/2021</a:t>
+              <a:t>28/06/2021</a:t>
             </a:fld>
             <a:endParaRPr lang="en-GB"/>
           </a:p>
@@ -2075,7 +2075,7 @@
           <a:p>
             <a:fld id="{203D0769-FF07-3246-B708-FAA72E4146F7}" type="datetimeFigureOut">
               <a:rPr lang="en-GB" smtClean="0"/>
-              <a:t>30/04/2021</a:t>
+              <a:t>28/06/2021</a:t>
             </a:fld>
             <a:endParaRPr lang="en-GB"/>
           </a:p>
@@ -2386,7 +2386,7 @@
           <a:p>
             <a:fld id="{203D0769-FF07-3246-B708-FAA72E4146F7}" type="datetimeFigureOut">
               <a:rPr lang="en-GB" smtClean="0"/>
-              <a:t>30/04/2021</a:t>
+              <a:t>28/06/2021</a:t>
             </a:fld>
             <a:endParaRPr lang="en-GB"/>
           </a:p>
@@ -2674,7 +2674,7 @@
           <a:p>
             <a:fld id="{203D0769-FF07-3246-B708-FAA72E4146F7}" type="datetimeFigureOut">
               <a:rPr lang="en-GB" smtClean="0"/>
-              <a:t>30/04/2021</a:t>
+              <a:t>28/06/2021</a:t>
             </a:fld>
             <a:endParaRPr lang="en-GB"/>
           </a:p>
@@ -2915,7 +2915,7 @@
           <a:p>
             <a:fld id="{203D0769-FF07-3246-B708-FAA72E4146F7}" type="datetimeFigureOut">
               <a:rPr lang="en-GB" smtClean="0"/>
-              <a:t>30/04/2021</a:t>
+              <a:t>28/06/2021</a:t>
             </a:fld>
             <a:endParaRPr lang="en-GB"/>
           </a:p>
@@ -5973,7 +5973,7 @@
                 <a:pPr algn="ctr"/>
                 <a:r>
                   <a:rPr lang="en-GB" sz="1400" dirty="0"/>
-                  <a:t>Undermines informed</a:t>
+                  <a:t>Lacks informed</a:t>
                 </a:r>
               </a:p>
               <a:p>
@@ -6145,7 +6145,7 @@
                 <a:pPr algn="ctr"/>
                 <a:r>
                   <a:rPr lang="en-GB" sz="1400" dirty="0"/>
-                  <a:t>Threatens Privacy</a:t>
+                  <a:t>May invade privacy</a:t>
                 </a:r>
               </a:p>
             </p:txBody>
@@ -6290,7 +6290,7 @@
               <a:pPr algn="ctr"/>
               <a:r>
                 <a:rPr lang="en-GB" sz="1400" dirty="0"/>
-                <a:t>Ignores or opposes community need</a:t>
+                <a:t>Lacks community involvement</a:t>
               </a:r>
             </a:p>
           </p:txBody>
@@ -6370,171 +6370,6 @@
       </p:grpSp>
       <p:grpSp>
         <p:nvGrpSpPr>
-          <p:cNvPr id="88" name="Group 87">
-            <a:extLst>
-              <a:ext uri="{FF2B5EF4-FFF2-40B4-BE49-F238E27FC236}">
-                <a16:creationId xmlns:a16="http://schemas.microsoft.com/office/drawing/2014/main" id="{ECBB6CBD-C549-A64D-9219-FC4FBC962001}"/>
-              </a:ext>
-            </a:extLst>
-          </p:cNvPr>
-          <p:cNvGrpSpPr/>
-          <p:nvPr/>
-        </p:nvGrpSpPr>
-        <p:grpSpPr>
-          <a:xfrm>
-            <a:off x="408446" y="-219797"/>
-            <a:ext cx="3394842" cy="3394842"/>
-            <a:chOff x="576098" y="574291"/>
-            <a:chExt cx="3394842" cy="3394842"/>
-          </a:xfrm>
-        </p:grpSpPr>
-        <p:grpSp>
-          <p:nvGrpSpPr>
-            <p:cNvPr id="89" name="Group 88">
-              <a:extLst>
-                <a:ext uri="{FF2B5EF4-FFF2-40B4-BE49-F238E27FC236}">
-                  <a16:creationId xmlns:a16="http://schemas.microsoft.com/office/drawing/2014/main" id="{86C81859-C192-0445-A2F9-9EB305268E7D}"/>
-                </a:ext>
-              </a:extLst>
-            </p:cNvPr>
-            <p:cNvGrpSpPr/>
-            <p:nvPr/>
-          </p:nvGrpSpPr>
-          <p:grpSpPr>
-            <a:xfrm>
-              <a:off x="576098" y="574291"/>
-              <a:ext cx="3394842" cy="3394842"/>
-              <a:chOff x="576098" y="574291"/>
-              <a:chExt cx="3394842" cy="3394842"/>
-            </a:xfrm>
-          </p:grpSpPr>
-          <p:sp>
-            <p:nvSpPr>
-              <p:cNvPr id="91" name="Diamond 90">
-                <a:extLst>
-                  <a:ext uri="{FF2B5EF4-FFF2-40B4-BE49-F238E27FC236}">
-                    <a16:creationId xmlns:a16="http://schemas.microsoft.com/office/drawing/2014/main" id="{225B98E0-8952-EC4F-9240-B98CA705D1AE}"/>
-                  </a:ext>
-                </a:extLst>
-              </p:cNvPr>
-              <p:cNvSpPr/>
-              <p:nvPr/>
-            </p:nvSpPr>
-            <p:spPr>
-              <a:xfrm>
-                <a:off x="576098" y="574291"/>
-                <a:ext cx="3394842" cy="3394842"/>
-              </a:xfrm>
-              <a:prstGeom prst="diamond">
-                <a:avLst/>
-              </a:prstGeom>
-              <a:solidFill>
-                <a:schemeClr val="bg1"/>
-              </a:solidFill>
-              <a:ln w="127000">
-                <a:solidFill>
-                  <a:srgbClr val="FF0000"/>
-                </a:solidFill>
-              </a:ln>
-            </p:spPr>
-            <p:style>
-              <a:lnRef idx="2">
-                <a:schemeClr val="accent1"/>
-              </a:lnRef>
-              <a:fillRef idx="1">
-                <a:schemeClr val="lt1"/>
-              </a:fillRef>
-              <a:effectRef idx="0">
-                <a:schemeClr val="accent1"/>
-              </a:effectRef>
-              <a:fontRef idx="minor">
-                <a:schemeClr val="dk1"/>
-              </a:fontRef>
-            </p:style>
-            <p:txBody>
-              <a:bodyPr rtlCol="0" anchor="ctr"/>
-              <a:lstStyle/>
-              <a:p>
-                <a:pPr algn="ctr"/>
-                <a:endParaRPr lang="en-GB" dirty="0"/>
-              </a:p>
-            </p:txBody>
-          </p:sp>
-          <p:sp>
-            <p:nvSpPr>
-              <p:cNvPr id="92" name="Rectangle 91">
-                <a:extLst>
-                  <a:ext uri="{FF2B5EF4-FFF2-40B4-BE49-F238E27FC236}">
-                    <a16:creationId xmlns:a16="http://schemas.microsoft.com/office/drawing/2014/main" id="{B254CF8A-E622-F94B-98A4-80426437E45E}"/>
-                  </a:ext>
-                </a:extLst>
-              </p:cNvPr>
-              <p:cNvSpPr/>
-              <p:nvPr/>
-            </p:nvSpPr>
-            <p:spPr>
-              <a:xfrm>
-                <a:off x="1394975" y="2781166"/>
-                <a:ext cx="1775942" cy="523220"/>
-              </a:xfrm>
-              <a:prstGeom prst="rect">
-                <a:avLst/>
-              </a:prstGeom>
-            </p:spPr>
-            <p:txBody>
-              <a:bodyPr wrap="square">
-                <a:spAutoFit/>
-              </a:bodyPr>
-              <a:lstStyle/>
-              <a:p>
-                <a:pPr algn="ctr"/>
-                <a:r>
-                  <a:rPr lang="en-GB" sz="1400" dirty="0"/>
-                  <a:t>Reinforces existing biases</a:t>
-                </a:r>
-              </a:p>
-            </p:txBody>
-          </p:sp>
-        </p:grpSp>
-        <p:pic>
-          <p:nvPicPr>
-            <p:cNvPr id="90" name="Graphic 89" descr="Refresh with solid fill">
-              <a:extLst>
-                <a:ext uri="{FF2B5EF4-FFF2-40B4-BE49-F238E27FC236}">
-                  <a16:creationId xmlns:a16="http://schemas.microsoft.com/office/drawing/2014/main" id="{C9B4EDB5-4D0B-C048-8CDB-444C5B47B3C9}"/>
-                </a:ext>
-              </a:extLst>
-            </p:cNvPr>
-            <p:cNvPicPr>
-              <a:picLocks noChangeAspect="1"/>
-            </p:cNvPicPr>
-            <p:nvPr/>
-          </p:nvPicPr>
-          <p:blipFill>
-            <a:blip r:embed="rId22">
-              <a:extLst>
-                <a:ext uri="{96DAC541-7B7A-43D3-8B79-37D633B846F1}">
-                  <asvg:svgBlip xmlns:asvg="http://schemas.microsoft.com/office/drawing/2016/SVG/main" r:embed="rId23"/>
-                </a:ext>
-              </a:extLst>
-            </a:blip>
-            <a:stretch>
-              <a:fillRect/>
-            </a:stretch>
-          </p:blipFill>
-          <p:spPr>
-            <a:xfrm>
-              <a:off x="1535821" y="1316225"/>
-              <a:ext cx="1475396" cy="1475396"/>
-            </a:xfrm>
-            <a:prstGeom prst="rect">
-              <a:avLst/>
-            </a:prstGeom>
-          </p:spPr>
-        </p:pic>
-      </p:grpSp>
-      <p:grpSp>
-        <p:nvGrpSpPr>
           <p:cNvPr id="100" name="Group 99">
             <a:extLst>
               <a:ext uri="{FF2B5EF4-FFF2-40B4-BE49-F238E27FC236}">
@@ -6676,10 +6511,10 @@
             <p:nvPr/>
           </p:nvPicPr>
           <p:blipFill>
-            <a:blip r:embed="rId24">
+            <a:blip r:embed="rId22">
               <a:extLst>
                 <a:ext uri="{96DAC541-7B7A-43D3-8B79-37D633B846F1}">
-                  <asvg:svgBlip xmlns:asvg="http://schemas.microsoft.com/office/drawing/2016/SVG/main" r:embed="rId25"/>
+                  <asvg:svgBlip xmlns:asvg="http://schemas.microsoft.com/office/drawing/2016/SVG/main" r:embed="rId23"/>
                 </a:ext>
               </a:extLst>
             </a:blip>
@@ -6712,10 +6547,10 @@
             <p:nvPr/>
           </p:nvPicPr>
           <p:blipFill>
-            <a:blip r:embed="rId26">
+            <a:blip r:embed="rId24">
               <a:extLst>
                 <a:ext uri="{96DAC541-7B7A-43D3-8B79-37D633B846F1}">
-                  <asvg:svgBlip xmlns:asvg="http://schemas.microsoft.com/office/drawing/2016/SVG/main" r:embed="rId27"/>
+                  <asvg:svgBlip xmlns:asvg="http://schemas.microsoft.com/office/drawing/2016/SVG/main" r:embed="rId25"/>
                 </a:ext>
               </a:extLst>
             </a:blip>
@@ -6856,7 +6691,7 @@
                 <a:pPr algn="ctr"/>
                 <a:r>
                   <a:rPr lang="en-GB" sz="1400" dirty="0"/>
-                  <a:t>May cause direct harm</a:t>
+                  <a:t>May cause physical  harm</a:t>
                 </a:r>
               </a:p>
             </p:txBody>
@@ -6877,10 +6712,10 @@
             <p:nvPr/>
           </p:nvPicPr>
           <p:blipFill>
-            <a:blip r:embed="rId28">
+            <a:blip r:embed="rId26">
               <a:extLst>
                 <a:ext uri="{96DAC541-7B7A-43D3-8B79-37D633B846F1}">
-                  <asvg:svgBlip xmlns:asvg="http://schemas.microsoft.com/office/drawing/2016/SVG/main" r:embed="rId29"/>
+                  <asvg:svgBlip xmlns:asvg="http://schemas.microsoft.com/office/drawing/2016/SVG/main" r:embed="rId27"/>
                 </a:ext>
               </a:extLst>
             </a:blip>
@@ -7046,10 +6881,10 @@
             <p:nvPr/>
           </p:nvPicPr>
           <p:blipFill>
-            <a:blip r:embed="rId30">
+            <a:blip r:embed="rId28">
               <a:extLst>
                 <a:ext uri="{96DAC541-7B7A-43D3-8B79-37D633B846F1}">
-                  <asvg:svgBlip xmlns:asvg="http://schemas.microsoft.com/office/drawing/2016/SVG/main" r:embed="rId31"/>
+                  <asvg:svgBlip xmlns:asvg="http://schemas.microsoft.com/office/drawing/2016/SVG/main" r:embed="rId29"/>
                 </a:ext>
               </a:extLst>
             </a:blip>
@@ -7082,6 +6917,315 @@
             <p:nvPr/>
           </p:nvPicPr>
           <p:blipFill>
+            <a:blip r:embed="rId30">
+              <a:extLst>
+                <a:ext uri="{96DAC541-7B7A-43D3-8B79-37D633B846F1}">
+                  <asvg:svgBlip xmlns:asvg="http://schemas.microsoft.com/office/drawing/2016/SVG/main" r:embed="rId31"/>
+                </a:ext>
+              </a:extLst>
+            </a:blip>
+            <a:stretch>
+              <a:fillRect/>
+            </a:stretch>
+          </p:blipFill>
+          <p:spPr>
+            <a:xfrm rot="17914367">
+              <a:off x="5208059" y="2645336"/>
+              <a:ext cx="522641" cy="522641"/>
+            </a:xfrm>
+            <a:prstGeom prst="rect">
+              <a:avLst/>
+            </a:prstGeom>
+          </p:spPr>
+        </p:pic>
+      </p:grpSp>
+      <p:grpSp>
+        <p:nvGrpSpPr>
+          <p:cNvPr id="62" name="Group 61">
+            <a:extLst>
+              <a:ext uri="{FF2B5EF4-FFF2-40B4-BE49-F238E27FC236}">
+                <a16:creationId xmlns:a16="http://schemas.microsoft.com/office/drawing/2014/main" id="{89C816CD-2538-E44A-B0AE-A8EF2E8B0AD9}"/>
+              </a:ext>
+            </a:extLst>
+          </p:cNvPr>
+          <p:cNvGrpSpPr/>
+          <p:nvPr/>
+        </p:nvGrpSpPr>
+        <p:grpSpPr>
+          <a:xfrm>
+            <a:off x="2067059" y="-1901500"/>
+            <a:ext cx="3394842" cy="3394842"/>
+            <a:chOff x="3632506" y="2687307"/>
+            <a:chExt cx="3394842" cy="3394842"/>
+          </a:xfrm>
+        </p:grpSpPr>
+        <p:sp>
+          <p:nvSpPr>
+            <p:cNvPr id="63" name="Diamond 62">
+              <a:extLst>
+                <a:ext uri="{FF2B5EF4-FFF2-40B4-BE49-F238E27FC236}">
+                  <a16:creationId xmlns:a16="http://schemas.microsoft.com/office/drawing/2014/main" id="{B06B129C-882E-BF4F-BD7D-E667E442BB6A}"/>
+                </a:ext>
+              </a:extLst>
+            </p:cNvPr>
+            <p:cNvSpPr/>
+            <p:nvPr/>
+          </p:nvSpPr>
+          <p:spPr>
+            <a:xfrm>
+              <a:off x="3632506" y="2687307"/>
+              <a:ext cx="3394842" cy="3394842"/>
+            </a:xfrm>
+            <a:prstGeom prst="diamond">
+              <a:avLst/>
+            </a:prstGeom>
+            <a:solidFill>
+              <a:schemeClr val="bg1"/>
+            </a:solidFill>
+            <a:ln w="127000">
+              <a:solidFill>
+                <a:srgbClr val="FF0000"/>
+              </a:solidFill>
+            </a:ln>
+          </p:spPr>
+          <p:style>
+            <a:lnRef idx="2">
+              <a:schemeClr val="accent1"/>
+            </a:lnRef>
+            <a:fillRef idx="1">
+              <a:schemeClr val="lt1"/>
+            </a:fillRef>
+            <a:effectRef idx="0">
+              <a:schemeClr val="accent1"/>
+            </a:effectRef>
+            <a:fontRef idx="minor">
+              <a:schemeClr val="dk1"/>
+            </a:fontRef>
+          </p:style>
+          <p:txBody>
+            <a:bodyPr rtlCol="0" anchor="ctr"/>
+            <a:lstStyle/>
+            <a:p>
+              <a:pPr algn="ctr"/>
+              <a:endParaRPr lang="en-GB" dirty="0"/>
+            </a:p>
+          </p:txBody>
+        </p:sp>
+        <p:sp>
+          <p:nvSpPr>
+            <p:cNvPr id="65" name="Rectangle 64">
+              <a:extLst>
+                <a:ext uri="{FF2B5EF4-FFF2-40B4-BE49-F238E27FC236}">
+                  <a16:creationId xmlns:a16="http://schemas.microsoft.com/office/drawing/2014/main" id="{BB2F6CD7-7B5B-F24B-ACDD-B6A99BB84B48}"/>
+                </a:ext>
+              </a:extLst>
+            </p:cNvPr>
+            <p:cNvSpPr/>
+            <p:nvPr/>
+          </p:nvSpPr>
+          <p:spPr>
+            <a:xfrm>
+              <a:off x="4451383" y="4822742"/>
+              <a:ext cx="1775942" cy="307777"/>
+            </a:xfrm>
+            <a:prstGeom prst="rect">
+              <a:avLst/>
+            </a:prstGeom>
+          </p:spPr>
+          <p:txBody>
+            <a:bodyPr wrap="square">
+              <a:spAutoFit/>
+            </a:bodyPr>
+            <a:lstStyle/>
+            <a:p>
+              <a:pPr algn="ctr"/>
+              <a:r>
+                <a:rPr lang="en-GB" sz="1400" dirty="0"/>
+                <a:t>Contains Data Science</a:t>
+              </a:r>
+            </a:p>
+          </p:txBody>
+        </p:sp>
+        <p:pic>
+          <p:nvPicPr>
+            <p:cNvPr id="66" name="Graphic 65" descr="Exclamation mark with solid fill">
+              <a:extLst>
+                <a:ext uri="{FF2B5EF4-FFF2-40B4-BE49-F238E27FC236}">
+                  <a16:creationId xmlns:a16="http://schemas.microsoft.com/office/drawing/2014/main" id="{A9A3F43B-F44B-444E-828C-612D3EAFA536}"/>
+                </a:ext>
+              </a:extLst>
+            </p:cNvPr>
+            <p:cNvPicPr>
+              <a:picLocks noChangeAspect="1"/>
+            </p:cNvPicPr>
+            <p:nvPr/>
+          </p:nvPicPr>
+          <p:blipFill>
+            <a:blip r:embed="rId8">
+              <a:extLst>
+                <a:ext uri="{96DAC541-7B7A-43D3-8B79-37D633B846F1}">
+                  <asvg:svgBlip xmlns:asvg="http://schemas.microsoft.com/office/drawing/2016/SVG/main" r:embed="rId9"/>
+                </a:ext>
+              </a:extLst>
+            </a:blip>
+            <a:stretch>
+              <a:fillRect/>
+            </a:stretch>
+          </p:blipFill>
+          <p:spPr>
+            <a:xfrm>
+              <a:off x="4697696" y="3548875"/>
+              <a:ext cx="1225874" cy="1225874"/>
+            </a:xfrm>
+            <a:prstGeom prst="rect">
+              <a:avLst/>
+            </a:prstGeom>
+          </p:spPr>
+        </p:pic>
+      </p:grpSp>
+      <p:grpSp>
+        <p:nvGrpSpPr>
+          <p:cNvPr id="9" name="Group 8">
+            <a:extLst>
+              <a:ext uri="{FF2B5EF4-FFF2-40B4-BE49-F238E27FC236}">
+                <a16:creationId xmlns:a16="http://schemas.microsoft.com/office/drawing/2014/main" id="{7ED2B957-6478-354C-9234-6029EB6DDFA2}"/>
+              </a:ext>
+            </a:extLst>
+          </p:cNvPr>
+          <p:cNvGrpSpPr/>
+          <p:nvPr/>
+        </p:nvGrpSpPr>
+        <p:grpSpPr>
+          <a:xfrm>
+            <a:off x="423327" y="225315"/>
+            <a:ext cx="3394842" cy="3394842"/>
+            <a:chOff x="423327" y="225315"/>
+            <a:chExt cx="3394842" cy="3394842"/>
+          </a:xfrm>
+        </p:grpSpPr>
+        <p:grpSp>
+          <p:nvGrpSpPr>
+            <p:cNvPr id="89" name="Group 88">
+              <a:extLst>
+                <a:ext uri="{FF2B5EF4-FFF2-40B4-BE49-F238E27FC236}">
+                  <a16:creationId xmlns:a16="http://schemas.microsoft.com/office/drawing/2014/main" id="{86C81859-C192-0445-A2F9-9EB305268E7D}"/>
+                </a:ext>
+              </a:extLst>
+            </p:cNvPr>
+            <p:cNvGrpSpPr/>
+            <p:nvPr/>
+          </p:nvGrpSpPr>
+          <p:grpSpPr>
+            <a:xfrm>
+              <a:off x="423327" y="225315"/>
+              <a:ext cx="3394842" cy="3394842"/>
+              <a:chOff x="576098" y="574291"/>
+              <a:chExt cx="3394842" cy="3394842"/>
+            </a:xfrm>
+          </p:grpSpPr>
+          <p:sp>
+            <p:nvSpPr>
+              <p:cNvPr id="91" name="Diamond 90">
+                <a:extLst>
+                  <a:ext uri="{FF2B5EF4-FFF2-40B4-BE49-F238E27FC236}">
+                    <a16:creationId xmlns:a16="http://schemas.microsoft.com/office/drawing/2014/main" id="{225B98E0-8952-EC4F-9240-B98CA705D1AE}"/>
+                  </a:ext>
+                </a:extLst>
+              </p:cNvPr>
+              <p:cNvSpPr/>
+              <p:nvPr/>
+            </p:nvSpPr>
+            <p:spPr>
+              <a:xfrm>
+                <a:off x="576098" y="574291"/>
+                <a:ext cx="3394842" cy="3394842"/>
+              </a:xfrm>
+              <a:prstGeom prst="diamond">
+                <a:avLst/>
+              </a:prstGeom>
+              <a:solidFill>
+                <a:schemeClr val="bg1"/>
+              </a:solidFill>
+              <a:ln w="127000">
+                <a:solidFill>
+                  <a:srgbClr val="FF0000"/>
+                </a:solidFill>
+              </a:ln>
+            </p:spPr>
+            <p:style>
+              <a:lnRef idx="2">
+                <a:schemeClr val="accent1"/>
+              </a:lnRef>
+              <a:fillRef idx="1">
+                <a:schemeClr val="lt1"/>
+              </a:fillRef>
+              <a:effectRef idx="0">
+                <a:schemeClr val="accent1"/>
+              </a:effectRef>
+              <a:fontRef idx="minor">
+                <a:schemeClr val="dk1"/>
+              </a:fontRef>
+            </p:style>
+            <p:txBody>
+              <a:bodyPr rtlCol="0" anchor="ctr"/>
+              <a:lstStyle/>
+              <a:p>
+                <a:pPr algn="ctr"/>
+                <a:endParaRPr lang="en-GB" dirty="0"/>
+              </a:p>
+            </p:txBody>
+          </p:sp>
+          <p:sp>
+            <p:nvSpPr>
+              <p:cNvPr id="92" name="Rectangle 91">
+                <a:extLst>
+                  <a:ext uri="{FF2B5EF4-FFF2-40B4-BE49-F238E27FC236}">
+                    <a16:creationId xmlns:a16="http://schemas.microsoft.com/office/drawing/2014/main" id="{B254CF8A-E622-F94B-98A4-80426437E45E}"/>
+                  </a:ext>
+                </a:extLst>
+              </p:cNvPr>
+              <p:cNvSpPr/>
+              <p:nvPr/>
+            </p:nvSpPr>
+            <p:spPr>
+              <a:xfrm>
+                <a:off x="1394975" y="2781166"/>
+                <a:ext cx="1775942" cy="523220"/>
+              </a:xfrm>
+              <a:prstGeom prst="rect">
+                <a:avLst/>
+              </a:prstGeom>
+            </p:spPr>
+            <p:txBody>
+              <a:bodyPr wrap="square">
+                <a:spAutoFit/>
+              </a:bodyPr>
+              <a:lstStyle/>
+              <a:p>
+                <a:pPr algn="ctr"/>
+                <a:r>
+                  <a:rPr lang="en-GB" sz="1400" dirty="0"/>
+                  <a:t>Reinforces existing biases</a:t>
+                </a:r>
+              </a:p>
+            </p:txBody>
+          </p:sp>
+        </p:grpSp>
+        <p:pic>
+          <p:nvPicPr>
+            <p:cNvPr id="6" name="Graphic 5" descr="Repeat with solid fill">
+              <a:extLst>
+                <a:ext uri="{FF2B5EF4-FFF2-40B4-BE49-F238E27FC236}">
+                  <a16:creationId xmlns:a16="http://schemas.microsoft.com/office/drawing/2014/main" id="{A988AD09-D53D-074A-B3D6-707F95F38E06}"/>
+                </a:ext>
+              </a:extLst>
+            </p:cNvPr>
+            <p:cNvPicPr>
+              <a:picLocks noChangeAspect="1"/>
+            </p:cNvPicPr>
+            <p:nvPr/>
+          </p:nvPicPr>
+          <p:blipFill>
             <a:blip r:embed="rId32">
               <a:extLst>
                 <a:ext uri="{96DAC541-7B7A-43D3-8B79-37D633B846F1}">
@@ -7094,9 +7238,9 @@
             </a:stretch>
           </p:blipFill>
           <p:spPr>
-            <a:xfrm rot="17914367">
-              <a:off x="5208059" y="2645336"/>
-              <a:ext cx="522641" cy="522641"/>
+            <a:xfrm>
+              <a:off x="1498018" y="1150309"/>
+              <a:ext cx="1193815" cy="1193815"/>
             </a:xfrm>
             <a:prstGeom prst="rect">
               <a:avLst/>
@@ -13558,7 +13702,7 @@
         </p:nvGrpSpPr>
         <p:grpSpPr>
           <a:xfrm>
-            <a:off x="3566362" y="1212145"/>
+            <a:off x="8026394" y="1558472"/>
             <a:ext cx="3394842" cy="3394842"/>
             <a:chOff x="4351271" y="624005"/>
             <a:chExt cx="3394842" cy="3394842"/>
@@ -13684,7 +13828,7 @@
         </p:blipFill>
         <p:spPr>
           <a:xfrm>
-            <a:off x="4452970" y="1838750"/>
+            <a:off x="8913002" y="2185077"/>
             <a:ext cx="1345171" cy="1345171"/>
           </a:xfrm>
           <a:prstGeom prst="rect">
@@ -13720,7 +13864,7 @@
         </p:blipFill>
         <p:spPr>
           <a:xfrm rot="17556866">
-            <a:off x="5208059" y="2645336"/>
+            <a:off x="9668091" y="2991663"/>
             <a:ext cx="522641" cy="522641"/>
           </a:xfrm>
           <a:prstGeom prst="rect">
@@ -13728,6 +13872,938 @@
           </a:prstGeom>
         </p:spPr>
       </p:pic>
+      <p:sp>
+        <p:nvSpPr>
+          <p:cNvPr id="9" name="Diamond 8">
+            <a:extLst>
+              <a:ext uri="{FF2B5EF4-FFF2-40B4-BE49-F238E27FC236}">
+                <a16:creationId xmlns:a16="http://schemas.microsoft.com/office/drawing/2014/main" id="{89B80A72-1863-2944-B764-4EE228E888FC}"/>
+              </a:ext>
+            </a:extLst>
+          </p:cNvPr>
+          <p:cNvSpPr/>
+          <p:nvPr/>
+        </p:nvSpPr>
+        <p:spPr>
+          <a:xfrm>
+            <a:off x="11527419" y="4412804"/>
+            <a:ext cx="3394842" cy="3394842"/>
+          </a:xfrm>
+          <a:prstGeom prst="diamond">
+            <a:avLst/>
+          </a:prstGeom>
+          <a:solidFill>
+            <a:schemeClr val="bg1"/>
+          </a:solidFill>
+          <a:ln w="127000">
+            <a:solidFill>
+              <a:srgbClr val="FF0000"/>
+            </a:solidFill>
+          </a:ln>
+        </p:spPr>
+        <p:style>
+          <a:lnRef idx="2">
+            <a:schemeClr val="accent1"/>
+          </a:lnRef>
+          <a:fillRef idx="1">
+            <a:schemeClr val="lt1"/>
+          </a:fillRef>
+          <a:effectRef idx="0">
+            <a:schemeClr val="accent1"/>
+          </a:effectRef>
+          <a:fontRef idx="minor">
+            <a:schemeClr val="dk1"/>
+          </a:fontRef>
+        </p:style>
+        <p:txBody>
+          <a:bodyPr rtlCol="0" anchor="ctr"/>
+          <a:lstStyle/>
+          <a:p>
+            <a:pPr algn="ctr"/>
+            <a:endParaRPr lang="en-GB" dirty="0"/>
+          </a:p>
+        </p:txBody>
+      </p:sp>
+      <p:sp>
+        <p:nvSpPr>
+          <p:cNvPr id="10" name="Rectangle 9">
+            <a:extLst>
+              <a:ext uri="{FF2B5EF4-FFF2-40B4-BE49-F238E27FC236}">
+                <a16:creationId xmlns:a16="http://schemas.microsoft.com/office/drawing/2014/main" id="{F12A30F5-EBED-0542-9C60-70EE3AC4248F}"/>
+              </a:ext>
+            </a:extLst>
+          </p:cNvPr>
+          <p:cNvSpPr/>
+          <p:nvPr/>
+        </p:nvSpPr>
+        <p:spPr>
+          <a:xfrm>
+            <a:off x="12346296" y="6619679"/>
+            <a:ext cx="1775942" cy="307777"/>
+          </a:xfrm>
+          <a:prstGeom prst="rect">
+            <a:avLst/>
+          </a:prstGeom>
+        </p:spPr>
+        <p:txBody>
+          <a:bodyPr wrap="square">
+            <a:spAutoFit/>
+          </a:bodyPr>
+          <a:lstStyle/>
+          <a:p>
+            <a:pPr algn="ctr"/>
+            <a:r>
+              <a:rPr lang="en-GB" sz="1400" dirty="0"/>
+              <a:t>Data Hazards</a:t>
+            </a:r>
+          </a:p>
+        </p:txBody>
+      </p:sp>
+      <p:pic>
+        <p:nvPicPr>
+          <p:cNvPr id="11" name="Graphic 10" descr="Exclamation mark with solid fill">
+            <a:extLst>
+              <a:ext uri="{FF2B5EF4-FFF2-40B4-BE49-F238E27FC236}">
+                <a16:creationId xmlns:a16="http://schemas.microsoft.com/office/drawing/2014/main" id="{3B668A08-3EE3-E344-81E5-E6CD1A10E170}"/>
+              </a:ext>
+            </a:extLst>
+          </p:cNvPr>
+          <p:cNvPicPr>
+            <a:picLocks noChangeAspect="1"/>
+          </p:cNvPicPr>
+          <p:nvPr/>
+        </p:nvPicPr>
+        <p:blipFill>
+          <a:blip r:embed="rId6">
+            <a:extLst>
+              <a:ext uri="{96DAC541-7B7A-43D3-8B79-37D633B846F1}">
+                <asvg:svgBlip xmlns:asvg="http://schemas.microsoft.com/office/drawing/2016/SVG/main" r:embed="rId7"/>
+              </a:ext>
+            </a:extLst>
+          </a:blip>
+          <a:stretch>
+            <a:fillRect/>
+          </a:stretch>
+        </p:blipFill>
+        <p:spPr>
+          <a:xfrm>
+            <a:off x="12592609" y="5131494"/>
+            <a:ext cx="1225874" cy="1225874"/>
+          </a:xfrm>
+          <a:prstGeom prst="rect">
+            <a:avLst/>
+          </a:prstGeom>
+        </p:spPr>
+      </p:pic>
+      <p:grpSp>
+        <p:nvGrpSpPr>
+          <p:cNvPr id="4" name="Group 3">
+            <a:extLst>
+              <a:ext uri="{FF2B5EF4-FFF2-40B4-BE49-F238E27FC236}">
+                <a16:creationId xmlns:a16="http://schemas.microsoft.com/office/drawing/2014/main" id="{494CEADB-674C-3341-9EB9-1DDD8CC87C6D}"/>
+              </a:ext>
+            </a:extLst>
+          </p:cNvPr>
+          <p:cNvGrpSpPr/>
+          <p:nvPr/>
+        </p:nvGrpSpPr>
+        <p:grpSpPr>
+          <a:xfrm>
+            <a:off x="8587043" y="3862562"/>
+            <a:ext cx="3394842" cy="3394842"/>
+            <a:chOff x="4127011" y="3516235"/>
+            <a:chExt cx="3394842" cy="3394842"/>
+          </a:xfrm>
+        </p:grpSpPr>
+        <p:sp>
+          <p:nvSpPr>
+            <p:cNvPr id="17" name="Diamond 16">
+              <a:extLst>
+                <a:ext uri="{FF2B5EF4-FFF2-40B4-BE49-F238E27FC236}">
+                  <a16:creationId xmlns:a16="http://schemas.microsoft.com/office/drawing/2014/main" id="{3D23421C-0FC1-B946-80FB-3E30DF27BEC0}"/>
+                </a:ext>
+              </a:extLst>
+            </p:cNvPr>
+            <p:cNvSpPr/>
+            <p:nvPr/>
+          </p:nvSpPr>
+          <p:spPr>
+            <a:xfrm>
+              <a:off x="4127011" y="3516235"/>
+              <a:ext cx="3394842" cy="3394842"/>
+            </a:xfrm>
+            <a:prstGeom prst="diamond">
+              <a:avLst/>
+            </a:prstGeom>
+            <a:solidFill>
+              <a:schemeClr val="bg1"/>
+            </a:solidFill>
+            <a:ln w="127000">
+              <a:solidFill>
+                <a:srgbClr val="FF0000"/>
+              </a:solidFill>
+            </a:ln>
+          </p:spPr>
+          <p:style>
+            <a:lnRef idx="2">
+              <a:schemeClr val="accent1"/>
+            </a:lnRef>
+            <a:fillRef idx="1">
+              <a:schemeClr val="lt1"/>
+            </a:fillRef>
+            <a:effectRef idx="0">
+              <a:schemeClr val="accent1"/>
+            </a:effectRef>
+            <a:fontRef idx="minor">
+              <a:schemeClr val="dk1"/>
+            </a:fontRef>
+          </p:style>
+          <p:txBody>
+            <a:bodyPr rtlCol="0" anchor="ctr"/>
+            <a:lstStyle/>
+            <a:p>
+              <a:pPr algn="ctr"/>
+              <a:endParaRPr lang="en-GB" dirty="0"/>
+            </a:p>
+          </p:txBody>
+        </p:sp>
+        <p:sp>
+          <p:nvSpPr>
+            <p:cNvPr id="18" name="Rectangle 17">
+              <a:extLst>
+                <a:ext uri="{FF2B5EF4-FFF2-40B4-BE49-F238E27FC236}">
+                  <a16:creationId xmlns:a16="http://schemas.microsoft.com/office/drawing/2014/main" id="{F9A68C8A-D7E8-0C4E-A9E4-093C034B6A36}"/>
+                </a:ext>
+              </a:extLst>
+            </p:cNvPr>
+            <p:cNvSpPr/>
+            <p:nvPr/>
+          </p:nvSpPr>
+          <p:spPr>
+            <a:xfrm>
+              <a:off x="4945888" y="5723110"/>
+              <a:ext cx="1775942" cy="523220"/>
+            </a:xfrm>
+            <a:prstGeom prst="rect">
+              <a:avLst/>
+            </a:prstGeom>
+          </p:spPr>
+          <p:txBody>
+            <a:bodyPr wrap="square">
+              <a:spAutoFit/>
+            </a:bodyPr>
+            <a:lstStyle/>
+            <a:p>
+              <a:pPr algn="ctr"/>
+              <a:r>
+                <a:rPr lang="en-GB" sz="1400" dirty="0"/>
+                <a:t>Ignores or opposes community need</a:t>
+              </a:r>
+            </a:p>
+          </p:txBody>
+        </p:sp>
+        <p:pic>
+          <p:nvPicPr>
+            <p:cNvPr id="19" name="Graphic 18" descr="Group of men with solid fill">
+              <a:extLst>
+                <a:ext uri="{FF2B5EF4-FFF2-40B4-BE49-F238E27FC236}">
+                  <a16:creationId xmlns:a16="http://schemas.microsoft.com/office/drawing/2014/main" id="{0A31E8A7-482C-E24E-8597-23C0FD2E79CE}"/>
+                </a:ext>
+              </a:extLst>
+            </p:cNvPr>
+            <p:cNvPicPr>
+              <a:picLocks noChangeAspect="1"/>
+            </p:cNvPicPr>
+            <p:nvPr/>
+          </p:nvPicPr>
+          <p:blipFill>
+            <a:blip r:embed="rId8">
+              <a:extLst>
+                <a:ext uri="{96DAC541-7B7A-43D3-8B79-37D633B846F1}">
+                  <asvg:svgBlip xmlns:asvg="http://schemas.microsoft.com/office/drawing/2016/SVG/main" r:embed="rId9"/>
+                </a:ext>
+              </a:extLst>
+            </a:blip>
+            <a:stretch>
+              <a:fillRect/>
+            </a:stretch>
+          </p:blipFill>
+          <p:spPr>
+            <a:xfrm>
+              <a:off x="5367232" y="4749985"/>
+              <a:ext cx="914400" cy="914400"/>
+            </a:xfrm>
+            <a:prstGeom prst="rect">
+              <a:avLst/>
+            </a:prstGeom>
+          </p:spPr>
+        </p:pic>
+        <p:pic>
+          <p:nvPicPr>
+            <p:cNvPr id="20" name="Graphic 19" descr="Chat with solid fill">
+              <a:extLst>
+                <a:ext uri="{FF2B5EF4-FFF2-40B4-BE49-F238E27FC236}">
+                  <a16:creationId xmlns:a16="http://schemas.microsoft.com/office/drawing/2014/main" id="{8E78438B-9EA9-A645-AD3F-1A6F83F23D23}"/>
+                </a:ext>
+              </a:extLst>
+            </p:cNvPr>
+            <p:cNvPicPr>
+              <a:picLocks noChangeAspect="1"/>
+            </p:cNvPicPr>
+            <p:nvPr/>
+          </p:nvPicPr>
+          <p:blipFill>
+            <a:blip r:embed="rId10">
+              <a:extLst>
+                <a:ext uri="{96DAC541-7B7A-43D3-8B79-37D633B846F1}">
+                  <asvg:svgBlip xmlns:asvg="http://schemas.microsoft.com/office/drawing/2016/SVG/main" r:embed="rId11"/>
+                </a:ext>
+              </a:extLst>
+            </a:blip>
+            <a:stretch>
+              <a:fillRect/>
+            </a:stretch>
+          </p:blipFill>
+          <p:spPr>
+            <a:xfrm>
+              <a:off x="5377593" y="4290357"/>
+              <a:ext cx="904039" cy="655387"/>
+            </a:xfrm>
+            <a:prstGeom prst="rect">
+              <a:avLst/>
+            </a:prstGeom>
+          </p:spPr>
+        </p:pic>
+      </p:grpSp>
+      <p:grpSp>
+        <p:nvGrpSpPr>
+          <p:cNvPr id="5" name="Group 4">
+            <a:extLst>
+              <a:ext uri="{FF2B5EF4-FFF2-40B4-BE49-F238E27FC236}">
+                <a16:creationId xmlns:a16="http://schemas.microsoft.com/office/drawing/2014/main" id="{7690ADAC-2F93-6443-8C54-F49C903667CB}"/>
+              </a:ext>
+            </a:extLst>
+          </p:cNvPr>
+          <p:cNvGrpSpPr/>
+          <p:nvPr/>
+        </p:nvGrpSpPr>
+        <p:grpSpPr>
+          <a:xfrm>
+            <a:off x="8132577" y="-603319"/>
+            <a:ext cx="3394842" cy="3394842"/>
+            <a:chOff x="8132577" y="-603319"/>
+            <a:chExt cx="3394842" cy="3394842"/>
+          </a:xfrm>
+        </p:grpSpPr>
+        <p:sp>
+          <p:nvSpPr>
+            <p:cNvPr id="22" name="Diamond 21">
+              <a:extLst>
+                <a:ext uri="{FF2B5EF4-FFF2-40B4-BE49-F238E27FC236}">
+                  <a16:creationId xmlns:a16="http://schemas.microsoft.com/office/drawing/2014/main" id="{D337253C-761C-594C-B16F-C352B8329AF4}"/>
+                </a:ext>
+              </a:extLst>
+            </p:cNvPr>
+            <p:cNvSpPr/>
+            <p:nvPr/>
+          </p:nvSpPr>
+          <p:spPr>
+            <a:xfrm>
+              <a:off x="8132577" y="-603319"/>
+              <a:ext cx="3394842" cy="3394842"/>
+            </a:xfrm>
+            <a:prstGeom prst="diamond">
+              <a:avLst/>
+            </a:prstGeom>
+            <a:solidFill>
+              <a:schemeClr val="bg1"/>
+            </a:solidFill>
+            <a:ln w="127000">
+              <a:solidFill>
+                <a:srgbClr val="FF0000"/>
+              </a:solidFill>
+            </a:ln>
+          </p:spPr>
+          <p:style>
+            <a:lnRef idx="2">
+              <a:schemeClr val="accent1"/>
+            </a:lnRef>
+            <a:fillRef idx="1">
+              <a:schemeClr val="lt1"/>
+            </a:fillRef>
+            <a:effectRef idx="0">
+              <a:schemeClr val="accent1"/>
+            </a:effectRef>
+            <a:fontRef idx="minor">
+              <a:schemeClr val="dk1"/>
+            </a:fontRef>
+          </p:style>
+          <p:txBody>
+            <a:bodyPr rtlCol="0" anchor="ctr"/>
+            <a:lstStyle/>
+            <a:p>
+              <a:pPr algn="ctr"/>
+              <a:endParaRPr lang="en-GB" dirty="0"/>
+            </a:p>
+          </p:txBody>
+        </p:sp>
+        <p:sp>
+          <p:nvSpPr>
+            <p:cNvPr id="23" name="Rectangle 22">
+              <a:extLst>
+                <a:ext uri="{FF2B5EF4-FFF2-40B4-BE49-F238E27FC236}">
+                  <a16:creationId xmlns:a16="http://schemas.microsoft.com/office/drawing/2014/main" id="{7A05CB65-0912-8D42-BDF8-FFE1EC4A6612}"/>
+                </a:ext>
+              </a:extLst>
+            </p:cNvPr>
+            <p:cNvSpPr/>
+            <p:nvPr/>
+          </p:nvSpPr>
+          <p:spPr>
+            <a:xfrm>
+              <a:off x="8942027" y="1569418"/>
+              <a:ext cx="1775942" cy="523220"/>
+            </a:xfrm>
+            <a:prstGeom prst="rect">
+              <a:avLst/>
+            </a:prstGeom>
+          </p:spPr>
+          <p:txBody>
+            <a:bodyPr wrap="square">
+              <a:spAutoFit/>
+            </a:bodyPr>
+            <a:lstStyle/>
+            <a:p>
+              <a:pPr algn="ctr"/>
+              <a:r>
+                <a:rPr lang="en-GB" sz="1400" dirty="0"/>
+                <a:t>Difficult to understand</a:t>
+              </a:r>
+            </a:p>
+          </p:txBody>
+        </p:sp>
+        <p:pic>
+          <p:nvPicPr>
+            <p:cNvPr id="24" name="Graphic 23" descr="Filing Box Archive with solid fill">
+              <a:extLst>
+                <a:ext uri="{FF2B5EF4-FFF2-40B4-BE49-F238E27FC236}">
+                  <a16:creationId xmlns:a16="http://schemas.microsoft.com/office/drawing/2014/main" id="{525994BE-AF9E-AB45-806D-AD5D77EB3D8E}"/>
+                </a:ext>
+              </a:extLst>
+            </p:cNvPr>
+            <p:cNvPicPr>
+              <a:picLocks noChangeAspect="1"/>
+            </p:cNvPicPr>
+            <p:nvPr/>
+          </p:nvPicPr>
+          <p:blipFill>
+            <a:blip r:embed="rId12">
+              <a:extLst>
+                <a:ext uri="{96DAC541-7B7A-43D3-8B79-37D633B846F1}">
+                  <asvg:svgBlip xmlns:asvg="http://schemas.microsoft.com/office/drawing/2016/SVG/main" r:embed="rId13"/>
+                </a:ext>
+              </a:extLst>
+            </a:blip>
+            <a:stretch>
+              <a:fillRect/>
+            </a:stretch>
+          </p:blipFill>
+          <p:spPr>
+            <a:xfrm>
+              <a:off x="8964247" y="373110"/>
+              <a:ext cx="1196308" cy="1196308"/>
+            </a:xfrm>
+            <a:prstGeom prst="rect">
+              <a:avLst/>
+            </a:prstGeom>
+          </p:spPr>
+        </p:pic>
+        <p:pic>
+          <p:nvPicPr>
+            <p:cNvPr id="25" name="Graphic 24" descr="Question mark with solid fill">
+              <a:extLst>
+                <a:ext uri="{FF2B5EF4-FFF2-40B4-BE49-F238E27FC236}">
+                  <a16:creationId xmlns:a16="http://schemas.microsoft.com/office/drawing/2014/main" id="{C4715D41-5A87-3243-A270-9A3418641B4D}"/>
+                </a:ext>
+              </a:extLst>
+            </p:cNvPr>
+            <p:cNvPicPr>
+              <a:picLocks noChangeAspect="1"/>
+            </p:cNvPicPr>
+            <p:nvPr/>
+          </p:nvPicPr>
+          <p:blipFill>
+            <a:blip r:embed="rId14">
+              <a:extLst>
+                <a:ext uri="{96DAC541-7B7A-43D3-8B79-37D633B846F1}">
+                  <asvg:svgBlip xmlns:asvg="http://schemas.microsoft.com/office/drawing/2016/SVG/main" r:embed="rId15"/>
+                </a:ext>
+              </a:extLst>
+            </a:blip>
+            <a:stretch>
+              <a:fillRect/>
+            </a:stretch>
+          </p:blipFill>
+          <p:spPr>
+            <a:xfrm>
+              <a:off x="9942123" y="588978"/>
+              <a:ext cx="753626" cy="753626"/>
+            </a:xfrm>
+            <a:prstGeom prst="rect">
+              <a:avLst/>
+            </a:prstGeom>
+          </p:spPr>
+        </p:pic>
+      </p:grpSp>
+      <p:grpSp>
+        <p:nvGrpSpPr>
+          <p:cNvPr id="16" name="Group 15">
+            <a:extLst>
+              <a:ext uri="{FF2B5EF4-FFF2-40B4-BE49-F238E27FC236}">
+                <a16:creationId xmlns:a16="http://schemas.microsoft.com/office/drawing/2014/main" id="{8F65618E-323B-D345-9ECF-D2C45A659956}"/>
+              </a:ext>
+            </a:extLst>
+          </p:cNvPr>
+          <p:cNvGrpSpPr/>
+          <p:nvPr/>
+        </p:nvGrpSpPr>
+        <p:grpSpPr>
+          <a:xfrm>
+            <a:off x="-2772293" y="353384"/>
+            <a:ext cx="4038887" cy="4031344"/>
+            <a:chOff x="-2772293" y="353384"/>
+            <a:chExt cx="4038887" cy="4031344"/>
+          </a:xfrm>
+        </p:grpSpPr>
+        <p:sp>
+          <p:nvSpPr>
+            <p:cNvPr id="12" name="Oval 11">
+              <a:extLst>
+                <a:ext uri="{FF2B5EF4-FFF2-40B4-BE49-F238E27FC236}">
+                  <a16:creationId xmlns:a16="http://schemas.microsoft.com/office/drawing/2014/main" id="{1F9405EB-97E3-E646-B2EA-AF285528F676}"/>
+                </a:ext>
+              </a:extLst>
+            </p:cNvPr>
+            <p:cNvSpPr/>
+            <p:nvPr/>
+          </p:nvSpPr>
+          <p:spPr>
+            <a:xfrm>
+              <a:off x="-2772293" y="353384"/>
+              <a:ext cx="4038887" cy="4031344"/>
+            </a:xfrm>
+            <a:prstGeom prst="ellipse">
+              <a:avLst/>
+            </a:prstGeom>
+            <a:solidFill>
+              <a:srgbClr val="FDCF00"/>
+            </a:solidFill>
+            <a:ln>
+              <a:noFill/>
+            </a:ln>
+          </p:spPr>
+          <p:style>
+            <a:lnRef idx="2">
+              <a:schemeClr val="accent1">
+                <a:shade val="50000"/>
+              </a:schemeClr>
+            </a:lnRef>
+            <a:fillRef idx="1">
+              <a:schemeClr val="accent1"/>
+            </a:fillRef>
+            <a:effectRef idx="0">
+              <a:schemeClr val="accent1"/>
+            </a:effectRef>
+            <a:fontRef idx="minor">
+              <a:schemeClr val="lt1"/>
+            </a:fontRef>
+          </p:style>
+          <p:txBody>
+            <a:bodyPr rtlCol="0" anchor="ctr"/>
+            <a:lstStyle/>
+            <a:p>
+              <a:pPr algn="ctr"/>
+              <a:endParaRPr lang="en-GB"/>
+            </a:p>
+          </p:txBody>
+        </p:sp>
+        <p:grpSp>
+          <p:nvGrpSpPr>
+            <p:cNvPr id="6" name="Group 5">
+              <a:extLst>
+                <a:ext uri="{FF2B5EF4-FFF2-40B4-BE49-F238E27FC236}">
+                  <a16:creationId xmlns:a16="http://schemas.microsoft.com/office/drawing/2014/main" id="{25FBC63B-01D9-D545-A75A-30E7B263957D}"/>
+                </a:ext>
+              </a:extLst>
+            </p:cNvPr>
+            <p:cNvGrpSpPr/>
+            <p:nvPr/>
+          </p:nvGrpSpPr>
+          <p:grpSpPr>
+            <a:xfrm>
+              <a:off x="-2409246" y="671635"/>
+              <a:ext cx="3394842" cy="3394842"/>
+              <a:chOff x="10172" y="1847307"/>
+              <a:chExt cx="3394842" cy="3394842"/>
+            </a:xfrm>
+          </p:grpSpPr>
+          <p:sp>
+            <p:nvSpPr>
+              <p:cNvPr id="27" name="Diamond 26">
+                <a:extLst>
+                  <a:ext uri="{FF2B5EF4-FFF2-40B4-BE49-F238E27FC236}">
+                    <a16:creationId xmlns:a16="http://schemas.microsoft.com/office/drawing/2014/main" id="{8E22429D-12D9-E541-92D0-A8D239706826}"/>
+                  </a:ext>
+                </a:extLst>
+              </p:cNvPr>
+              <p:cNvSpPr/>
+              <p:nvPr/>
+            </p:nvSpPr>
+            <p:spPr>
+              <a:xfrm>
+                <a:off x="10172" y="1847307"/>
+                <a:ext cx="3394842" cy="3394842"/>
+              </a:xfrm>
+              <a:prstGeom prst="diamond">
+                <a:avLst/>
+              </a:prstGeom>
+              <a:solidFill>
+                <a:schemeClr val="bg1"/>
+              </a:solidFill>
+              <a:ln w="127000">
+                <a:solidFill>
+                  <a:srgbClr val="FF0000"/>
+                </a:solidFill>
+              </a:ln>
+            </p:spPr>
+            <p:style>
+              <a:lnRef idx="2">
+                <a:schemeClr val="accent1"/>
+              </a:lnRef>
+              <a:fillRef idx="1">
+                <a:schemeClr val="lt1"/>
+              </a:fillRef>
+              <a:effectRef idx="0">
+                <a:schemeClr val="accent1"/>
+              </a:effectRef>
+              <a:fontRef idx="minor">
+                <a:schemeClr val="dk1"/>
+              </a:fontRef>
+            </p:style>
+            <p:txBody>
+              <a:bodyPr rtlCol="0" anchor="ctr"/>
+              <a:lstStyle/>
+              <a:p>
+                <a:pPr algn="ctr"/>
+                <a:endParaRPr lang="en-GB" dirty="0"/>
+              </a:p>
+            </p:txBody>
+          </p:sp>
+          <p:pic>
+            <p:nvPicPr>
+              <p:cNvPr id="30" name="Graphic 29" descr="Exclamation mark with solid fill">
+                <a:extLst>
+                  <a:ext uri="{FF2B5EF4-FFF2-40B4-BE49-F238E27FC236}">
+                    <a16:creationId xmlns:a16="http://schemas.microsoft.com/office/drawing/2014/main" id="{C6F90F73-6A26-3F46-8077-FD8C8F3D43FB}"/>
+                  </a:ext>
+                </a:extLst>
+              </p:cNvPr>
+              <p:cNvPicPr>
+                <a:picLocks noChangeAspect="1"/>
+              </p:cNvPicPr>
+              <p:nvPr/>
+            </p:nvPicPr>
+            <p:blipFill>
+              <a:blip r:embed="rId6">
+                <a:extLst>
+                  <a:ext uri="{96DAC541-7B7A-43D3-8B79-37D633B846F1}">
+                    <asvg:svgBlip xmlns:asvg="http://schemas.microsoft.com/office/drawing/2016/SVG/main" r:embed="rId7"/>
+                  </a:ext>
+                </a:extLst>
+              </a:blip>
+              <a:stretch>
+                <a:fillRect/>
+              </a:stretch>
+            </p:blipFill>
+            <p:spPr>
+              <a:xfrm>
+                <a:off x="833315" y="2559131"/>
+                <a:ext cx="1747468" cy="1747468"/>
+              </a:xfrm>
+              <a:prstGeom prst="rect">
+                <a:avLst/>
+              </a:prstGeom>
+            </p:spPr>
+          </p:pic>
+        </p:grpSp>
+      </p:grpSp>
+      <p:sp>
+        <p:nvSpPr>
+          <p:cNvPr id="33" name="Diamond 32">
+            <a:extLst>
+              <a:ext uri="{FF2B5EF4-FFF2-40B4-BE49-F238E27FC236}">
+                <a16:creationId xmlns:a16="http://schemas.microsoft.com/office/drawing/2014/main" id="{171FAA7C-DE46-EA44-A6DC-C79590EE46EA}"/>
+              </a:ext>
+            </a:extLst>
+          </p:cNvPr>
+          <p:cNvSpPr/>
+          <p:nvPr/>
+        </p:nvSpPr>
+        <p:spPr>
+          <a:xfrm>
+            <a:off x="3653131" y="-2541918"/>
+            <a:ext cx="3394842" cy="3394842"/>
+          </a:xfrm>
+          <a:prstGeom prst="diamond">
+            <a:avLst/>
+          </a:prstGeom>
+          <a:solidFill>
+            <a:schemeClr val="bg1"/>
+          </a:solidFill>
+          <a:ln w="127000">
+            <a:solidFill>
+              <a:srgbClr val="FF0000"/>
+            </a:solidFill>
+          </a:ln>
+        </p:spPr>
+        <p:style>
+          <a:lnRef idx="2">
+            <a:schemeClr val="accent1"/>
+          </a:lnRef>
+          <a:fillRef idx="1">
+            <a:schemeClr val="lt1"/>
+          </a:fillRef>
+          <a:effectRef idx="0">
+            <a:schemeClr val="accent1"/>
+          </a:effectRef>
+          <a:fontRef idx="minor">
+            <a:schemeClr val="dk1"/>
+          </a:fontRef>
+        </p:style>
+        <p:txBody>
+          <a:bodyPr rtlCol="0" anchor="ctr"/>
+          <a:lstStyle/>
+          <a:p>
+            <a:pPr algn="ctr"/>
+            <a:endParaRPr lang="en-GB" dirty="0"/>
+          </a:p>
+        </p:txBody>
+      </p:sp>
+      <p:sp>
+        <p:nvSpPr>
+          <p:cNvPr id="34" name="Rectangle 33">
+            <a:extLst>
+              <a:ext uri="{FF2B5EF4-FFF2-40B4-BE49-F238E27FC236}">
+                <a16:creationId xmlns:a16="http://schemas.microsoft.com/office/drawing/2014/main" id="{F173B857-22D7-D641-B2DF-AA4CB0523C61}"/>
+              </a:ext>
+            </a:extLst>
+          </p:cNvPr>
+          <p:cNvSpPr/>
+          <p:nvPr/>
+        </p:nvSpPr>
+        <p:spPr>
+          <a:xfrm>
+            <a:off x="4455075" y="-301177"/>
+            <a:ext cx="1775942" cy="523220"/>
+          </a:xfrm>
+          <a:prstGeom prst="rect">
+            <a:avLst/>
+          </a:prstGeom>
+        </p:spPr>
+        <p:txBody>
+          <a:bodyPr wrap="square">
+            <a:spAutoFit/>
+          </a:bodyPr>
+          <a:lstStyle/>
+          <a:p>
+            <a:pPr algn="ctr"/>
+            <a:r>
+              <a:rPr lang="en-GB" sz="1400" dirty="0"/>
+              <a:t>May cause direct harm</a:t>
+            </a:r>
+          </a:p>
+        </p:txBody>
+      </p:sp>
+      <p:pic>
+        <p:nvPicPr>
+          <p:cNvPr id="35" name="Graphic 34" descr="Skull outline">
+            <a:extLst>
+              <a:ext uri="{FF2B5EF4-FFF2-40B4-BE49-F238E27FC236}">
+                <a16:creationId xmlns:a16="http://schemas.microsoft.com/office/drawing/2014/main" id="{60E3988A-FD8B-D242-813C-FAEBE6375FF2}"/>
+              </a:ext>
+            </a:extLst>
+          </p:cNvPr>
+          <p:cNvPicPr>
+            <a:picLocks noChangeAspect="1"/>
+          </p:cNvPicPr>
+          <p:nvPr/>
+        </p:nvPicPr>
+        <p:blipFill>
+          <a:blip r:embed="rId16">
+            <a:extLst>
+              <a:ext uri="{96DAC541-7B7A-43D3-8B79-37D633B846F1}">
+                <asvg:svgBlip xmlns:asvg="http://schemas.microsoft.com/office/drawing/2016/SVG/main" r:embed="rId17"/>
+              </a:ext>
+            </a:extLst>
+          </a:blip>
+          <a:stretch>
+            <a:fillRect/>
+          </a:stretch>
+        </p:blipFill>
+        <p:spPr>
+          <a:xfrm>
+            <a:off x="4635861" y="-1779856"/>
+            <a:ext cx="1467193" cy="1467193"/>
+          </a:xfrm>
+          <a:prstGeom prst="rect">
+            <a:avLst/>
+          </a:prstGeom>
+        </p:spPr>
+      </p:pic>
+      <p:grpSp>
+        <p:nvGrpSpPr>
+          <p:cNvPr id="2" name="Group 1">
+            <a:extLst>
+              <a:ext uri="{FF2B5EF4-FFF2-40B4-BE49-F238E27FC236}">
+                <a16:creationId xmlns:a16="http://schemas.microsoft.com/office/drawing/2014/main" id="{CB1E92F7-8253-FB43-AC6F-67AA4D23BF31}"/>
+              </a:ext>
+            </a:extLst>
+          </p:cNvPr>
+          <p:cNvGrpSpPr/>
+          <p:nvPr/>
+        </p:nvGrpSpPr>
+        <p:grpSpPr>
+          <a:xfrm>
+            <a:off x="3632506" y="2687307"/>
+            <a:ext cx="3394842" cy="3394842"/>
+            <a:chOff x="3632506" y="2687307"/>
+            <a:chExt cx="3394842" cy="3394842"/>
+          </a:xfrm>
+        </p:grpSpPr>
+        <p:sp>
+          <p:nvSpPr>
+            <p:cNvPr id="28" name="Diamond 27">
+              <a:extLst>
+                <a:ext uri="{FF2B5EF4-FFF2-40B4-BE49-F238E27FC236}">
+                  <a16:creationId xmlns:a16="http://schemas.microsoft.com/office/drawing/2014/main" id="{5D8C05D7-D06C-054F-8B32-4652DE1E9BC0}"/>
+                </a:ext>
+              </a:extLst>
+            </p:cNvPr>
+            <p:cNvSpPr/>
+            <p:nvPr/>
+          </p:nvSpPr>
+          <p:spPr>
+            <a:xfrm>
+              <a:off x="3632506" y="2687307"/>
+              <a:ext cx="3394842" cy="3394842"/>
+            </a:xfrm>
+            <a:prstGeom prst="diamond">
+              <a:avLst/>
+            </a:prstGeom>
+            <a:solidFill>
+              <a:schemeClr val="bg1"/>
+            </a:solidFill>
+            <a:ln w="127000">
+              <a:solidFill>
+                <a:srgbClr val="FF0000"/>
+              </a:solidFill>
+            </a:ln>
+          </p:spPr>
+          <p:style>
+            <a:lnRef idx="2">
+              <a:schemeClr val="accent1"/>
+            </a:lnRef>
+            <a:fillRef idx="1">
+              <a:schemeClr val="lt1"/>
+            </a:fillRef>
+            <a:effectRef idx="0">
+              <a:schemeClr val="accent1"/>
+            </a:effectRef>
+            <a:fontRef idx="minor">
+              <a:schemeClr val="dk1"/>
+            </a:fontRef>
+          </p:style>
+          <p:txBody>
+            <a:bodyPr rtlCol="0" anchor="ctr"/>
+            <a:lstStyle/>
+            <a:p>
+              <a:pPr algn="ctr"/>
+              <a:endParaRPr lang="en-GB" dirty="0"/>
+            </a:p>
+          </p:txBody>
+        </p:sp>
+        <p:sp>
+          <p:nvSpPr>
+            <p:cNvPr id="31" name="Rectangle 30">
+              <a:extLst>
+                <a:ext uri="{FF2B5EF4-FFF2-40B4-BE49-F238E27FC236}">
+                  <a16:creationId xmlns:a16="http://schemas.microsoft.com/office/drawing/2014/main" id="{D5C17F11-ECEF-0A4E-89DE-CC9A1D6950C2}"/>
+                </a:ext>
+              </a:extLst>
+            </p:cNvPr>
+            <p:cNvSpPr/>
+            <p:nvPr/>
+          </p:nvSpPr>
+          <p:spPr>
+            <a:xfrm>
+              <a:off x="4451383" y="4822742"/>
+              <a:ext cx="1775942" cy="307777"/>
+            </a:xfrm>
+            <a:prstGeom prst="rect">
+              <a:avLst/>
+            </a:prstGeom>
+          </p:spPr>
+          <p:txBody>
+            <a:bodyPr wrap="square">
+              <a:spAutoFit/>
+            </a:bodyPr>
+            <a:lstStyle/>
+            <a:p>
+              <a:pPr algn="ctr"/>
+              <a:r>
+                <a:rPr lang="en-GB" sz="1400" dirty="0"/>
+                <a:t>Contains Data Science</a:t>
+              </a:r>
+            </a:p>
+          </p:txBody>
+        </p:sp>
+        <p:pic>
+          <p:nvPicPr>
+            <p:cNvPr id="36" name="Graphic 35" descr="Exclamation mark with solid fill">
+              <a:extLst>
+                <a:ext uri="{FF2B5EF4-FFF2-40B4-BE49-F238E27FC236}">
+                  <a16:creationId xmlns:a16="http://schemas.microsoft.com/office/drawing/2014/main" id="{8F343CCB-38D2-C24E-AFF0-C1EC93ED2CC6}"/>
+                </a:ext>
+              </a:extLst>
+            </p:cNvPr>
+            <p:cNvPicPr>
+              <a:picLocks noChangeAspect="1"/>
+            </p:cNvPicPr>
+            <p:nvPr/>
+          </p:nvPicPr>
+          <p:blipFill>
+            <a:blip r:embed="rId6">
+              <a:extLst>
+                <a:ext uri="{96DAC541-7B7A-43D3-8B79-37D633B846F1}">
+                  <asvg:svgBlip xmlns:asvg="http://schemas.microsoft.com/office/drawing/2016/SVG/main" r:embed="rId7"/>
+                </a:ext>
+              </a:extLst>
+            </a:blip>
+            <a:stretch>
+              <a:fillRect/>
+            </a:stretch>
+          </p:blipFill>
+          <p:spPr>
+            <a:xfrm>
+              <a:off x="4697696" y="3548875"/>
+              <a:ext cx="1225874" cy="1225874"/>
+            </a:xfrm>
+            <a:prstGeom prst="rect">
+              <a:avLst/>
+            </a:prstGeom>
+          </p:spPr>
+        </p:pic>
+      </p:grpSp>
     </p:spTree>
     <p:extLst>
       <p:ext uri="{BB962C8B-B14F-4D97-AF65-F5344CB8AC3E}">

</xml_diff>